<commit_message>
Update the code document.
</commit_message>
<xml_diff>
--- a/doc/progress.pptx
+++ b/doc/progress.pptx
@@ -270,7 +270,7 @@
           <a:p>
             <a:fld id="{CF1267A5-9448-410E-9905-2BFAF5898020}" type="datetimeFigureOut">
               <a:rPr lang="en-SG" smtClean="0"/>
-              <a:t>25/11/2021</a:t>
+              <a:t>28/11/2021</a:t>
             </a:fld>
             <a:endParaRPr lang="en-SG"/>
           </a:p>
@@ -470,7 +470,7 @@
           <a:p>
             <a:fld id="{CF1267A5-9448-410E-9905-2BFAF5898020}" type="datetimeFigureOut">
               <a:rPr lang="en-SG" smtClean="0"/>
-              <a:t>25/11/2021</a:t>
+              <a:t>28/11/2021</a:t>
             </a:fld>
             <a:endParaRPr lang="en-SG"/>
           </a:p>
@@ -680,7 +680,7 @@
           <a:p>
             <a:fld id="{CF1267A5-9448-410E-9905-2BFAF5898020}" type="datetimeFigureOut">
               <a:rPr lang="en-SG" smtClean="0"/>
-              <a:t>25/11/2021</a:t>
+              <a:t>28/11/2021</a:t>
             </a:fld>
             <a:endParaRPr lang="en-SG"/>
           </a:p>
@@ -2085,7 +2085,7 @@
           <a:p>
             <a:fld id="{CF1267A5-9448-410E-9905-2BFAF5898020}" type="datetimeFigureOut">
               <a:rPr lang="en-SG" smtClean="0"/>
-              <a:t>25/11/2021</a:t>
+              <a:t>28/11/2021</a:t>
             </a:fld>
             <a:endParaRPr lang="en-SG"/>
           </a:p>
@@ -2361,7 +2361,7 @@
           <a:p>
             <a:fld id="{CF1267A5-9448-410E-9905-2BFAF5898020}" type="datetimeFigureOut">
               <a:rPr lang="en-SG" smtClean="0"/>
-              <a:t>25/11/2021</a:t>
+              <a:t>28/11/2021</a:t>
             </a:fld>
             <a:endParaRPr lang="en-SG"/>
           </a:p>
@@ -2629,7 +2629,7 @@
           <a:p>
             <a:fld id="{CF1267A5-9448-410E-9905-2BFAF5898020}" type="datetimeFigureOut">
               <a:rPr lang="en-SG" smtClean="0"/>
-              <a:t>25/11/2021</a:t>
+              <a:t>28/11/2021</a:t>
             </a:fld>
             <a:endParaRPr lang="en-SG"/>
           </a:p>
@@ -3044,7 +3044,7 @@
           <a:p>
             <a:fld id="{CF1267A5-9448-410E-9905-2BFAF5898020}" type="datetimeFigureOut">
               <a:rPr lang="en-SG" smtClean="0"/>
-              <a:t>25/11/2021</a:t>
+              <a:t>28/11/2021</a:t>
             </a:fld>
             <a:endParaRPr lang="en-SG"/>
           </a:p>
@@ -3186,7 +3186,7 @@
           <a:p>
             <a:fld id="{CF1267A5-9448-410E-9905-2BFAF5898020}" type="datetimeFigureOut">
               <a:rPr lang="en-SG" smtClean="0"/>
-              <a:t>25/11/2021</a:t>
+              <a:t>28/11/2021</a:t>
             </a:fld>
             <a:endParaRPr lang="en-SG"/>
           </a:p>
@@ -3299,7 +3299,7 @@
           <a:p>
             <a:fld id="{CF1267A5-9448-410E-9905-2BFAF5898020}" type="datetimeFigureOut">
               <a:rPr lang="en-SG" smtClean="0"/>
-              <a:t>25/11/2021</a:t>
+              <a:t>28/11/2021</a:t>
             </a:fld>
             <a:endParaRPr lang="en-SG"/>
           </a:p>
@@ -3612,7 +3612,7 @@
           <a:p>
             <a:fld id="{CF1267A5-9448-410E-9905-2BFAF5898020}" type="datetimeFigureOut">
               <a:rPr lang="en-SG" smtClean="0"/>
-              <a:t>25/11/2021</a:t>
+              <a:t>28/11/2021</a:t>
             </a:fld>
             <a:endParaRPr lang="en-SG"/>
           </a:p>
@@ -3901,7 +3901,7 @@
           <a:p>
             <a:fld id="{CF1267A5-9448-410E-9905-2BFAF5898020}" type="datetimeFigureOut">
               <a:rPr lang="en-SG" smtClean="0"/>
-              <a:t>25/11/2021</a:t>
+              <a:t>28/11/2021</a:t>
             </a:fld>
             <a:endParaRPr lang="en-SG"/>
           </a:p>
@@ -4144,7 +4144,7 @@
           <a:p>
             <a:fld id="{CF1267A5-9448-410E-9905-2BFAF5898020}" type="datetimeFigureOut">
               <a:rPr lang="en-SG" smtClean="0"/>
-              <a:t>25/11/2021</a:t>
+              <a:t>28/11/2021</a:t>
             </a:fld>
             <a:endParaRPr lang="en-SG"/>
           </a:p>
@@ -4813,6 +4813,11 @@
           <a:prstGeom prst="roundRect">
             <a:avLst/>
           </a:prstGeom>
+          <a:solidFill>
+            <a:schemeClr val="bg2">
+              <a:lumMod val="90000"/>
+            </a:schemeClr>
+          </a:solidFill>
         </p:spPr>
         <p:style>
           <a:lnRef idx="1">
@@ -5184,6 +5189,11 @@
           <a:prstGeom prst="roundRect">
             <a:avLst/>
           </a:prstGeom>
+          <a:solidFill>
+            <a:schemeClr val="bg2">
+              <a:lumMod val="90000"/>
+            </a:schemeClr>
+          </a:solidFill>
         </p:spPr>
         <p:style>
           <a:lnRef idx="1">
@@ -5368,6 +5378,11 @@
           <a:prstGeom prst="roundRect">
             <a:avLst/>
           </a:prstGeom>
+          <a:solidFill>
+            <a:schemeClr val="bg2">
+              <a:lumMod val="90000"/>
+            </a:schemeClr>
+          </a:solidFill>
         </p:spPr>
         <p:style>
           <a:lnRef idx="1">
@@ -5483,7 +5498,7 @@
           <a:p>
             <a:pPr algn="ctr"/>
             <a:r>
-              <a:rPr lang="en-SG" altLang="zh-CN" b="1"/>
+              <a:rPr lang="en-SG" altLang="zh-CN" b="1" dirty="0"/>
               <a:t>link</a:t>
             </a:r>
             <a:endParaRPr lang="zh-CN" altLang="en-US" b="1" dirty="0"/>
@@ -5552,6 +5567,9 @@
           <a:prstGeom prst="roundRect">
             <a:avLst/>
           </a:prstGeom>
+          <a:solidFill>
+            <a:schemeClr val="bg2"/>
+          </a:solidFill>
         </p:spPr>
         <p:style>
           <a:lnRef idx="1">
@@ -6072,6 +6090,9 @@
           <a:prstGeom prst="roundRect">
             <a:avLst/>
           </a:prstGeom>
+          <a:solidFill>
+            <a:schemeClr val="bg2"/>
+          </a:solidFill>
         </p:spPr>
         <p:style>
           <a:lnRef idx="1">
@@ -7012,6 +7033,12 @@
           <a:prstGeom prst="roundRect">
             <a:avLst/>
           </a:prstGeom>
+          <a:solidFill>
+            <a:schemeClr val="accent3">
+              <a:lumMod val="60000"/>
+              <a:lumOff val="40000"/>
+            </a:schemeClr>
+          </a:solidFill>
         </p:spPr>
         <p:style>
           <a:lnRef idx="1">
@@ -7388,6 +7415,11 @@
           <a:prstGeom prst="roundRect">
             <a:avLst/>
           </a:prstGeom>
+          <a:solidFill>
+            <a:schemeClr val="bg2">
+              <a:lumMod val="90000"/>
+            </a:schemeClr>
+          </a:solidFill>
         </p:spPr>
         <p:style>
           <a:lnRef idx="1">
@@ -7726,6 +7758,11 @@
           <a:prstGeom prst="roundRect">
             <a:avLst/>
           </a:prstGeom>
+          <a:solidFill>
+            <a:schemeClr val="bg2">
+              <a:lumMod val="90000"/>
+            </a:schemeClr>
+          </a:solidFill>
         </p:spPr>
         <p:style>
           <a:lnRef idx="1">
@@ -8098,6 +8135,11 @@
           <a:prstGeom prst="roundRect">
             <a:avLst/>
           </a:prstGeom>
+          <a:solidFill>
+            <a:schemeClr val="bg2">
+              <a:lumMod val="90000"/>
+            </a:schemeClr>
+          </a:solidFill>
         </p:spPr>
         <p:style>
           <a:lnRef idx="1">
@@ -8525,9 +8567,9 @@
           <p:nvPr/>
         </p:nvCxnSpPr>
         <p:spPr>
-          <a:xfrm>
-            <a:off x="2832407" y="3690947"/>
-            <a:ext cx="399065" cy="0"/>
+          <a:xfrm flipV="1">
+            <a:off x="2832407" y="2856933"/>
+            <a:ext cx="517191" cy="798504"/>
           </a:xfrm>
           <a:prstGeom prst="straightConnector1">
             <a:avLst/>
@@ -8566,8 +8608,8 @@
         </p:nvSpPr>
         <p:spPr>
           <a:xfrm>
-            <a:off x="3267308" y="3506272"/>
-            <a:ext cx="2041426" cy="453279"/>
+            <a:off x="3349597" y="2630294"/>
+            <a:ext cx="2069461" cy="433371"/>
           </a:xfrm>
           <a:prstGeom prst="roundRect">
             <a:avLst/>
@@ -8690,6 +8732,232 @@
               <a:t>Browser driver API</a:t>
             </a:r>
             <a:endParaRPr lang="zh-CN" altLang="en-US" b="1" dirty="0"/>
+          </a:p>
+        </p:txBody>
+      </p:sp>
+      <p:sp>
+        <p:nvSpPr>
+          <p:cNvPr id="29" name="矩形: 圆角 34">
+            <a:extLst>
+              <a:ext uri="{FF2B5EF4-FFF2-40B4-BE49-F238E27FC236}">
+                <a16:creationId xmlns:a16="http://schemas.microsoft.com/office/drawing/2014/main" id="{C2B51392-35C2-4491-8DE6-07501185F04E}"/>
+              </a:ext>
+            </a:extLst>
+          </p:cNvPr>
+          <p:cNvSpPr/>
+          <p:nvPr/>
+        </p:nvSpPr>
+        <p:spPr>
+          <a:xfrm>
+            <a:off x="3312336" y="3649187"/>
+            <a:ext cx="2468924" cy="637721"/>
+          </a:xfrm>
+          <a:prstGeom prst="roundRect">
+            <a:avLst/>
+          </a:prstGeom>
+        </p:spPr>
+        <p:style>
+          <a:lnRef idx="1">
+            <a:schemeClr val="accent1"/>
+          </a:lnRef>
+          <a:fillRef idx="2">
+            <a:schemeClr val="accent1"/>
+          </a:fillRef>
+          <a:effectRef idx="1">
+            <a:schemeClr val="accent1"/>
+          </a:effectRef>
+          <a:fontRef idx="minor">
+            <a:schemeClr val="dk1"/>
+          </a:fontRef>
+        </p:style>
+        <p:txBody>
+          <a:bodyPr rtlCol="0" anchor="ctr"/>
+          <a:lstStyle>
+            <a:defPPr>
+              <a:defRPr lang="zh-CN"/>
+            </a:defPPr>
+            <a:lvl1pPr marL="0" algn="l" defTabSz="914400" rtl="0" eaLnBrk="1" latinLnBrk="0" hangingPunct="1">
+              <a:defRPr sz="1800" kern="1200">
+                <a:solidFill>
+                  <a:schemeClr val="dk1"/>
+                </a:solidFill>
+                <a:latin typeface="+mn-lt"/>
+                <a:ea typeface="+mn-ea"/>
+                <a:cs typeface="+mn-cs"/>
+              </a:defRPr>
+            </a:lvl1pPr>
+            <a:lvl2pPr marL="457200" algn="l" defTabSz="914400" rtl="0" eaLnBrk="1" latinLnBrk="0" hangingPunct="1">
+              <a:defRPr sz="1800" kern="1200">
+                <a:solidFill>
+                  <a:schemeClr val="dk1"/>
+                </a:solidFill>
+                <a:latin typeface="+mn-lt"/>
+                <a:ea typeface="+mn-ea"/>
+                <a:cs typeface="+mn-cs"/>
+              </a:defRPr>
+            </a:lvl2pPr>
+            <a:lvl3pPr marL="914400" algn="l" defTabSz="914400" rtl="0" eaLnBrk="1" latinLnBrk="0" hangingPunct="1">
+              <a:defRPr sz="1800" kern="1200">
+                <a:solidFill>
+                  <a:schemeClr val="dk1"/>
+                </a:solidFill>
+                <a:latin typeface="+mn-lt"/>
+                <a:ea typeface="+mn-ea"/>
+                <a:cs typeface="+mn-cs"/>
+              </a:defRPr>
+            </a:lvl3pPr>
+            <a:lvl4pPr marL="1371600" algn="l" defTabSz="914400" rtl="0" eaLnBrk="1" latinLnBrk="0" hangingPunct="1">
+              <a:defRPr sz="1800" kern="1200">
+                <a:solidFill>
+                  <a:schemeClr val="dk1"/>
+                </a:solidFill>
+                <a:latin typeface="+mn-lt"/>
+                <a:ea typeface="+mn-ea"/>
+                <a:cs typeface="+mn-cs"/>
+              </a:defRPr>
+            </a:lvl4pPr>
+            <a:lvl5pPr marL="1828800" algn="l" defTabSz="914400" rtl="0" eaLnBrk="1" latinLnBrk="0" hangingPunct="1">
+              <a:defRPr sz="1800" kern="1200">
+                <a:solidFill>
+                  <a:schemeClr val="dk1"/>
+                </a:solidFill>
+                <a:latin typeface="+mn-lt"/>
+                <a:ea typeface="+mn-ea"/>
+                <a:cs typeface="+mn-cs"/>
+              </a:defRPr>
+            </a:lvl5pPr>
+            <a:lvl6pPr marL="2286000" algn="l" defTabSz="914400" rtl="0" eaLnBrk="1" latinLnBrk="0" hangingPunct="1">
+              <a:defRPr sz="1800" kern="1200">
+                <a:solidFill>
+                  <a:schemeClr val="dk1"/>
+                </a:solidFill>
+                <a:latin typeface="+mn-lt"/>
+                <a:ea typeface="+mn-ea"/>
+                <a:cs typeface="+mn-cs"/>
+              </a:defRPr>
+            </a:lvl6pPr>
+            <a:lvl7pPr marL="2743200" algn="l" defTabSz="914400" rtl="0" eaLnBrk="1" latinLnBrk="0" hangingPunct="1">
+              <a:defRPr sz="1800" kern="1200">
+                <a:solidFill>
+                  <a:schemeClr val="dk1"/>
+                </a:solidFill>
+                <a:latin typeface="+mn-lt"/>
+                <a:ea typeface="+mn-ea"/>
+                <a:cs typeface="+mn-cs"/>
+              </a:defRPr>
+            </a:lvl7pPr>
+            <a:lvl8pPr marL="3200400" algn="l" defTabSz="914400" rtl="0" eaLnBrk="1" latinLnBrk="0" hangingPunct="1">
+              <a:defRPr sz="1800" kern="1200">
+                <a:solidFill>
+                  <a:schemeClr val="dk1"/>
+                </a:solidFill>
+                <a:latin typeface="+mn-lt"/>
+                <a:ea typeface="+mn-ea"/>
+                <a:cs typeface="+mn-cs"/>
+              </a:defRPr>
+            </a:lvl8pPr>
+            <a:lvl9pPr marL="3657600" algn="l" defTabSz="914400" rtl="0" eaLnBrk="1" latinLnBrk="0" hangingPunct="1">
+              <a:defRPr sz="1800" kern="1200">
+                <a:solidFill>
+                  <a:schemeClr val="dk1"/>
+                </a:solidFill>
+                <a:latin typeface="+mn-lt"/>
+                <a:ea typeface="+mn-ea"/>
+                <a:cs typeface="+mn-cs"/>
+              </a:defRPr>
+            </a:lvl9pPr>
+          </a:lstStyle>
+          <a:p>
+            <a:r>
+              <a:rPr lang="en-SG" altLang="zh-CN" b="1" dirty="0"/>
+              <a:t>pyQT5 </a:t>
+            </a:r>
+            <a:r>
+              <a:rPr lang="en-SG" altLang="zh-CN" b="1" dirty="0" err="1"/>
+              <a:t>QtWebEngineWidgets</a:t>
+            </a:r>
+            <a:endParaRPr lang="zh-CN" altLang="en-US" b="1" dirty="0"/>
+          </a:p>
+        </p:txBody>
+      </p:sp>
+      <p:cxnSp>
+        <p:nvCxnSpPr>
+          <p:cNvPr id="31" name="直接箭头连接符 49">
+            <a:extLst>
+              <a:ext uri="{FF2B5EF4-FFF2-40B4-BE49-F238E27FC236}">
+                <a16:creationId xmlns:a16="http://schemas.microsoft.com/office/drawing/2014/main" id="{9B23AEC7-09B1-4D77-BF7F-6382FC2CB918}"/>
+              </a:ext>
+            </a:extLst>
+          </p:cNvPr>
+          <p:cNvCxnSpPr>
+            <a:cxnSpLocks/>
+            <a:endCxn id="29" idx="1"/>
+          </p:cNvCxnSpPr>
+          <p:nvPr/>
+        </p:nvCxnSpPr>
+        <p:spPr>
+          <a:xfrm>
+            <a:off x="2881851" y="3683077"/>
+            <a:ext cx="430485" cy="284971"/>
+          </a:xfrm>
+          <a:prstGeom prst="straightConnector1">
+            <a:avLst/>
+          </a:prstGeom>
+          <a:ln w="28575">
+            <a:prstDash val="dash"/>
+            <a:tailEnd type="triangle"/>
+          </a:ln>
+        </p:spPr>
+        <p:style>
+          <a:lnRef idx="1">
+            <a:schemeClr val="accent1"/>
+          </a:lnRef>
+          <a:fillRef idx="0">
+            <a:schemeClr val="accent1"/>
+          </a:fillRef>
+          <a:effectRef idx="0">
+            <a:schemeClr val="accent1"/>
+          </a:effectRef>
+          <a:fontRef idx="minor">
+            <a:schemeClr val="tx1"/>
+          </a:fontRef>
+        </p:style>
+      </p:cxnSp>
+      <p:sp>
+        <p:nvSpPr>
+          <p:cNvPr id="35" name="TextBox 34">
+            <a:extLst>
+              <a:ext uri="{FF2B5EF4-FFF2-40B4-BE49-F238E27FC236}">
+                <a16:creationId xmlns:a16="http://schemas.microsoft.com/office/drawing/2014/main" id="{CD2EEBDC-915D-4B09-AF09-7A85877C370B}"/>
+              </a:ext>
+            </a:extLst>
+          </p:cNvPr>
+          <p:cNvSpPr txBox="1"/>
+          <p:nvPr/>
+        </p:nvSpPr>
+        <p:spPr>
+          <a:xfrm>
+            <a:off x="3680849" y="3198090"/>
+            <a:ext cx="613255" cy="246221"/>
+          </a:xfrm>
+          <a:prstGeom prst="rect">
+            <a:avLst/>
+          </a:prstGeom>
+          <a:noFill/>
+          <a:ln w="3175">
+            <a:noFill/>
+          </a:ln>
+        </p:spPr>
+        <p:txBody>
+          <a:bodyPr wrap="square" rtlCol="0">
+            <a:spAutoFit/>
+          </a:bodyPr>
+          <a:lstStyle/>
+          <a:p>
+            <a:r>
+              <a:rPr lang="en-SG" sz="1000" b="1" dirty="0"/>
+              <a:t>OR</a:t>
+            </a:r>
           </a:p>
         </p:txBody>
       </p:sp>
@@ -11201,6 +11469,11 @@
           <a:prstGeom prst="roundRect">
             <a:avLst/>
           </a:prstGeom>
+          <a:solidFill>
+            <a:schemeClr val="bg2">
+              <a:lumMod val="90000"/>
+            </a:schemeClr>
+          </a:solidFill>
         </p:spPr>
         <p:style>
           <a:lnRef idx="1">
@@ -11572,6 +11845,11 @@
           <a:prstGeom prst="roundRect">
             <a:avLst/>
           </a:prstGeom>
+          <a:solidFill>
+            <a:schemeClr val="bg2">
+              <a:lumMod val="90000"/>
+            </a:schemeClr>
+          </a:solidFill>
         </p:spPr>
         <p:style>
           <a:lnRef idx="1">
@@ -11756,6 +12034,11 @@
           <a:prstGeom prst="roundRect">
             <a:avLst/>
           </a:prstGeom>
+          <a:solidFill>
+            <a:schemeClr val="bg2">
+              <a:lumMod val="90000"/>
+            </a:schemeClr>
+          </a:solidFill>
         </p:spPr>
         <p:style>
           <a:lnRef idx="1">
@@ -11940,6 +12223,11 @@
           <a:prstGeom prst="roundRect">
             <a:avLst/>
           </a:prstGeom>
+          <a:solidFill>
+            <a:schemeClr val="bg2">
+              <a:lumMod val="90000"/>
+            </a:schemeClr>
+          </a:solidFill>
         </p:spPr>
         <p:style>
           <a:lnRef idx="1">
@@ -12224,6 +12512,11 @@
           <a:prstGeom prst="roundRect">
             <a:avLst/>
           </a:prstGeom>
+          <a:solidFill>
+            <a:schemeClr val="bg2">
+              <a:lumMod val="90000"/>
+            </a:schemeClr>
+          </a:solidFill>
         </p:spPr>
         <p:style>
           <a:lnRef idx="1">
@@ -12495,7 +12788,7 @@
                 </a:solidFill>
                 <a:latin typeface="-apple-system"/>
               </a:rPr>
-              <a:t>ScreenShoter</a:t>
+              <a:t>Screenshoter</a:t>
             </a:r>
             <a:endParaRPr lang="zh-CN" altLang="en-US" b="1" dirty="0"/>
           </a:p>
@@ -12512,13 +12805,15 @@
           </p:cNvPr>
           <p:cNvCxnSpPr>
             <a:cxnSpLocks/>
+            <a:stCxn id="33" idx="3"/>
+            <a:endCxn id="35" idx="1"/>
           </p:cNvCxnSpPr>
           <p:nvPr/>
         </p:nvCxnSpPr>
         <p:spPr>
           <a:xfrm>
-            <a:off x="7240568" y="3465792"/>
-            <a:ext cx="399065" cy="0"/>
+            <a:off x="7240568" y="3517722"/>
+            <a:ext cx="372763" cy="54228"/>
           </a:xfrm>
           <a:prstGeom prst="straightConnector1">
             <a:avLst/>
@@ -12557,7 +12852,7 @@
         </p:nvSpPr>
         <p:spPr>
           <a:xfrm>
-            <a:off x="7675469" y="3281117"/>
+            <a:off x="7613331" y="3345310"/>
             <a:ext cx="2041426" cy="453279"/>
           </a:xfrm>
           <a:prstGeom prst="roundRect">
@@ -12788,6 +13083,11 @@
           <a:prstGeom prst="roundRect">
             <a:avLst/>
           </a:prstGeom>
+          <a:solidFill>
+            <a:schemeClr val="bg2">
+              <a:lumMod val="90000"/>
+            </a:schemeClr>
+          </a:solidFill>
         </p:spPr>
         <p:style>
           <a:lnRef idx="1">
@@ -13342,6 +13642,11 @@
           <a:prstGeom prst="roundRect">
             <a:avLst/>
           </a:prstGeom>
+          <a:solidFill>
+            <a:schemeClr val="bg2">
+              <a:lumMod val="90000"/>
+            </a:schemeClr>
+          </a:solidFill>
         </p:spPr>
         <p:style>
           <a:lnRef idx="1">
@@ -13556,6 +13861,233 @@
             <a:r>
               <a:rPr lang="en-SG" sz="1000" b="1" dirty="0"/>
               <a:t>Web Attestation Program </a:t>
+            </a:r>
+          </a:p>
+        </p:txBody>
+      </p:sp>
+      <p:sp>
+        <p:nvSpPr>
+          <p:cNvPr id="39" name="矩形: 圆角 34">
+            <a:extLst>
+              <a:ext uri="{FF2B5EF4-FFF2-40B4-BE49-F238E27FC236}">
+                <a16:creationId xmlns:a16="http://schemas.microsoft.com/office/drawing/2014/main" id="{F709A8C2-1C69-43BB-969C-B6F06A637702}"/>
+              </a:ext>
+            </a:extLst>
+          </p:cNvPr>
+          <p:cNvSpPr/>
+          <p:nvPr/>
+        </p:nvSpPr>
+        <p:spPr>
+          <a:xfrm>
+            <a:off x="7568132" y="2281721"/>
+            <a:ext cx="2468924" cy="637721"/>
+          </a:xfrm>
+          <a:prstGeom prst="roundRect">
+            <a:avLst/>
+          </a:prstGeom>
+        </p:spPr>
+        <p:style>
+          <a:lnRef idx="1">
+            <a:schemeClr val="accent1"/>
+          </a:lnRef>
+          <a:fillRef idx="2">
+            <a:schemeClr val="accent1"/>
+          </a:fillRef>
+          <a:effectRef idx="1">
+            <a:schemeClr val="accent1"/>
+          </a:effectRef>
+          <a:fontRef idx="minor">
+            <a:schemeClr val="dk1"/>
+          </a:fontRef>
+        </p:style>
+        <p:txBody>
+          <a:bodyPr rtlCol="0" anchor="ctr"/>
+          <a:lstStyle>
+            <a:defPPr>
+              <a:defRPr lang="zh-CN"/>
+            </a:defPPr>
+            <a:lvl1pPr marL="0" algn="l" defTabSz="914400" rtl="0" eaLnBrk="1" latinLnBrk="0" hangingPunct="1">
+              <a:defRPr sz="1800" kern="1200">
+                <a:solidFill>
+                  <a:schemeClr val="dk1"/>
+                </a:solidFill>
+                <a:latin typeface="+mn-lt"/>
+                <a:ea typeface="+mn-ea"/>
+                <a:cs typeface="+mn-cs"/>
+              </a:defRPr>
+            </a:lvl1pPr>
+            <a:lvl2pPr marL="457200" algn="l" defTabSz="914400" rtl="0" eaLnBrk="1" latinLnBrk="0" hangingPunct="1">
+              <a:defRPr sz="1800" kern="1200">
+                <a:solidFill>
+                  <a:schemeClr val="dk1"/>
+                </a:solidFill>
+                <a:latin typeface="+mn-lt"/>
+                <a:ea typeface="+mn-ea"/>
+                <a:cs typeface="+mn-cs"/>
+              </a:defRPr>
+            </a:lvl2pPr>
+            <a:lvl3pPr marL="914400" algn="l" defTabSz="914400" rtl="0" eaLnBrk="1" latinLnBrk="0" hangingPunct="1">
+              <a:defRPr sz="1800" kern="1200">
+                <a:solidFill>
+                  <a:schemeClr val="dk1"/>
+                </a:solidFill>
+                <a:latin typeface="+mn-lt"/>
+                <a:ea typeface="+mn-ea"/>
+                <a:cs typeface="+mn-cs"/>
+              </a:defRPr>
+            </a:lvl3pPr>
+            <a:lvl4pPr marL="1371600" algn="l" defTabSz="914400" rtl="0" eaLnBrk="1" latinLnBrk="0" hangingPunct="1">
+              <a:defRPr sz="1800" kern="1200">
+                <a:solidFill>
+                  <a:schemeClr val="dk1"/>
+                </a:solidFill>
+                <a:latin typeface="+mn-lt"/>
+                <a:ea typeface="+mn-ea"/>
+                <a:cs typeface="+mn-cs"/>
+              </a:defRPr>
+            </a:lvl4pPr>
+            <a:lvl5pPr marL="1828800" algn="l" defTabSz="914400" rtl="0" eaLnBrk="1" latinLnBrk="0" hangingPunct="1">
+              <a:defRPr sz="1800" kern="1200">
+                <a:solidFill>
+                  <a:schemeClr val="dk1"/>
+                </a:solidFill>
+                <a:latin typeface="+mn-lt"/>
+                <a:ea typeface="+mn-ea"/>
+                <a:cs typeface="+mn-cs"/>
+              </a:defRPr>
+            </a:lvl5pPr>
+            <a:lvl6pPr marL="2286000" algn="l" defTabSz="914400" rtl="0" eaLnBrk="1" latinLnBrk="0" hangingPunct="1">
+              <a:defRPr sz="1800" kern="1200">
+                <a:solidFill>
+                  <a:schemeClr val="dk1"/>
+                </a:solidFill>
+                <a:latin typeface="+mn-lt"/>
+                <a:ea typeface="+mn-ea"/>
+                <a:cs typeface="+mn-cs"/>
+              </a:defRPr>
+            </a:lvl6pPr>
+            <a:lvl7pPr marL="2743200" algn="l" defTabSz="914400" rtl="0" eaLnBrk="1" latinLnBrk="0" hangingPunct="1">
+              <a:defRPr sz="1800" kern="1200">
+                <a:solidFill>
+                  <a:schemeClr val="dk1"/>
+                </a:solidFill>
+                <a:latin typeface="+mn-lt"/>
+                <a:ea typeface="+mn-ea"/>
+                <a:cs typeface="+mn-cs"/>
+              </a:defRPr>
+            </a:lvl7pPr>
+            <a:lvl8pPr marL="3200400" algn="l" defTabSz="914400" rtl="0" eaLnBrk="1" latinLnBrk="0" hangingPunct="1">
+              <a:defRPr sz="1800" kern="1200">
+                <a:solidFill>
+                  <a:schemeClr val="dk1"/>
+                </a:solidFill>
+                <a:latin typeface="+mn-lt"/>
+                <a:ea typeface="+mn-ea"/>
+                <a:cs typeface="+mn-cs"/>
+              </a:defRPr>
+            </a:lvl8pPr>
+            <a:lvl9pPr marL="3657600" algn="l" defTabSz="914400" rtl="0" eaLnBrk="1" latinLnBrk="0" hangingPunct="1">
+              <a:defRPr sz="1800" kern="1200">
+                <a:solidFill>
+                  <a:schemeClr val="dk1"/>
+                </a:solidFill>
+                <a:latin typeface="+mn-lt"/>
+                <a:ea typeface="+mn-ea"/>
+                <a:cs typeface="+mn-cs"/>
+              </a:defRPr>
+            </a:lvl9pPr>
+          </a:lstStyle>
+          <a:p>
+            <a:r>
+              <a:rPr lang="en-SG" altLang="zh-CN" b="1" dirty="0"/>
+              <a:t>pyQT5 </a:t>
+            </a:r>
+            <a:r>
+              <a:rPr lang="en-SG" altLang="zh-CN" b="1" dirty="0" err="1"/>
+              <a:t>QtWebEngineWidgets</a:t>
+            </a:r>
+            <a:endParaRPr lang="zh-CN" altLang="en-US" b="1" dirty="0"/>
+          </a:p>
+        </p:txBody>
+      </p:sp>
+      <p:cxnSp>
+        <p:nvCxnSpPr>
+          <p:cNvPr id="45" name="直接箭头连接符 49">
+            <a:extLst>
+              <a:ext uri="{FF2B5EF4-FFF2-40B4-BE49-F238E27FC236}">
+                <a16:creationId xmlns:a16="http://schemas.microsoft.com/office/drawing/2014/main" id="{BD30036D-9A11-4808-8E52-CE3FF0632F19}"/>
+              </a:ext>
+            </a:extLst>
+          </p:cNvPr>
+          <p:cNvCxnSpPr>
+            <a:cxnSpLocks/>
+            <a:stCxn id="33" idx="3"/>
+            <a:endCxn id="39" idx="1"/>
+          </p:cNvCxnSpPr>
+          <p:nvPr/>
+        </p:nvCxnSpPr>
+        <p:spPr>
+          <a:xfrm flipV="1">
+            <a:off x="7240568" y="2600582"/>
+            <a:ext cx="327564" cy="917140"/>
+          </a:xfrm>
+          <a:prstGeom prst="straightConnector1">
+            <a:avLst/>
+          </a:prstGeom>
+          <a:ln w="28575">
+            <a:prstDash val="dash"/>
+            <a:tailEnd type="triangle"/>
+          </a:ln>
+        </p:spPr>
+        <p:style>
+          <a:lnRef idx="1">
+            <a:schemeClr val="accent1"/>
+          </a:lnRef>
+          <a:fillRef idx="0">
+            <a:schemeClr val="accent1"/>
+          </a:fillRef>
+          <a:effectRef idx="0">
+            <a:schemeClr val="accent1"/>
+          </a:effectRef>
+          <a:fontRef idx="minor">
+            <a:schemeClr val="tx1"/>
+          </a:fontRef>
+        </p:style>
+      </p:cxnSp>
+      <p:sp>
+        <p:nvSpPr>
+          <p:cNvPr id="47" name="TextBox 46">
+            <a:extLst>
+              <a:ext uri="{FF2B5EF4-FFF2-40B4-BE49-F238E27FC236}">
+                <a16:creationId xmlns:a16="http://schemas.microsoft.com/office/drawing/2014/main" id="{9E9FBEB2-BA2F-45CF-A0B2-59B6EA667A08}"/>
+              </a:ext>
+            </a:extLst>
+          </p:cNvPr>
+          <p:cNvSpPr txBox="1"/>
+          <p:nvPr/>
+        </p:nvSpPr>
+        <p:spPr>
+          <a:xfrm>
+            <a:off x="8050319" y="3002182"/>
+            <a:ext cx="613255" cy="246221"/>
+          </a:xfrm>
+          <a:prstGeom prst="rect">
+            <a:avLst/>
+          </a:prstGeom>
+          <a:noFill/>
+          <a:ln w="3175">
+            <a:noFill/>
+          </a:ln>
+        </p:spPr>
+        <p:txBody>
+          <a:bodyPr wrap="square" rtlCol="0">
+            <a:spAutoFit/>
+          </a:bodyPr>
+          <a:lstStyle/>
+          <a:p>
+            <a:r>
+              <a:rPr lang="en-SG" sz="1000" b="1" dirty="0"/>
+              <a:t>OR</a:t>
             </a:r>
           </a:p>
         </p:txBody>

</xml_diff>

<commit_message>
Update the work progress.
</commit_message>
<xml_diff>
--- a/doc/progress.pptx
+++ b/doc/progress.pptx
@@ -18,6 +18,8 @@
     <p:sldId id="2076137619" r:id="rId12"/>
     <p:sldId id="2076137620" r:id="rId13"/>
     <p:sldId id="2076137621" r:id="rId14"/>
+    <p:sldId id="2076137622" r:id="rId15"/>
+    <p:sldId id="2076137623" r:id="rId16"/>
   </p:sldIdLst>
   <p:sldSz cx="12192000" cy="6858000"/>
   <p:notesSz cx="6858000" cy="9144000"/>
@@ -273,7 +275,7 @@
           <a:p>
             <a:fld id="{CF1267A5-9448-410E-9905-2BFAF5898020}" type="datetimeFigureOut">
               <a:rPr lang="en-SG" smtClean="0"/>
-              <a:t>9/12/2021</a:t>
+              <a:t>23/12/2021</a:t>
             </a:fld>
             <a:endParaRPr lang="en-SG"/>
           </a:p>
@@ -473,7 +475,7 @@
           <a:p>
             <a:fld id="{CF1267A5-9448-410E-9905-2BFAF5898020}" type="datetimeFigureOut">
               <a:rPr lang="en-SG" smtClean="0"/>
-              <a:t>9/12/2021</a:t>
+              <a:t>23/12/2021</a:t>
             </a:fld>
             <a:endParaRPr lang="en-SG"/>
           </a:p>
@@ -683,7 +685,7 @@
           <a:p>
             <a:fld id="{CF1267A5-9448-410E-9905-2BFAF5898020}" type="datetimeFigureOut">
               <a:rPr lang="en-SG" smtClean="0"/>
-              <a:t>9/12/2021</a:t>
+              <a:t>23/12/2021</a:t>
             </a:fld>
             <a:endParaRPr lang="en-SG"/>
           </a:p>
@@ -2088,7 +2090,7 @@
           <a:p>
             <a:fld id="{CF1267A5-9448-410E-9905-2BFAF5898020}" type="datetimeFigureOut">
               <a:rPr lang="en-SG" smtClean="0"/>
-              <a:t>9/12/2021</a:t>
+              <a:t>23/12/2021</a:t>
             </a:fld>
             <a:endParaRPr lang="en-SG"/>
           </a:p>
@@ -2364,7 +2366,7 @@
           <a:p>
             <a:fld id="{CF1267A5-9448-410E-9905-2BFAF5898020}" type="datetimeFigureOut">
               <a:rPr lang="en-SG" smtClean="0"/>
-              <a:t>9/12/2021</a:t>
+              <a:t>23/12/2021</a:t>
             </a:fld>
             <a:endParaRPr lang="en-SG"/>
           </a:p>
@@ -2632,7 +2634,7 @@
           <a:p>
             <a:fld id="{CF1267A5-9448-410E-9905-2BFAF5898020}" type="datetimeFigureOut">
               <a:rPr lang="en-SG" smtClean="0"/>
-              <a:t>9/12/2021</a:t>
+              <a:t>23/12/2021</a:t>
             </a:fld>
             <a:endParaRPr lang="en-SG"/>
           </a:p>
@@ -3047,7 +3049,7 @@
           <a:p>
             <a:fld id="{CF1267A5-9448-410E-9905-2BFAF5898020}" type="datetimeFigureOut">
               <a:rPr lang="en-SG" smtClean="0"/>
-              <a:t>9/12/2021</a:t>
+              <a:t>23/12/2021</a:t>
             </a:fld>
             <a:endParaRPr lang="en-SG"/>
           </a:p>
@@ -3189,7 +3191,7 @@
           <a:p>
             <a:fld id="{CF1267A5-9448-410E-9905-2BFAF5898020}" type="datetimeFigureOut">
               <a:rPr lang="en-SG" smtClean="0"/>
-              <a:t>9/12/2021</a:t>
+              <a:t>23/12/2021</a:t>
             </a:fld>
             <a:endParaRPr lang="en-SG"/>
           </a:p>
@@ -3302,7 +3304,7 @@
           <a:p>
             <a:fld id="{CF1267A5-9448-410E-9905-2BFAF5898020}" type="datetimeFigureOut">
               <a:rPr lang="en-SG" smtClean="0"/>
-              <a:t>9/12/2021</a:t>
+              <a:t>23/12/2021</a:t>
             </a:fld>
             <a:endParaRPr lang="en-SG"/>
           </a:p>
@@ -3615,7 +3617,7 @@
           <a:p>
             <a:fld id="{CF1267A5-9448-410E-9905-2BFAF5898020}" type="datetimeFigureOut">
               <a:rPr lang="en-SG" smtClean="0"/>
-              <a:t>9/12/2021</a:t>
+              <a:t>23/12/2021</a:t>
             </a:fld>
             <a:endParaRPr lang="en-SG"/>
           </a:p>
@@ -3904,7 +3906,7 @@
           <a:p>
             <a:fld id="{CF1267A5-9448-410E-9905-2BFAF5898020}" type="datetimeFigureOut">
               <a:rPr lang="en-SG" smtClean="0"/>
-              <a:t>9/12/2021</a:t>
+              <a:t>23/12/2021</a:t>
             </a:fld>
             <a:endParaRPr lang="en-SG"/>
           </a:p>
@@ -4147,7 +4149,7 @@
           <a:p>
             <a:fld id="{CF1267A5-9448-410E-9905-2BFAF5898020}" type="datetimeFigureOut">
               <a:rPr lang="en-SG" smtClean="0"/>
-              <a:t>9/12/2021</a:t>
+              <a:t>23/12/2021</a:t>
             </a:fld>
             <a:endParaRPr lang="en-SG"/>
           </a:p>
@@ -11937,6 +11939,2971 @@
     <p:extLst>
       <p:ext uri="{BB962C8B-B14F-4D97-AF65-F5344CB8AC3E}">
         <p14:creationId xmlns:p14="http://schemas.microsoft.com/office/powerpoint/2010/main" val="1685585662"/>
+      </p:ext>
+    </p:extLst>
+  </p:cSld>
+  <p:clrMapOvr>
+    <a:masterClrMapping/>
+  </p:clrMapOvr>
+  <p:transition/>
+</p:sld>
+</file>
+
+<file path=ppt/slides/slide14.xml><?xml version="1.0" encoding="utf-8"?>
+<p:sld xmlns:a="http://schemas.openxmlformats.org/drawingml/2006/main" xmlns:r="http://schemas.openxmlformats.org/officeDocument/2006/relationships" xmlns:p="http://schemas.openxmlformats.org/presentationml/2006/main">
+  <p:cSld>
+    <p:spTree>
+      <p:nvGrpSpPr>
+        <p:cNvPr id="1" name=""/>
+        <p:cNvGrpSpPr/>
+        <p:nvPr/>
+      </p:nvGrpSpPr>
+      <p:grpSpPr>
+        <a:xfrm>
+          <a:off x="0" y="0"/>
+          <a:ext cx="0" cy="0"/>
+          <a:chOff x="0" y="0"/>
+          <a:chExt cx="0" cy="0"/>
+        </a:xfrm>
+      </p:grpSpPr>
+      <p:sp>
+        <p:nvSpPr>
+          <p:cNvPr id="2" name="Title 1">
+            <a:extLst>
+              <a:ext uri="{FF2B5EF4-FFF2-40B4-BE49-F238E27FC236}">
+                <a16:creationId xmlns:a16="http://schemas.microsoft.com/office/drawing/2014/main" id="{221A4FF2-258D-5B43-9F67-E984C9974D8C}"/>
+              </a:ext>
+            </a:extLst>
+          </p:cNvPr>
+          <p:cNvSpPr>
+            <a:spLocks noGrp="1"/>
+          </p:cNvSpPr>
+          <p:nvPr>
+            <p:ph type="title"/>
+          </p:nvPr>
+        </p:nvSpPr>
+        <p:spPr>
+          <a:xfrm>
+            <a:off x="379941" y="294104"/>
+            <a:ext cx="10995949" cy="803918"/>
+          </a:xfrm>
+        </p:spPr>
+        <p:txBody>
+          <a:bodyPr/>
+          <a:lstStyle/>
+          <a:p>
+            <a:r>
+              <a:rPr lang="en-GB" dirty="0"/>
+              <a:t>AWS Data Pipeline Integration Plan [23/12/2021]</a:t>
+            </a:r>
+            <a:endParaRPr lang="en-US" dirty="0"/>
+          </a:p>
+        </p:txBody>
+      </p:sp>
+      <p:sp>
+        <p:nvSpPr>
+          <p:cNvPr id="55" name="内容占位符 2">
+            <a:extLst>
+              <a:ext uri="{FF2B5EF4-FFF2-40B4-BE49-F238E27FC236}">
+                <a16:creationId xmlns:a16="http://schemas.microsoft.com/office/drawing/2014/main" id="{6CEE3007-8706-4237-9F22-99B5CF5199A3}"/>
+              </a:ext>
+            </a:extLst>
+          </p:cNvPr>
+          <p:cNvSpPr txBox="1">
+            <a:spLocks/>
+          </p:cNvSpPr>
+          <p:nvPr/>
+        </p:nvSpPr>
+        <p:spPr>
+          <a:xfrm>
+            <a:off x="379941" y="1098022"/>
+            <a:ext cx="11311950" cy="5000937"/>
+          </a:xfrm>
+          <a:prstGeom prst="rect">
+            <a:avLst/>
+          </a:prstGeom>
+        </p:spPr>
+        <p:txBody>
+          <a:bodyPr/>
+          <a:lstStyle>
+            <a:lvl1pPr marL="228600" indent="-228600" algn="l" defTabSz="914400" rtl="0" eaLnBrk="1" latinLnBrk="0" hangingPunct="1">
+              <a:lnSpc>
+                <a:spcPct val="90000"/>
+              </a:lnSpc>
+              <a:spcBef>
+                <a:spcPts val="1000"/>
+              </a:spcBef>
+              <a:buFont typeface="Arial" panose="020B0604020202020204" pitchFamily="34" charset="0"/>
+              <a:buChar char="•"/>
+              <a:defRPr sz="2800" kern="1200">
+                <a:solidFill>
+                  <a:schemeClr val="tx1"/>
+                </a:solidFill>
+                <a:latin typeface="+mn-lt"/>
+                <a:ea typeface="+mn-ea"/>
+                <a:cs typeface="+mn-cs"/>
+              </a:defRPr>
+            </a:lvl1pPr>
+            <a:lvl2pPr marL="685800" indent="-228600" algn="l" defTabSz="914400" rtl="0" eaLnBrk="1" latinLnBrk="0" hangingPunct="1">
+              <a:lnSpc>
+                <a:spcPct val="90000"/>
+              </a:lnSpc>
+              <a:spcBef>
+                <a:spcPts val="500"/>
+              </a:spcBef>
+              <a:buFont typeface="Arial" panose="020B0604020202020204" pitchFamily="34" charset="0"/>
+              <a:buChar char="•"/>
+              <a:defRPr sz="2400" kern="1200">
+                <a:solidFill>
+                  <a:schemeClr val="tx1"/>
+                </a:solidFill>
+                <a:latin typeface="+mn-lt"/>
+                <a:ea typeface="+mn-ea"/>
+                <a:cs typeface="+mn-cs"/>
+              </a:defRPr>
+            </a:lvl2pPr>
+            <a:lvl3pPr marL="1143000" indent="-228600" algn="l" defTabSz="914400" rtl="0" eaLnBrk="1" latinLnBrk="0" hangingPunct="1">
+              <a:lnSpc>
+                <a:spcPct val="90000"/>
+              </a:lnSpc>
+              <a:spcBef>
+                <a:spcPts val="500"/>
+              </a:spcBef>
+              <a:buFont typeface="Arial" panose="020B0604020202020204" pitchFamily="34" charset="0"/>
+              <a:buChar char="•"/>
+              <a:defRPr sz="2000" kern="1200">
+                <a:solidFill>
+                  <a:schemeClr val="tx1"/>
+                </a:solidFill>
+                <a:latin typeface="+mn-lt"/>
+                <a:ea typeface="+mn-ea"/>
+                <a:cs typeface="+mn-cs"/>
+              </a:defRPr>
+            </a:lvl3pPr>
+            <a:lvl4pPr marL="1600200" indent="-228600" algn="l" defTabSz="914400" rtl="0" eaLnBrk="1" latinLnBrk="0" hangingPunct="1">
+              <a:lnSpc>
+                <a:spcPct val="90000"/>
+              </a:lnSpc>
+              <a:spcBef>
+                <a:spcPts val="500"/>
+              </a:spcBef>
+              <a:buFont typeface="Arial" panose="020B0604020202020204" pitchFamily="34" charset="0"/>
+              <a:buChar char="•"/>
+              <a:defRPr sz="1800" kern="1200">
+                <a:solidFill>
+                  <a:schemeClr val="tx1"/>
+                </a:solidFill>
+                <a:latin typeface="+mn-lt"/>
+                <a:ea typeface="+mn-ea"/>
+                <a:cs typeface="+mn-cs"/>
+              </a:defRPr>
+            </a:lvl4pPr>
+            <a:lvl5pPr marL="2057400" indent="-228600" algn="l" defTabSz="914400" rtl="0" eaLnBrk="1" latinLnBrk="0" hangingPunct="1">
+              <a:lnSpc>
+                <a:spcPct val="90000"/>
+              </a:lnSpc>
+              <a:spcBef>
+                <a:spcPts val="500"/>
+              </a:spcBef>
+              <a:buFont typeface="Arial" panose="020B0604020202020204" pitchFamily="34" charset="0"/>
+              <a:buChar char="•"/>
+              <a:defRPr sz="1800" kern="1200">
+                <a:solidFill>
+                  <a:schemeClr val="tx1"/>
+                </a:solidFill>
+                <a:latin typeface="+mn-lt"/>
+                <a:ea typeface="+mn-ea"/>
+                <a:cs typeface="+mn-cs"/>
+              </a:defRPr>
+            </a:lvl5pPr>
+            <a:lvl6pPr marL="2514600" indent="-228600" algn="l" defTabSz="914400" rtl="0" eaLnBrk="1" latinLnBrk="0" hangingPunct="1">
+              <a:lnSpc>
+                <a:spcPct val="90000"/>
+              </a:lnSpc>
+              <a:spcBef>
+                <a:spcPts val="500"/>
+              </a:spcBef>
+              <a:buFont typeface="Arial" panose="020B0604020202020204" pitchFamily="34" charset="0"/>
+              <a:buChar char="•"/>
+              <a:defRPr sz="1800" kern="1200">
+                <a:solidFill>
+                  <a:schemeClr val="tx1"/>
+                </a:solidFill>
+                <a:latin typeface="+mn-lt"/>
+                <a:ea typeface="+mn-ea"/>
+                <a:cs typeface="+mn-cs"/>
+              </a:defRPr>
+            </a:lvl6pPr>
+            <a:lvl7pPr marL="2971800" indent="-228600" algn="l" defTabSz="914400" rtl="0" eaLnBrk="1" latinLnBrk="0" hangingPunct="1">
+              <a:lnSpc>
+                <a:spcPct val="90000"/>
+              </a:lnSpc>
+              <a:spcBef>
+                <a:spcPts val="500"/>
+              </a:spcBef>
+              <a:buFont typeface="Arial" panose="020B0604020202020204" pitchFamily="34" charset="0"/>
+              <a:buChar char="•"/>
+              <a:defRPr sz="1800" kern="1200">
+                <a:solidFill>
+                  <a:schemeClr val="tx1"/>
+                </a:solidFill>
+                <a:latin typeface="+mn-lt"/>
+                <a:ea typeface="+mn-ea"/>
+                <a:cs typeface="+mn-cs"/>
+              </a:defRPr>
+            </a:lvl7pPr>
+            <a:lvl8pPr marL="3429000" indent="-228600" algn="l" defTabSz="914400" rtl="0" eaLnBrk="1" latinLnBrk="0" hangingPunct="1">
+              <a:lnSpc>
+                <a:spcPct val="90000"/>
+              </a:lnSpc>
+              <a:spcBef>
+                <a:spcPts val="500"/>
+              </a:spcBef>
+              <a:buFont typeface="Arial" panose="020B0604020202020204" pitchFamily="34" charset="0"/>
+              <a:buChar char="•"/>
+              <a:defRPr sz="1800" kern="1200">
+                <a:solidFill>
+                  <a:schemeClr val="tx1"/>
+                </a:solidFill>
+                <a:latin typeface="+mn-lt"/>
+                <a:ea typeface="+mn-ea"/>
+                <a:cs typeface="+mn-cs"/>
+              </a:defRPr>
+            </a:lvl8pPr>
+            <a:lvl9pPr marL="3886200" indent="-228600" algn="l" defTabSz="914400" rtl="0" eaLnBrk="1" latinLnBrk="0" hangingPunct="1">
+              <a:lnSpc>
+                <a:spcPct val="90000"/>
+              </a:lnSpc>
+              <a:spcBef>
+                <a:spcPts val="500"/>
+              </a:spcBef>
+              <a:buFont typeface="Arial" panose="020B0604020202020204" pitchFamily="34" charset="0"/>
+              <a:buChar char="•"/>
+              <a:defRPr sz="1800" kern="1200">
+                <a:solidFill>
+                  <a:schemeClr val="tx1"/>
+                </a:solidFill>
+                <a:latin typeface="+mn-lt"/>
+                <a:ea typeface="+mn-ea"/>
+                <a:cs typeface="+mn-cs"/>
+              </a:defRPr>
+            </a:lvl9pPr>
+          </a:lstStyle>
+          <a:p>
+            <a:pPr marL="0" indent="0">
+              <a:buNone/>
+            </a:pPr>
+            <a:endParaRPr lang="en-US" sz="2000" dirty="0">
+              <a:solidFill>
+                <a:srgbClr val="24292F"/>
+              </a:solidFill>
+              <a:latin typeface="-apple-system"/>
+            </a:endParaRPr>
+          </a:p>
+          <a:p>
+            <a:pPr marL="0" indent="0">
+              <a:buNone/>
+            </a:pPr>
+            <a:endParaRPr lang="en-US" sz="2000" b="1" dirty="0">
+              <a:solidFill>
+                <a:srgbClr val="24292F"/>
+              </a:solidFill>
+              <a:latin typeface="-apple-system"/>
+            </a:endParaRPr>
+          </a:p>
+        </p:txBody>
+      </p:sp>
+      <p:pic>
+        <p:nvPicPr>
+          <p:cNvPr id="4" name="Picture 3">
+            <a:extLst>
+              <a:ext uri="{FF2B5EF4-FFF2-40B4-BE49-F238E27FC236}">
+                <a16:creationId xmlns:a16="http://schemas.microsoft.com/office/drawing/2014/main" id="{9354BAAE-3D68-4895-A5B7-D1BA93607603}"/>
+              </a:ext>
+            </a:extLst>
+          </p:cNvPr>
+          <p:cNvPicPr>
+            <a:picLocks noChangeAspect="1"/>
+          </p:cNvPicPr>
+          <p:nvPr/>
+        </p:nvPicPr>
+        <p:blipFill>
+          <a:blip r:embed="rId2"/>
+          <a:stretch>
+            <a:fillRect/>
+          </a:stretch>
+        </p:blipFill>
+        <p:spPr>
+          <a:xfrm>
+            <a:off x="656611" y="1232042"/>
+            <a:ext cx="1078884" cy="1280031"/>
+          </a:xfrm>
+          <a:prstGeom prst="rect">
+            <a:avLst/>
+          </a:prstGeom>
+        </p:spPr>
+      </p:pic>
+      <p:sp>
+        <p:nvSpPr>
+          <p:cNvPr id="9" name="矩形: 圆角 34">
+            <a:extLst>
+              <a:ext uri="{FF2B5EF4-FFF2-40B4-BE49-F238E27FC236}">
+                <a16:creationId xmlns:a16="http://schemas.microsoft.com/office/drawing/2014/main" id="{4D17E8B1-4CD7-4F24-9B68-E9A1E3641416}"/>
+              </a:ext>
+            </a:extLst>
+          </p:cNvPr>
+          <p:cNvSpPr/>
+          <p:nvPr/>
+        </p:nvSpPr>
+        <p:spPr>
+          <a:xfrm>
+            <a:off x="656610" y="3460068"/>
+            <a:ext cx="1848841" cy="401958"/>
+          </a:xfrm>
+          <a:prstGeom prst="roundRect">
+            <a:avLst/>
+          </a:prstGeom>
+        </p:spPr>
+        <p:style>
+          <a:lnRef idx="1">
+            <a:schemeClr val="accent1"/>
+          </a:lnRef>
+          <a:fillRef idx="2">
+            <a:schemeClr val="accent1"/>
+          </a:fillRef>
+          <a:effectRef idx="1">
+            <a:schemeClr val="accent1"/>
+          </a:effectRef>
+          <a:fontRef idx="minor">
+            <a:schemeClr val="dk1"/>
+          </a:fontRef>
+        </p:style>
+        <p:txBody>
+          <a:bodyPr rtlCol="0" anchor="ctr"/>
+          <a:lstStyle>
+            <a:defPPr>
+              <a:defRPr lang="zh-CN"/>
+            </a:defPPr>
+            <a:lvl1pPr marL="0" algn="l" defTabSz="914400" rtl="0" eaLnBrk="1" latinLnBrk="0" hangingPunct="1">
+              <a:defRPr sz="1800" kern="1200">
+                <a:solidFill>
+                  <a:schemeClr val="dk1"/>
+                </a:solidFill>
+                <a:latin typeface="+mn-lt"/>
+                <a:ea typeface="+mn-ea"/>
+                <a:cs typeface="+mn-cs"/>
+              </a:defRPr>
+            </a:lvl1pPr>
+            <a:lvl2pPr marL="457200" algn="l" defTabSz="914400" rtl="0" eaLnBrk="1" latinLnBrk="0" hangingPunct="1">
+              <a:defRPr sz="1800" kern="1200">
+                <a:solidFill>
+                  <a:schemeClr val="dk1"/>
+                </a:solidFill>
+                <a:latin typeface="+mn-lt"/>
+                <a:ea typeface="+mn-ea"/>
+                <a:cs typeface="+mn-cs"/>
+              </a:defRPr>
+            </a:lvl2pPr>
+            <a:lvl3pPr marL="914400" algn="l" defTabSz="914400" rtl="0" eaLnBrk="1" latinLnBrk="0" hangingPunct="1">
+              <a:defRPr sz="1800" kern="1200">
+                <a:solidFill>
+                  <a:schemeClr val="dk1"/>
+                </a:solidFill>
+                <a:latin typeface="+mn-lt"/>
+                <a:ea typeface="+mn-ea"/>
+                <a:cs typeface="+mn-cs"/>
+              </a:defRPr>
+            </a:lvl3pPr>
+            <a:lvl4pPr marL="1371600" algn="l" defTabSz="914400" rtl="0" eaLnBrk="1" latinLnBrk="0" hangingPunct="1">
+              <a:defRPr sz="1800" kern="1200">
+                <a:solidFill>
+                  <a:schemeClr val="dk1"/>
+                </a:solidFill>
+                <a:latin typeface="+mn-lt"/>
+                <a:ea typeface="+mn-ea"/>
+                <a:cs typeface="+mn-cs"/>
+              </a:defRPr>
+            </a:lvl4pPr>
+            <a:lvl5pPr marL="1828800" algn="l" defTabSz="914400" rtl="0" eaLnBrk="1" latinLnBrk="0" hangingPunct="1">
+              <a:defRPr sz="1800" kern="1200">
+                <a:solidFill>
+                  <a:schemeClr val="dk1"/>
+                </a:solidFill>
+                <a:latin typeface="+mn-lt"/>
+                <a:ea typeface="+mn-ea"/>
+                <a:cs typeface="+mn-cs"/>
+              </a:defRPr>
+            </a:lvl5pPr>
+            <a:lvl6pPr marL="2286000" algn="l" defTabSz="914400" rtl="0" eaLnBrk="1" latinLnBrk="0" hangingPunct="1">
+              <a:defRPr sz="1800" kern="1200">
+                <a:solidFill>
+                  <a:schemeClr val="dk1"/>
+                </a:solidFill>
+                <a:latin typeface="+mn-lt"/>
+                <a:ea typeface="+mn-ea"/>
+                <a:cs typeface="+mn-cs"/>
+              </a:defRPr>
+            </a:lvl6pPr>
+            <a:lvl7pPr marL="2743200" algn="l" defTabSz="914400" rtl="0" eaLnBrk="1" latinLnBrk="0" hangingPunct="1">
+              <a:defRPr sz="1800" kern="1200">
+                <a:solidFill>
+                  <a:schemeClr val="dk1"/>
+                </a:solidFill>
+                <a:latin typeface="+mn-lt"/>
+                <a:ea typeface="+mn-ea"/>
+                <a:cs typeface="+mn-cs"/>
+              </a:defRPr>
+            </a:lvl7pPr>
+            <a:lvl8pPr marL="3200400" algn="l" defTabSz="914400" rtl="0" eaLnBrk="1" latinLnBrk="0" hangingPunct="1">
+              <a:defRPr sz="1800" kern="1200">
+                <a:solidFill>
+                  <a:schemeClr val="dk1"/>
+                </a:solidFill>
+                <a:latin typeface="+mn-lt"/>
+                <a:ea typeface="+mn-ea"/>
+                <a:cs typeface="+mn-cs"/>
+              </a:defRPr>
+            </a:lvl8pPr>
+            <a:lvl9pPr marL="3657600" algn="l" defTabSz="914400" rtl="0" eaLnBrk="1" latinLnBrk="0" hangingPunct="1">
+              <a:defRPr sz="1800" kern="1200">
+                <a:solidFill>
+                  <a:schemeClr val="dk1"/>
+                </a:solidFill>
+                <a:latin typeface="+mn-lt"/>
+                <a:ea typeface="+mn-ea"/>
+                <a:cs typeface="+mn-cs"/>
+              </a:defRPr>
+            </a:lvl9pPr>
+          </a:lstStyle>
+          <a:p>
+            <a:r>
+              <a:rPr lang="en-US" sz="1600" b="1" dirty="0">
+                <a:solidFill>
+                  <a:srgbClr val="24292F"/>
+                </a:solidFill>
+                <a:latin typeface="-apple-system"/>
+              </a:rPr>
+              <a:t>Web </a:t>
+            </a:r>
+            <a:r>
+              <a:rPr lang="en-SG" sz="1600" b="1" i="0" dirty="0" err="1">
+                <a:solidFill>
+                  <a:srgbClr val="201F1E"/>
+                </a:solidFill>
+                <a:effectLst/>
+                <a:latin typeface="Calibri" panose="020F0502020204030204" pitchFamily="34" charset="0"/>
+              </a:rPr>
+              <a:t>WebScrapper</a:t>
+            </a:r>
+            <a:r>
+              <a:rPr lang="en-US" sz="1600" b="1" dirty="0">
+                <a:solidFill>
+                  <a:srgbClr val="24292F"/>
+                </a:solidFill>
+                <a:latin typeface="-apple-system"/>
+              </a:rPr>
+              <a:t>  </a:t>
+            </a:r>
+            <a:endParaRPr lang="zh-CN" altLang="en-US" sz="1600" b="1" dirty="0"/>
+          </a:p>
+        </p:txBody>
+      </p:sp>
+      <p:sp>
+        <p:nvSpPr>
+          <p:cNvPr id="10" name="TextBox 9">
+            <a:extLst>
+              <a:ext uri="{FF2B5EF4-FFF2-40B4-BE49-F238E27FC236}">
+                <a16:creationId xmlns:a16="http://schemas.microsoft.com/office/drawing/2014/main" id="{82A9ABA6-11B7-4976-8FEE-5F3BC8C0B437}"/>
+              </a:ext>
+            </a:extLst>
+          </p:cNvPr>
+          <p:cNvSpPr txBox="1"/>
+          <p:nvPr/>
+        </p:nvSpPr>
+        <p:spPr>
+          <a:xfrm>
+            <a:off x="1231507" y="2689085"/>
+            <a:ext cx="1257067" cy="246221"/>
+          </a:xfrm>
+          <a:prstGeom prst="rect">
+            <a:avLst/>
+          </a:prstGeom>
+          <a:noFill/>
+          <a:ln w="3175">
+            <a:noFill/>
+          </a:ln>
+        </p:spPr>
+        <p:txBody>
+          <a:bodyPr wrap="square" rtlCol="0">
+            <a:spAutoFit/>
+          </a:bodyPr>
+          <a:lstStyle/>
+          <a:p>
+            <a:r>
+              <a:rPr lang="en-SG" sz="1000" b="1" dirty="0"/>
+              <a:t>URLs data </a:t>
+            </a:r>
+          </a:p>
+        </p:txBody>
+      </p:sp>
+      <p:cxnSp>
+        <p:nvCxnSpPr>
+          <p:cNvPr id="13" name="直接箭头连接符 49">
+            <a:extLst>
+              <a:ext uri="{FF2B5EF4-FFF2-40B4-BE49-F238E27FC236}">
+                <a16:creationId xmlns:a16="http://schemas.microsoft.com/office/drawing/2014/main" id="{4237AAE1-302D-49AA-878D-EB7C2C7466D3}"/>
+              </a:ext>
+            </a:extLst>
+          </p:cNvPr>
+          <p:cNvCxnSpPr>
+            <a:cxnSpLocks/>
+          </p:cNvCxnSpPr>
+          <p:nvPr/>
+        </p:nvCxnSpPr>
+        <p:spPr>
+          <a:xfrm>
+            <a:off x="1231507" y="2512073"/>
+            <a:ext cx="0" cy="843775"/>
+          </a:xfrm>
+          <a:prstGeom prst="straightConnector1">
+            <a:avLst/>
+          </a:prstGeom>
+          <a:ln w="28575">
+            <a:prstDash val="dash"/>
+            <a:tailEnd type="triangle"/>
+          </a:ln>
+        </p:spPr>
+        <p:style>
+          <a:lnRef idx="1">
+            <a:schemeClr val="accent1"/>
+          </a:lnRef>
+          <a:fillRef idx="0">
+            <a:schemeClr val="accent1"/>
+          </a:fillRef>
+          <a:effectRef idx="0">
+            <a:schemeClr val="accent1"/>
+          </a:effectRef>
+          <a:fontRef idx="minor">
+            <a:schemeClr val="tx1"/>
+          </a:fontRef>
+        </p:style>
+      </p:cxnSp>
+      <p:cxnSp>
+        <p:nvCxnSpPr>
+          <p:cNvPr id="15" name="直接箭头连接符 49">
+            <a:extLst>
+              <a:ext uri="{FF2B5EF4-FFF2-40B4-BE49-F238E27FC236}">
+                <a16:creationId xmlns:a16="http://schemas.microsoft.com/office/drawing/2014/main" id="{395FA99E-7A03-412B-A86F-FB7E6BDB7C40}"/>
+              </a:ext>
+            </a:extLst>
+          </p:cNvPr>
+          <p:cNvCxnSpPr>
+            <a:cxnSpLocks/>
+          </p:cNvCxnSpPr>
+          <p:nvPr/>
+        </p:nvCxnSpPr>
+        <p:spPr>
+          <a:xfrm>
+            <a:off x="1569139" y="3862026"/>
+            <a:ext cx="0" cy="843775"/>
+          </a:xfrm>
+          <a:prstGeom prst="straightConnector1">
+            <a:avLst/>
+          </a:prstGeom>
+          <a:ln w="28575">
+            <a:prstDash val="dash"/>
+            <a:tailEnd type="triangle"/>
+          </a:ln>
+        </p:spPr>
+        <p:style>
+          <a:lnRef idx="1">
+            <a:schemeClr val="accent1"/>
+          </a:lnRef>
+          <a:fillRef idx="0">
+            <a:schemeClr val="accent1"/>
+          </a:fillRef>
+          <a:effectRef idx="0">
+            <a:schemeClr val="accent1"/>
+          </a:effectRef>
+          <a:fontRef idx="minor">
+            <a:schemeClr val="tx1"/>
+          </a:fontRef>
+        </p:style>
+      </p:cxnSp>
+      <p:sp>
+        <p:nvSpPr>
+          <p:cNvPr id="16" name="TextBox 15">
+            <a:extLst>
+              <a:ext uri="{FF2B5EF4-FFF2-40B4-BE49-F238E27FC236}">
+                <a16:creationId xmlns:a16="http://schemas.microsoft.com/office/drawing/2014/main" id="{136C787E-3475-4739-92A2-71505BB66AAA}"/>
+              </a:ext>
+            </a:extLst>
+          </p:cNvPr>
+          <p:cNvSpPr txBox="1"/>
+          <p:nvPr/>
+        </p:nvSpPr>
+        <p:spPr>
+          <a:xfrm>
+            <a:off x="1581030" y="4140567"/>
+            <a:ext cx="1257067" cy="400110"/>
+          </a:xfrm>
+          <a:prstGeom prst="rect">
+            <a:avLst/>
+          </a:prstGeom>
+          <a:noFill/>
+          <a:ln w="3175">
+            <a:noFill/>
+          </a:ln>
+        </p:spPr>
+        <p:txBody>
+          <a:bodyPr wrap="square" rtlCol="0">
+            <a:spAutoFit/>
+          </a:bodyPr>
+          <a:lstStyle/>
+          <a:p>
+            <a:r>
+              <a:rPr lang="en-SG" sz="1000" b="1" dirty="0"/>
+              <a:t>Web components data.</a:t>
+            </a:r>
+          </a:p>
+        </p:txBody>
+      </p:sp>
+      <p:sp>
+        <p:nvSpPr>
+          <p:cNvPr id="17" name="矩形: 圆角 34">
+            <a:extLst>
+              <a:ext uri="{FF2B5EF4-FFF2-40B4-BE49-F238E27FC236}">
+                <a16:creationId xmlns:a16="http://schemas.microsoft.com/office/drawing/2014/main" id="{007E515B-3D16-43AC-A160-802694575582}"/>
+              </a:ext>
+            </a:extLst>
+          </p:cNvPr>
+          <p:cNvSpPr/>
+          <p:nvPr/>
+        </p:nvSpPr>
+        <p:spPr>
+          <a:xfrm>
+            <a:off x="1182513" y="4725831"/>
+            <a:ext cx="6132687" cy="296575"/>
+          </a:xfrm>
+          <a:prstGeom prst="roundRect">
+            <a:avLst/>
+          </a:prstGeom>
+          <a:solidFill>
+            <a:schemeClr val="bg2">
+              <a:lumMod val="90000"/>
+            </a:schemeClr>
+          </a:solidFill>
+        </p:spPr>
+        <p:style>
+          <a:lnRef idx="1">
+            <a:schemeClr val="accent1"/>
+          </a:lnRef>
+          <a:fillRef idx="2">
+            <a:schemeClr val="accent1"/>
+          </a:fillRef>
+          <a:effectRef idx="1">
+            <a:schemeClr val="accent1"/>
+          </a:effectRef>
+          <a:fontRef idx="minor">
+            <a:schemeClr val="dk1"/>
+          </a:fontRef>
+        </p:style>
+        <p:txBody>
+          <a:bodyPr rtlCol="0" anchor="ctr"/>
+          <a:lstStyle>
+            <a:defPPr>
+              <a:defRPr lang="zh-CN"/>
+            </a:defPPr>
+            <a:lvl1pPr marL="0" algn="l" defTabSz="914400" rtl="0" eaLnBrk="1" latinLnBrk="0" hangingPunct="1">
+              <a:defRPr sz="1800" kern="1200">
+                <a:solidFill>
+                  <a:schemeClr val="dk1"/>
+                </a:solidFill>
+                <a:latin typeface="+mn-lt"/>
+                <a:ea typeface="+mn-ea"/>
+                <a:cs typeface="+mn-cs"/>
+              </a:defRPr>
+            </a:lvl1pPr>
+            <a:lvl2pPr marL="457200" algn="l" defTabSz="914400" rtl="0" eaLnBrk="1" latinLnBrk="0" hangingPunct="1">
+              <a:defRPr sz="1800" kern="1200">
+                <a:solidFill>
+                  <a:schemeClr val="dk1"/>
+                </a:solidFill>
+                <a:latin typeface="+mn-lt"/>
+                <a:ea typeface="+mn-ea"/>
+                <a:cs typeface="+mn-cs"/>
+              </a:defRPr>
+            </a:lvl2pPr>
+            <a:lvl3pPr marL="914400" algn="l" defTabSz="914400" rtl="0" eaLnBrk="1" latinLnBrk="0" hangingPunct="1">
+              <a:defRPr sz="1800" kern="1200">
+                <a:solidFill>
+                  <a:schemeClr val="dk1"/>
+                </a:solidFill>
+                <a:latin typeface="+mn-lt"/>
+                <a:ea typeface="+mn-ea"/>
+                <a:cs typeface="+mn-cs"/>
+              </a:defRPr>
+            </a:lvl3pPr>
+            <a:lvl4pPr marL="1371600" algn="l" defTabSz="914400" rtl="0" eaLnBrk="1" latinLnBrk="0" hangingPunct="1">
+              <a:defRPr sz="1800" kern="1200">
+                <a:solidFill>
+                  <a:schemeClr val="dk1"/>
+                </a:solidFill>
+                <a:latin typeface="+mn-lt"/>
+                <a:ea typeface="+mn-ea"/>
+                <a:cs typeface="+mn-cs"/>
+              </a:defRPr>
+            </a:lvl4pPr>
+            <a:lvl5pPr marL="1828800" algn="l" defTabSz="914400" rtl="0" eaLnBrk="1" latinLnBrk="0" hangingPunct="1">
+              <a:defRPr sz="1800" kern="1200">
+                <a:solidFill>
+                  <a:schemeClr val="dk1"/>
+                </a:solidFill>
+                <a:latin typeface="+mn-lt"/>
+                <a:ea typeface="+mn-ea"/>
+                <a:cs typeface="+mn-cs"/>
+              </a:defRPr>
+            </a:lvl5pPr>
+            <a:lvl6pPr marL="2286000" algn="l" defTabSz="914400" rtl="0" eaLnBrk="1" latinLnBrk="0" hangingPunct="1">
+              <a:defRPr sz="1800" kern="1200">
+                <a:solidFill>
+                  <a:schemeClr val="dk1"/>
+                </a:solidFill>
+                <a:latin typeface="+mn-lt"/>
+                <a:ea typeface="+mn-ea"/>
+                <a:cs typeface="+mn-cs"/>
+              </a:defRPr>
+            </a:lvl6pPr>
+            <a:lvl7pPr marL="2743200" algn="l" defTabSz="914400" rtl="0" eaLnBrk="1" latinLnBrk="0" hangingPunct="1">
+              <a:defRPr sz="1800" kern="1200">
+                <a:solidFill>
+                  <a:schemeClr val="dk1"/>
+                </a:solidFill>
+                <a:latin typeface="+mn-lt"/>
+                <a:ea typeface="+mn-ea"/>
+                <a:cs typeface="+mn-cs"/>
+              </a:defRPr>
+            </a:lvl7pPr>
+            <a:lvl8pPr marL="3200400" algn="l" defTabSz="914400" rtl="0" eaLnBrk="1" latinLnBrk="0" hangingPunct="1">
+              <a:defRPr sz="1800" kern="1200">
+                <a:solidFill>
+                  <a:schemeClr val="dk1"/>
+                </a:solidFill>
+                <a:latin typeface="+mn-lt"/>
+                <a:ea typeface="+mn-ea"/>
+                <a:cs typeface="+mn-cs"/>
+              </a:defRPr>
+            </a:lvl8pPr>
+            <a:lvl9pPr marL="3657600" algn="l" defTabSz="914400" rtl="0" eaLnBrk="1" latinLnBrk="0" hangingPunct="1">
+              <a:defRPr sz="1800" kern="1200">
+                <a:solidFill>
+                  <a:schemeClr val="dk1"/>
+                </a:solidFill>
+                <a:latin typeface="+mn-lt"/>
+                <a:ea typeface="+mn-ea"/>
+                <a:cs typeface="+mn-cs"/>
+              </a:defRPr>
+            </a:lvl9pPr>
+          </a:lstStyle>
+          <a:p>
+            <a:pPr algn="ctr"/>
+            <a:r>
+              <a:rPr lang="en-SG" altLang="zh-CN" sz="1600" b="1" dirty="0" err="1"/>
+              <a:t>ceph</a:t>
+            </a:r>
+            <a:r>
+              <a:rPr lang="en-SG" altLang="zh-CN" sz="1600" b="1" dirty="0"/>
+              <a:t> </a:t>
+            </a:r>
+            <a:endParaRPr lang="zh-CN" altLang="en-US" sz="1600" b="1" dirty="0"/>
+          </a:p>
+        </p:txBody>
+      </p:sp>
+      <p:cxnSp>
+        <p:nvCxnSpPr>
+          <p:cNvPr id="18" name="直接箭头连接符 49">
+            <a:extLst>
+              <a:ext uri="{FF2B5EF4-FFF2-40B4-BE49-F238E27FC236}">
+                <a16:creationId xmlns:a16="http://schemas.microsoft.com/office/drawing/2014/main" id="{6C4ED29D-E51E-4CE7-9C3F-31115896E15E}"/>
+              </a:ext>
+            </a:extLst>
+          </p:cNvPr>
+          <p:cNvCxnSpPr>
+            <a:cxnSpLocks/>
+          </p:cNvCxnSpPr>
+          <p:nvPr/>
+        </p:nvCxnSpPr>
+        <p:spPr>
+          <a:xfrm flipV="1">
+            <a:off x="3408835" y="3862025"/>
+            <a:ext cx="1" cy="843776"/>
+          </a:xfrm>
+          <a:prstGeom prst="straightConnector1">
+            <a:avLst/>
+          </a:prstGeom>
+          <a:ln w="28575">
+            <a:solidFill>
+              <a:srgbClr val="00B050"/>
+            </a:solidFill>
+            <a:prstDash val="dash"/>
+            <a:tailEnd type="triangle"/>
+          </a:ln>
+        </p:spPr>
+        <p:style>
+          <a:lnRef idx="1">
+            <a:schemeClr val="accent1"/>
+          </a:lnRef>
+          <a:fillRef idx="0">
+            <a:schemeClr val="accent1"/>
+          </a:fillRef>
+          <a:effectRef idx="0">
+            <a:schemeClr val="accent1"/>
+          </a:effectRef>
+          <a:fontRef idx="minor">
+            <a:schemeClr val="tx1"/>
+          </a:fontRef>
+        </p:style>
+      </p:cxnSp>
+      <p:sp>
+        <p:nvSpPr>
+          <p:cNvPr id="21" name="TextBox 20">
+            <a:extLst>
+              <a:ext uri="{FF2B5EF4-FFF2-40B4-BE49-F238E27FC236}">
+                <a16:creationId xmlns:a16="http://schemas.microsoft.com/office/drawing/2014/main" id="{6EF27B36-1D29-47B1-993B-0755A3126727}"/>
+              </a:ext>
+            </a:extLst>
+          </p:cNvPr>
+          <p:cNvSpPr txBox="1"/>
+          <p:nvPr/>
+        </p:nvSpPr>
+        <p:spPr>
+          <a:xfrm>
+            <a:off x="3408835" y="4091487"/>
+            <a:ext cx="1257067" cy="400110"/>
+          </a:xfrm>
+          <a:prstGeom prst="rect">
+            <a:avLst/>
+          </a:prstGeom>
+          <a:noFill/>
+          <a:ln w="3175">
+            <a:noFill/>
+          </a:ln>
+        </p:spPr>
+        <p:txBody>
+          <a:bodyPr wrap="square" rtlCol="0">
+            <a:spAutoFit/>
+          </a:bodyPr>
+          <a:lstStyle/>
+          <a:p>
+            <a:r>
+              <a:rPr lang="en-US" sz="1000" b="1" dirty="0"/>
+              <a:t>Page screen shot, logo image, </a:t>
+            </a:r>
+            <a:r>
+              <a:rPr lang="en-US" sz="1000" b="1" dirty="0" err="1"/>
+              <a:t>url</a:t>
+            </a:r>
+            <a:endParaRPr lang="en-SG" sz="1000" b="1" dirty="0"/>
+          </a:p>
+        </p:txBody>
+      </p:sp>
+      <p:sp>
+        <p:nvSpPr>
+          <p:cNvPr id="22" name="矩形: 圆角 34">
+            <a:extLst>
+              <a:ext uri="{FF2B5EF4-FFF2-40B4-BE49-F238E27FC236}">
+                <a16:creationId xmlns:a16="http://schemas.microsoft.com/office/drawing/2014/main" id="{2C3D80D7-9CC5-4F03-9472-AE1398151E22}"/>
+              </a:ext>
+            </a:extLst>
+          </p:cNvPr>
+          <p:cNvSpPr/>
+          <p:nvPr/>
+        </p:nvSpPr>
+        <p:spPr>
+          <a:xfrm>
+            <a:off x="2930419" y="3455295"/>
+            <a:ext cx="1431270" cy="401958"/>
+          </a:xfrm>
+          <a:prstGeom prst="roundRect">
+            <a:avLst/>
+          </a:prstGeom>
+        </p:spPr>
+        <p:style>
+          <a:lnRef idx="1">
+            <a:schemeClr val="accent1"/>
+          </a:lnRef>
+          <a:fillRef idx="2">
+            <a:schemeClr val="accent1"/>
+          </a:fillRef>
+          <a:effectRef idx="1">
+            <a:schemeClr val="accent1"/>
+          </a:effectRef>
+          <a:fontRef idx="minor">
+            <a:schemeClr val="dk1"/>
+          </a:fontRef>
+        </p:style>
+        <p:txBody>
+          <a:bodyPr rtlCol="0" anchor="ctr"/>
+          <a:lstStyle>
+            <a:defPPr>
+              <a:defRPr lang="zh-CN"/>
+            </a:defPPr>
+            <a:lvl1pPr marL="0" algn="l" defTabSz="914400" rtl="0" eaLnBrk="1" latinLnBrk="0" hangingPunct="1">
+              <a:defRPr sz="1800" kern="1200">
+                <a:solidFill>
+                  <a:schemeClr val="dk1"/>
+                </a:solidFill>
+                <a:latin typeface="+mn-lt"/>
+                <a:ea typeface="+mn-ea"/>
+                <a:cs typeface="+mn-cs"/>
+              </a:defRPr>
+            </a:lvl1pPr>
+            <a:lvl2pPr marL="457200" algn="l" defTabSz="914400" rtl="0" eaLnBrk="1" latinLnBrk="0" hangingPunct="1">
+              <a:defRPr sz="1800" kern="1200">
+                <a:solidFill>
+                  <a:schemeClr val="dk1"/>
+                </a:solidFill>
+                <a:latin typeface="+mn-lt"/>
+                <a:ea typeface="+mn-ea"/>
+                <a:cs typeface="+mn-cs"/>
+              </a:defRPr>
+            </a:lvl2pPr>
+            <a:lvl3pPr marL="914400" algn="l" defTabSz="914400" rtl="0" eaLnBrk="1" latinLnBrk="0" hangingPunct="1">
+              <a:defRPr sz="1800" kern="1200">
+                <a:solidFill>
+                  <a:schemeClr val="dk1"/>
+                </a:solidFill>
+                <a:latin typeface="+mn-lt"/>
+                <a:ea typeface="+mn-ea"/>
+                <a:cs typeface="+mn-cs"/>
+              </a:defRPr>
+            </a:lvl3pPr>
+            <a:lvl4pPr marL="1371600" algn="l" defTabSz="914400" rtl="0" eaLnBrk="1" latinLnBrk="0" hangingPunct="1">
+              <a:defRPr sz="1800" kern="1200">
+                <a:solidFill>
+                  <a:schemeClr val="dk1"/>
+                </a:solidFill>
+                <a:latin typeface="+mn-lt"/>
+                <a:ea typeface="+mn-ea"/>
+                <a:cs typeface="+mn-cs"/>
+              </a:defRPr>
+            </a:lvl4pPr>
+            <a:lvl5pPr marL="1828800" algn="l" defTabSz="914400" rtl="0" eaLnBrk="1" latinLnBrk="0" hangingPunct="1">
+              <a:defRPr sz="1800" kern="1200">
+                <a:solidFill>
+                  <a:schemeClr val="dk1"/>
+                </a:solidFill>
+                <a:latin typeface="+mn-lt"/>
+                <a:ea typeface="+mn-ea"/>
+                <a:cs typeface="+mn-cs"/>
+              </a:defRPr>
+            </a:lvl5pPr>
+            <a:lvl6pPr marL="2286000" algn="l" defTabSz="914400" rtl="0" eaLnBrk="1" latinLnBrk="0" hangingPunct="1">
+              <a:defRPr sz="1800" kern="1200">
+                <a:solidFill>
+                  <a:schemeClr val="dk1"/>
+                </a:solidFill>
+                <a:latin typeface="+mn-lt"/>
+                <a:ea typeface="+mn-ea"/>
+                <a:cs typeface="+mn-cs"/>
+              </a:defRPr>
+            </a:lvl6pPr>
+            <a:lvl7pPr marL="2743200" algn="l" defTabSz="914400" rtl="0" eaLnBrk="1" latinLnBrk="0" hangingPunct="1">
+              <a:defRPr sz="1800" kern="1200">
+                <a:solidFill>
+                  <a:schemeClr val="dk1"/>
+                </a:solidFill>
+                <a:latin typeface="+mn-lt"/>
+                <a:ea typeface="+mn-ea"/>
+                <a:cs typeface="+mn-cs"/>
+              </a:defRPr>
+            </a:lvl7pPr>
+            <a:lvl8pPr marL="3200400" algn="l" defTabSz="914400" rtl="0" eaLnBrk="1" latinLnBrk="0" hangingPunct="1">
+              <a:defRPr sz="1800" kern="1200">
+                <a:solidFill>
+                  <a:schemeClr val="dk1"/>
+                </a:solidFill>
+                <a:latin typeface="+mn-lt"/>
+                <a:ea typeface="+mn-ea"/>
+                <a:cs typeface="+mn-cs"/>
+              </a:defRPr>
+            </a:lvl8pPr>
+            <a:lvl9pPr marL="3657600" algn="l" defTabSz="914400" rtl="0" eaLnBrk="1" latinLnBrk="0" hangingPunct="1">
+              <a:defRPr sz="1800" kern="1200">
+                <a:solidFill>
+                  <a:schemeClr val="dk1"/>
+                </a:solidFill>
+                <a:latin typeface="+mn-lt"/>
+                <a:ea typeface="+mn-ea"/>
+                <a:cs typeface="+mn-cs"/>
+              </a:defRPr>
+            </a:lvl9pPr>
+          </a:lstStyle>
+          <a:p>
+            <a:r>
+              <a:rPr lang="en-SG" sz="1600" b="1" dirty="0" err="1">
+                <a:solidFill>
+                  <a:srgbClr val="201F1E"/>
+                </a:solidFill>
+                <a:latin typeface="Calibri" panose="020F0502020204030204" pitchFamily="34" charset="0"/>
+              </a:rPr>
+              <a:t>PhishingPedia</a:t>
+            </a:r>
+            <a:r>
+              <a:rPr lang="en-US" sz="1600" b="1" dirty="0">
+                <a:solidFill>
+                  <a:srgbClr val="24292F"/>
+                </a:solidFill>
+                <a:latin typeface="-apple-system"/>
+              </a:rPr>
+              <a:t>  </a:t>
+            </a:r>
+            <a:endParaRPr lang="zh-CN" altLang="en-US" sz="1600" b="1" dirty="0"/>
+          </a:p>
+        </p:txBody>
+      </p:sp>
+      <p:cxnSp>
+        <p:nvCxnSpPr>
+          <p:cNvPr id="23" name="直接箭头连接符 49">
+            <a:extLst>
+              <a:ext uri="{FF2B5EF4-FFF2-40B4-BE49-F238E27FC236}">
+                <a16:creationId xmlns:a16="http://schemas.microsoft.com/office/drawing/2014/main" id="{BD84A99B-688F-494B-8A8F-7B76F2D28FB3}"/>
+              </a:ext>
+            </a:extLst>
+          </p:cNvPr>
+          <p:cNvCxnSpPr>
+            <a:cxnSpLocks/>
+          </p:cNvCxnSpPr>
+          <p:nvPr/>
+        </p:nvCxnSpPr>
+        <p:spPr>
+          <a:xfrm flipH="1" flipV="1">
+            <a:off x="1783959" y="2132169"/>
+            <a:ext cx="1604188" cy="1296834"/>
+          </a:xfrm>
+          <a:prstGeom prst="straightConnector1">
+            <a:avLst/>
+          </a:prstGeom>
+          <a:ln w="28575">
+            <a:solidFill>
+              <a:srgbClr val="00B050"/>
+            </a:solidFill>
+            <a:prstDash val="dash"/>
+            <a:tailEnd type="triangle"/>
+          </a:ln>
+        </p:spPr>
+        <p:style>
+          <a:lnRef idx="1">
+            <a:schemeClr val="accent1"/>
+          </a:lnRef>
+          <a:fillRef idx="0">
+            <a:schemeClr val="accent1"/>
+          </a:fillRef>
+          <a:effectRef idx="0">
+            <a:schemeClr val="accent1"/>
+          </a:effectRef>
+          <a:fontRef idx="minor">
+            <a:schemeClr val="tx1"/>
+          </a:fontRef>
+        </p:style>
+      </p:cxnSp>
+      <p:sp>
+        <p:nvSpPr>
+          <p:cNvPr id="28" name="TextBox 27">
+            <a:extLst>
+              <a:ext uri="{FF2B5EF4-FFF2-40B4-BE49-F238E27FC236}">
+                <a16:creationId xmlns:a16="http://schemas.microsoft.com/office/drawing/2014/main" id="{B6EA612C-5BB3-4EA9-AA30-385ABB47AF91}"/>
+              </a:ext>
+            </a:extLst>
+          </p:cNvPr>
+          <p:cNvSpPr txBox="1"/>
+          <p:nvPr/>
+        </p:nvSpPr>
+        <p:spPr>
+          <a:xfrm>
+            <a:off x="2581248" y="2853292"/>
+            <a:ext cx="1257067" cy="246221"/>
+          </a:xfrm>
+          <a:prstGeom prst="rect">
+            <a:avLst/>
+          </a:prstGeom>
+          <a:noFill/>
+          <a:ln w="3175">
+            <a:noFill/>
+          </a:ln>
+        </p:spPr>
+        <p:txBody>
+          <a:bodyPr wrap="square" rtlCol="0">
+            <a:spAutoFit/>
+          </a:bodyPr>
+          <a:lstStyle/>
+          <a:p>
+            <a:r>
+              <a:rPr lang="en-SG" sz="1000" b="1" dirty="0"/>
+              <a:t>Analysis result </a:t>
+            </a:r>
+          </a:p>
+        </p:txBody>
+      </p:sp>
+      <p:sp>
+        <p:nvSpPr>
+          <p:cNvPr id="29" name="矩形: 圆角 34">
+            <a:extLst>
+              <a:ext uri="{FF2B5EF4-FFF2-40B4-BE49-F238E27FC236}">
+                <a16:creationId xmlns:a16="http://schemas.microsoft.com/office/drawing/2014/main" id="{CD426C47-4A96-403C-A8F0-13CDCD267D84}"/>
+              </a:ext>
+            </a:extLst>
+          </p:cNvPr>
+          <p:cNvSpPr/>
+          <p:nvPr/>
+        </p:nvSpPr>
+        <p:spPr>
+          <a:xfrm>
+            <a:off x="4914140" y="3429000"/>
+            <a:ext cx="2327907" cy="457403"/>
+          </a:xfrm>
+          <a:prstGeom prst="roundRect">
+            <a:avLst/>
+          </a:prstGeom>
+        </p:spPr>
+        <p:style>
+          <a:lnRef idx="1">
+            <a:schemeClr val="accent1"/>
+          </a:lnRef>
+          <a:fillRef idx="2">
+            <a:schemeClr val="accent1"/>
+          </a:fillRef>
+          <a:effectRef idx="1">
+            <a:schemeClr val="accent1"/>
+          </a:effectRef>
+          <a:fontRef idx="minor">
+            <a:schemeClr val="dk1"/>
+          </a:fontRef>
+        </p:style>
+        <p:txBody>
+          <a:bodyPr rtlCol="0" anchor="ctr"/>
+          <a:lstStyle>
+            <a:defPPr>
+              <a:defRPr lang="zh-CN"/>
+            </a:defPPr>
+            <a:lvl1pPr marL="0" algn="l" defTabSz="914400" rtl="0" eaLnBrk="1" latinLnBrk="0" hangingPunct="1">
+              <a:defRPr sz="1800" kern="1200">
+                <a:solidFill>
+                  <a:schemeClr val="dk1"/>
+                </a:solidFill>
+                <a:latin typeface="+mn-lt"/>
+                <a:ea typeface="+mn-ea"/>
+                <a:cs typeface="+mn-cs"/>
+              </a:defRPr>
+            </a:lvl1pPr>
+            <a:lvl2pPr marL="457200" algn="l" defTabSz="914400" rtl="0" eaLnBrk="1" latinLnBrk="0" hangingPunct="1">
+              <a:defRPr sz="1800" kern="1200">
+                <a:solidFill>
+                  <a:schemeClr val="dk1"/>
+                </a:solidFill>
+                <a:latin typeface="+mn-lt"/>
+                <a:ea typeface="+mn-ea"/>
+                <a:cs typeface="+mn-cs"/>
+              </a:defRPr>
+            </a:lvl2pPr>
+            <a:lvl3pPr marL="914400" algn="l" defTabSz="914400" rtl="0" eaLnBrk="1" latinLnBrk="0" hangingPunct="1">
+              <a:defRPr sz="1800" kern="1200">
+                <a:solidFill>
+                  <a:schemeClr val="dk1"/>
+                </a:solidFill>
+                <a:latin typeface="+mn-lt"/>
+                <a:ea typeface="+mn-ea"/>
+                <a:cs typeface="+mn-cs"/>
+              </a:defRPr>
+            </a:lvl3pPr>
+            <a:lvl4pPr marL="1371600" algn="l" defTabSz="914400" rtl="0" eaLnBrk="1" latinLnBrk="0" hangingPunct="1">
+              <a:defRPr sz="1800" kern="1200">
+                <a:solidFill>
+                  <a:schemeClr val="dk1"/>
+                </a:solidFill>
+                <a:latin typeface="+mn-lt"/>
+                <a:ea typeface="+mn-ea"/>
+                <a:cs typeface="+mn-cs"/>
+              </a:defRPr>
+            </a:lvl4pPr>
+            <a:lvl5pPr marL="1828800" algn="l" defTabSz="914400" rtl="0" eaLnBrk="1" latinLnBrk="0" hangingPunct="1">
+              <a:defRPr sz="1800" kern="1200">
+                <a:solidFill>
+                  <a:schemeClr val="dk1"/>
+                </a:solidFill>
+                <a:latin typeface="+mn-lt"/>
+                <a:ea typeface="+mn-ea"/>
+                <a:cs typeface="+mn-cs"/>
+              </a:defRPr>
+            </a:lvl5pPr>
+            <a:lvl6pPr marL="2286000" algn="l" defTabSz="914400" rtl="0" eaLnBrk="1" latinLnBrk="0" hangingPunct="1">
+              <a:defRPr sz="1800" kern="1200">
+                <a:solidFill>
+                  <a:schemeClr val="dk1"/>
+                </a:solidFill>
+                <a:latin typeface="+mn-lt"/>
+                <a:ea typeface="+mn-ea"/>
+                <a:cs typeface="+mn-cs"/>
+              </a:defRPr>
+            </a:lvl6pPr>
+            <a:lvl7pPr marL="2743200" algn="l" defTabSz="914400" rtl="0" eaLnBrk="1" latinLnBrk="0" hangingPunct="1">
+              <a:defRPr sz="1800" kern="1200">
+                <a:solidFill>
+                  <a:schemeClr val="dk1"/>
+                </a:solidFill>
+                <a:latin typeface="+mn-lt"/>
+                <a:ea typeface="+mn-ea"/>
+                <a:cs typeface="+mn-cs"/>
+              </a:defRPr>
+            </a:lvl7pPr>
+            <a:lvl8pPr marL="3200400" algn="l" defTabSz="914400" rtl="0" eaLnBrk="1" latinLnBrk="0" hangingPunct="1">
+              <a:defRPr sz="1800" kern="1200">
+                <a:solidFill>
+                  <a:schemeClr val="dk1"/>
+                </a:solidFill>
+                <a:latin typeface="+mn-lt"/>
+                <a:ea typeface="+mn-ea"/>
+                <a:cs typeface="+mn-cs"/>
+              </a:defRPr>
+            </a:lvl8pPr>
+            <a:lvl9pPr marL="3657600" algn="l" defTabSz="914400" rtl="0" eaLnBrk="1" latinLnBrk="0" hangingPunct="1">
+              <a:defRPr sz="1800" kern="1200">
+                <a:solidFill>
+                  <a:schemeClr val="dk1"/>
+                </a:solidFill>
+                <a:latin typeface="+mn-lt"/>
+                <a:ea typeface="+mn-ea"/>
+                <a:cs typeface="+mn-cs"/>
+              </a:defRPr>
+            </a:lvl9pPr>
+          </a:lstStyle>
+          <a:p>
+            <a:r>
+              <a:rPr lang="en-SG" sz="1600" b="1" dirty="0">
+                <a:solidFill>
+                  <a:srgbClr val="201F1E"/>
+                </a:solidFill>
+                <a:latin typeface="Calibri" panose="020F0502020204030204" pitchFamily="34" charset="0"/>
+              </a:rPr>
+              <a:t>Randy’s AI/ML phishing detection module. </a:t>
+            </a:r>
+            <a:endParaRPr lang="zh-CN" altLang="en-US" sz="1600" b="1" dirty="0"/>
+          </a:p>
+        </p:txBody>
+      </p:sp>
+      <p:cxnSp>
+        <p:nvCxnSpPr>
+          <p:cNvPr id="30" name="直接箭头连接符 49">
+            <a:extLst>
+              <a:ext uri="{FF2B5EF4-FFF2-40B4-BE49-F238E27FC236}">
+                <a16:creationId xmlns:a16="http://schemas.microsoft.com/office/drawing/2014/main" id="{2CAE13F4-2C04-4FA1-8F41-66D4C85B3DB3}"/>
+              </a:ext>
+            </a:extLst>
+          </p:cNvPr>
+          <p:cNvCxnSpPr>
+            <a:cxnSpLocks/>
+          </p:cNvCxnSpPr>
+          <p:nvPr/>
+        </p:nvCxnSpPr>
+        <p:spPr>
+          <a:xfrm flipV="1">
+            <a:off x="5647120" y="3857253"/>
+            <a:ext cx="1" cy="843776"/>
+          </a:xfrm>
+          <a:prstGeom prst="straightConnector1">
+            <a:avLst/>
+          </a:prstGeom>
+          <a:ln w="28575">
+            <a:solidFill>
+              <a:srgbClr val="00B050"/>
+            </a:solidFill>
+            <a:prstDash val="dash"/>
+            <a:tailEnd type="triangle"/>
+          </a:ln>
+        </p:spPr>
+        <p:style>
+          <a:lnRef idx="1">
+            <a:schemeClr val="accent1"/>
+          </a:lnRef>
+          <a:fillRef idx="0">
+            <a:schemeClr val="accent1"/>
+          </a:fillRef>
+          <a:effectRef idx="0">
+            <a:schemeClr val="accent1"/>
+          </a:effectRef>
+          <a:fontRef idx="minor">
+            <a:schemeClr val="tx1"/>
+          </a:fontRef>
+        </p:style>
+      </p:cxnSp>
+      <p:cxnSp>
+        <p:nvCxnSpPr>
+          <p:cNvPr id="31" name="直接箭头连接符 49">
+            <a:extLst>
+              <a:ext uri="{FF2B5EF4-FFF2-40B4-BE49-F238E27FC236}">
+                <a16:creationId xmlns:a16="http://schemas.microsoft.com/office/drawing/2014/main" id="{CF256192-3453-40E5-81FA-A31F4325247A}"/>
+              </a:ext>
+            </a:extLst>
+          </p:cNvPr>
+          <p:cNvCxnSpPr>
+            <a:cxnSpLocks/>
+          </p:cNvCxnSpPr>
+          <p:nvPr/>
+        </p:nvCxnSpPr>
+        <p:spPr>
+          <a:xfrm flipH="1" flipV="1">
+            <a:off x="1938528" y="2132169"/>
+            <a:ext cx="3311968" cy="1255507"/>
+          </a:xfrm>
+          <a:prstGeom prst="straightConnector1">
+            <a:avLst/>
+          </a:prstGeom>
+          <a:ln w="28575">
+            <a:solidFill>
+              <a:srgbClr val="00B050"/>
+            </a:solidFill>
+            <a:prstDash val="dash"/>
+            <a:tailEnd type="triangle"/>
+          </a:ln>
+        </p:spPr>
+        <p:style>
+          <a:lnRef idx="1">
+            <a:schemeClr val="accent1"/>
+          </a:lnRef>
+          <a:fillRef idx="0">
+            <a:schemeClr val="accent1"/>
+          </a:fillRef>
+          <a:effectRef idx="0">
+            <a:schemeClr val="accent1"/>
+          </a:effectRef>
+          <a:fontRef idx="minor">
+            <a:schemeClr val="tx1"/>
+          </a:fontRef>
+        </p:style>
+      </p:cxnSp>
+      <p:sp>
+        <p:nvSpPr>
+          <p:cNvPr id="41" name="TextBox 40">
+            <a:extLst>
+              <a:ext uri="{FF2B5EF4-FFF2-40B4-BE49-F238E27FC236}">
+                <a16:creationId xmlns:a16="http://schemas.microsoft.com/office/drawing/2014/main" id="{3BFFD761-C273-45ED-8EC7-0C2001B48F70}"/>
+              </a:ext>
+            </a:extLst>
+          </p:cNvPr>
+          <p:cNvSpPr txBox="1"/>
+          <p:nvPr/>
+        </p:nvSpPr>
+        <p:spPr>
+          <a:xfrm>
+            <a:off x="5665697" y="4061934"/>
+            <a:ext cx="1116021" cy="553998"/>
+          </a:xfrm>
+          <a:prstGeom prst="rect">
+            <a:avLst/>
+          </a:prstGeom>
+          <a:noFill/>
+          <a:ln w="3175">
+            <a:noFill/>
+          </a:ln>
+        </p:spPr>
+        <p:txBody>
+          <a:bodyPr wrap="square" rtlCol="0">
+            <a:spAutoFit/>
+          </a:bodyPr>
+          <a:lstStyle/>
+          <a:p>
+            <a:r>
+              <a:rPr lang="en-US" sz="1000" b="1" dirty="0"/>
+              <a:t>Needed web components [???]</a:t>
+            </a:r>
+            <a:endParaRPr lang="en-SG" sz="1000" b="1" dirty="0"/>
+          </a:p>
+        </p:txBody>
+      </p:sp>
+      <p:sp>
+        <p:nvSpPr>
+          <p:cNvPr id="42" name="TextBox 41">
+            <a:extLst>
+              <a:ext uri="{FF2B5EF4-FFF2-40B4-BE49-F238E27FC236}">
+                <a16:creationId xmlns:a16="http://schemas.microsoft.com/office/drawing/2014/main" id="{F74BF612-A799-417F-A31A-3E833C40468D}"/>
+              </a:ext>
+            </a:extLst>
+          </p:cNvPr>
+          <p:cNvSpPr txBox="1"/>
+          <p:nvPr/>
+        </p:nvSpPr>
+        <p:spPr>
+          <a:xfrm>
+            <a:off x="3993429" y="2857689"/>
+            <a:ext cx="1257067" cy="246221"/>
+          </a:xfrm>
+          <a:prstGeom prst="rect">
+            <a:avLst/>
+          </a:prstGeom>
+          <a:noFill/>
+          <a:ln w="3175">
+            <a:noFill/>
+          </a:ln>
+        </p:spPr>
+        <p:txBody>
+          <a:bodyPr wrap="square" rtlCol="0">
+            <a:spAutoFit/>
+          </a:bodyPr>
+          <a:lstStyle/>
+          <a:p>
+            <a:r>
+              <a:rPr lang="en-SG" sz="1000" b="1" dirty="0"/>
+              <a:t>Analysis result [???] </a:t>
+            </a:r>
+          </a:p>
+        </p:txBody>
+      </p:sp>
+      <p:cxnSp>
+        <p:nvCxnSpPr>
+          <p:cNvPr id="44" name="Connector: Elbow 43">
+            <a:extLst>
+              <a:ext uri="{FF2B5EF4-FFF2-40B4-BE49-F238E27FC236}">
+                <a16:creationId xmlns:a16="http://schemas.microsoft.com/office/drawing/2014/main" id="{655C2192-42BD-4FDB-8724-B9D59036D85E}"/>
+              </a:ext>
+            </a:extLst>
+          </p:cNvPr>
+          <p:cNvCxnSpPr>
+            <a:cxnSpLocks/>
+            <a:stCxn id="4" idx="3"/>
+          </p:cNvCxnSpPr>
+          <p:nvPr/>
+        </p:nvCxnSpPr>
+        <p:spPr>
+          <a:xfrm>
+            <a:off x="1735495" y="1872058"/>
+            <a:ext cx="7883993" cy="602823"/>
+          </a:xfrm>
+          <a:prstGeom prst="bentConnector3">
+            <a:avLst>
+              <a:gd name="adj1" fmla="val 99988"/>
+            </a:avLst>
+          </a:prstGeom>
+          <a:ln w="28575">
+            <a:prstDash val="dash"/>
+            <a:tailEnd type="triangle"/>
+          </a:ln>
+        </p:spPr>
+        <p:style>
+          <a:lnRef idx="1">
+            <a:schemeClr val="accent1"/>
+          </a:lnRef>
+          <a:fillRef idx="0">
+            <a:schemeClr val="accent1"/>
+          </a:fillRef>
+          <a:effectRef idx="0">
+            <a:schemeClr val="accent1"/>
+          </a:effectRef>
+          <a:fontRef idx="minor">
+            <a:schemeClr val="tx1"/>
+          </a:fontRef>
+        </p:style>
+      </p:cxnSp>
+      <p:sp>
+        <p:nvSpPr>
+          <p:cNvPr id="49" name="矩形: 圆角 34">
+            <a:extLst>
+              <a:ext uri="{FF2B5EF4-FFF2-40B4-BE49-F238E27FC236}">
+                <a16:creationId xmlns:a16="http://schemas.microsoft.com/office/drawing/2014/main" id="{3A158D41-825F-46D7-8DE0-5DF734A98A43}"/>
+              </a:ext>
+            </a:extLst>
+          </p:cNvPr>
+          <p:cNvSpPr/>
+          <p:nvPr/>
+        </p:nvSpPr>
+        <p:spPr>
+          <a:xfrm>
+            <a:off x="9132942" y="2551884"/>
+            <a:ext cx="973092" cy="457403"/>
+          </a:xfrm>
+          <a:prstGeom prst="roundRect">
+            <a:avLst/>
+          </a:prstGeom>
+        </p:spPr>
+        <p:style>
+          <a:lnRef idx="1">
+            <a:schemeClr val="accent1"/>
+          </a:lnRef>
+          <a:fillRef idx="2">
+            <a:schemeClr val="accent1"/>
+          </a:fillRef>
+          <a:effectRef idx="1">
+            <a:schemeClr val="accent1"/>
+          </a:effectRef>
+          <a:fontRef idx="minor">
+            <a:schemeClr val="dk1"/>
+          </a:fontRef>
+        </p:style>
+        <p:txBody>
+          <a:bodyPr rtlCol="0" anchor="ctr"/>
+          <a:lstStyle>
+            <a:defPPr>
+              <a:defRPr lang="zh-CN"/>
+            </a:defPPr>
+            <a:lvl1pPr marL="0" algn="l" defTabSz="914400" rtl="0" eaLnBrk="1" latinLnBrk="0" hangingPunct="1">
+              <a:defRPr sz="1800" kern="1200">
+                <a:solidFill>
+                  <a:schemeClr val="dk1"/>
+                </a:solidFill>
+                <a:latin typeface="+mn-lt"/>
+                <a:ea typeface="+mn-ea"/>
+                <a:cs typeface="+mn-cs"/>
+              </a:defRPr>
+            </a:lvl1pPr>
+            <a:lvl2pPr marL="457200" algn="l" defTabSz="914400" rtl="0" eaLnBrk="1" latinLnBrk="0" hangingPunct="1">
+              <a:defRPr sz="1800" kern="1200">
+                <a:solidFill>
+                  <a:schemeClr val="dk1"/>
+                </a:solidFill>
+                <a:latin typeface="+mn-lt"/>
+                <a:ea typeface="+mn-ea"/>
+                <a:cs typeface="+mn-cs"/>
+              </a:defRPr>
+            </a:lvl2pPr>
+            <a:lvl3pPr marL="914400" algn="l" defTabSz="914400" rtl="0" eaLnBrk="1" latinLnBrk="0" hangingPunct="1">
+              <a:defRPr sz="1800" kern="1200">
+                <a:solidFill>
+                  <a:schemeClr val="dk1"/>
+                </a:solidFill>
+                <a:latin typeface="+mn-lt"/>
+                <a:ea typeface="+mn-ea"/>
+                <a:cs typeface="+mn-cs"/>
+              </a:defRPr>
+            </a:lvl3pPr>
+            <a:lvl4pPr marL="1371600" algn="l" defTabSz="914400" rtl="0" eaLnBrk="1" latinLnBrk="0" hangingPunct="1">
+              <a:defRPr sz="1800" kern="1200">
+                <a:solidFill>
+                  <a:schemeClr val="dk1"/>
+                </a:solidFill>
+                <a:latin typeface="+mn-lt"/>
+                <a:ea typeface="+mn-ea"/>
+                <a:cs typeface="+mn-cs"/>
+              </a:defRPr>
+            </a:lvl4pPr>
+            <a:lvl5pPr marL="1828800" algn="l" defTabSz="914400" rtl="0" eaLnBrk="1" latinLnBrk="0" hangingPunct="1">
+              <a:defRPr sz="1800" kern="1200">
+                <a:solidFill>
+                  <a:schemeClr val="dk1"/>
+                </a:solidFill>
+                <a:latin typeface="+mn-lt"/>
+                <a:ea typeface="+mn-ea"/>
+                <a:cs typeface="+mn-cs"/>
+              </a:defRPr>
+            </a:lvl5pPr>
+            <a:lvl6pPr marL="2286000" algn="l" defTabSz="914400" rtl="0" eaLnBrk="1" latinLnBrk="0" hangingPunct="1">
+              <a:defRPr sz="1800" kern="1200">
+                <a:solidFill>
+                  <a:schemeClr val="dk1"/>
+                </a:solidFill>
+                <a:latin typeface="+mn-lt"/>
+                <a:ea typeface="+mn-ea"/>
+                <a:cs typeface="+mn-cs"/>
+              </a:defRPr>
+            </a:lvl6pPr>
+            <a:lvl7pPr marL="2743200" algn="l" defTabSz="914400" rtl="0" eaLnBrk="1" latinLnBrk="0" hangingPunct="1">
+              <a:defRPr sz="1800" kern="1200">
+                <a:solidFill>
+                  <a:schemeClr val="dk1"/>
+                </a:solidFill>
+                <a:latin typeface="+mn-lt"/>
+                <a:ea typeface="+mn-ea"/>
+                <a:cs typeface="+mn-cs"/>
+              </a:defRPr>
+            </a:lvl7pPr>
+            <a:lvl8pPr marL="3200400" algn="l" defTabSz="914400" rtl="0" eaLnBrk="1" latinLnBrk="0" hangingPunct="1">
+              <a:defRPr sz="1800" kern="1200">
+                <a:solidFill>
+                  <a:schemeClr val="dk1"/>
+                </a:solidFill>
+                <a:latin typeface="+mn-lt"/>
+                <a:ea typeface="+mn-ea"/>
+                <a:cs typeface="+mn-cs"/>
+              </a:defRPr>
+            </a:lvl8pPr>
+            <a:lvl9pPr marL="3657600" algn="l" defTabSz="914400" rtl="0" eaLnBrk="1" latinLnBrk="0" hangingPunct="1">
+              <a:defRPr sz="1800" kern="1200">
+                <a:solidFill>
+                  <a:schemeClr val="dk1"/>
+                </a:solidFill>
+                <a:latin typeface="+mn-lt"/>
+                <a:ea typeface="+mn-ea"/>
+                <a:cs typeface="+mn-cs"/>
+              </a:defRPr>
+            </a:lvl9pPr>
+          </a:lstStyle>
+          <a:p>
+            <a:r>
+              <a:rPr lang="en-US" altLang="zh-CN" sz="1600" b="1" dirty="0" err="1"/>
+              <a:t>Graphql</a:t>
+            </a:r>
+            <a:endParaRPr lang="zh-CN" altLang="en-US" sz="1600" b="1" dirty="0"/>
+          </a:p>
+        </p:txBody>
+      </p:sp>
+      <p:sp>
+        <p:nvSpPr>
+          <p:cNvPr id="50" name="TextBox 49">
+            <a:extLst>
+              <a:ext uri="{FF2B5EF4-FFF2-40B4-BE49-F238E27FC236}">
+                <a16:creationId xmlns:a16="http://schemas.microsoft.com/office/drawing/2014/main" id="{7E41A84D-D45F-46B0-93CE-120FD13540EF}"/>
+              </a:ext>
+            </a:extLst>
+          </p:cNvPr>
+          <p:cNvSpPr txBox="1"/>
+          <p:nvPr/>
+        </p:nvSpPr>
+        <p:spPr>
+          <a:xfrm>
+            <a:off x="4945384" y="1609623"/>
+            <a:ext cx="1263391" cy="246221"/>
+          </a:xfrm>
+          <a:prstGeom prst="rect">
+            <a:avLst/>
+          </a:prstGeom>
+          <a:noFill/>
+          <a:ln w="3175">
+            <a:noFill/>
+          </a:ln>
+        </p:spPr>
+        <p:txBody>
+          <a:bodyPr wrap="square" rtlCol="0">
+            <a:spAutoFit/>
+          </a:bodyPr>
+          <a:lstStyle/>
+          <a:p>
+            <a:r>
+              <a:rPr lang="en-SG" sz="1000" b="1" dirty="0"/>
+              <a:t>Analysis result data</a:t>
+            </a:r>
+          </a:p>
+        </p:txBody>
+      </p:sp>
+      <p:cxnSp>
+        <p:nvCxnSpPr>
+          <p:cNvPr id="51" name="直接箭头连接符 49">
+            <a:extLst>
+              <a:ext uri="{FF2B5EF4-FFF2-40B4-BE49-F238E27FC236}">
+                <a16:creationId xmlns:a16="http://schemas.microsoft.com/office/drawing/2014/main" id="{DE268CD6-FC32-464D-9C43-16CC5B29F447}"/>
+              </a:ext>
+            </a:extLst>
+          </p:cNvPr>
+          <p:cNvCxnSpPr>
+            <a:cxnSpLocks/>
+          </p:cNvCxnSpPr>
+          <p:nvPr/>
+        </p:nvCxnSpPr>
+        <p:spPr>
+          <a:xfrm>
+            <a:off x="9619488" y="3042628"/>
+            <a:ext cx="0" cy="412667"/>
+          </a:xfrm>
+          <a:prstGeom prst="straightConnector1">
+            <a:avLst/>
+          </a:prstGeom>
+          <a:ln w="28575">
+            <a:prstDash val="dash"/>
+            <a:tailEnd type="triangle"/>
+          </a:ln>
+        </p:spPr>
+        <p:style>
+          <a:lnRef idx="1">
+            <a:schemeClr val="accent1"/>
+          </a:lnRef>
+          <a:fillRef idx="0">
+            <a:schemeClr val="accent1"/>
+          </a:fillRef>
+          <a:effectRef idx="0">
+            <a:schemeClr val="accent1"/>
+          </a:effectRef>
+          <a:fontRef idx="minor">
+            <a:schemeClr val="tx1"/>
+          </a:fontRef>
+        </p:style>
+      </p:cxnSp>
+      <p:sp>
+        <p:nvSpPr>
+          <p:cNvPr id="56" name="矩形: 圆角 34">
+            <a:extLst>
+              <a:ext uri="{FF2B5EF4-FFF2-40B4-BE49-F238E27FC236}">
+                <a16:creationId xmlns:a16="http://schemas.microsoft.com/office/drawing/2014/main" id="{0E4CF87D-9D2E-4623-98DF-FFE38CB985AE}"/>
+              </a:ext>
+            </a:extLst>
+          </p:cNvPr>
+          <p:cNvSpPr/>
+          <p:nvPr/>
+        </p:nvSpPr>
+        <p:spPr>
+          <a:xfrm>
+            <a:off x="9132942" y="3494321"/>
+            <a:ext cx="1879180" cy="400815"/>
+          </a:xfrm>
+          <a:prstGeom prst="roundRect">
+            <a:avLst/>
+          </a:prstGeom>
+        </p:spPr>
+        <p:style>
+          <a:lnRef idx="1">
+            <a:schemeClr val="accent1"/>
+          </a:lnRef>
+          <a:fillRef idx="2">
+            <a:schemeClr val="accent1"/>
+          </a:fillRef>
+          <a:effectRef idx="1">
+            <a:schemeClr val="accent1"/>
+          </a:effectRef>
+          <a:fontRef idx="minor">
+            <a:schemeClr val="dk1"/>
+          </a:fontRef>
+        </p:style>
+        <p:txBody>
+          <a:bodyPr rtlCol="0" anchor="ctr"/>
+          <a:lstStyle>
+            <a:defPPr>
+              <a:defRPr lang="zh-CN"/>
+            </a:defPPr>
+            <a:lvl1pPr marL="0" algn="l" defTabSz="914400" rtl="0" eaLnBrk="1" latinLnBrk="0" hangingPunct="1">
+              <a:defRPr sz="1800" kern="1200">
+                <a:solidFill>
+                  <a:schemeClr val="dk1"/>
+                </a:solidFill>
+                <a:latin typeface="+mn-lt"/>
+                <a:ea typeface="+mn-ea"/>
+                <a:cs typeface="+mn-cs"/>
+              </a:defRPr>
+            </a:lvl1pPr>
+            <a:lvl2pPr marL="457200" algn="l" defTabSz="914400" rtl="0" eaLnBrk="1" latinLnBrk="0" hangingPunct="1">
+              <a:defRPr sz="1800" kern="1200">
+                <a:solidFill>
+                  <a:schemeClr val="dk1"/>
+                </a:solidFill>
+                <a:latin typeface="+mn-lt"/>
+                <a:ea typeface="+mn-ea"/>
+                <a:cs typeface="+mn-cs"/>
+              </a:defRPr>
+            </a:lvl2pPr>
+            <a:lvl3pPr marL="914400" algn="l" defTabSz="914400" rtl="0" eaLnBrk="1" latinLnBrk="0" hangingPunct="1">
+              <a:defRPr sz="1800" kern="1200">
+                <a:solidFill>
+                  <a:schemeClr val="dk1"/>
+                </a:solidFill>
+                <a:latin typeface="+mn-lt"/>
+                <a:ea typeface="+mn-ea"/>
+                <a:cs typeface="+mn-cs"/>
+              </a:defRPr>
+            </a:lvl3pPr>
+            <a:lvl4pPr marL="1371600" algn="l" defTabSz="914400" rtl="0" eaLnBrk="1" latinLnBrk="0" hangingPunct="1">
+              <a:defRPr sz="1800" kern="1200">
+                <a:solidFill>
+                  <a:schemeClr val="dk1"/>
+                </a:solidFill>
+                <a:latin typeface="+mn-lt"/>
+                <a:ea typeface="+mn-ea"/>
+                <a:cs typeface="+mn-cs"/>
+              </a:defRPr>
+            </a:lvl4pPr>
+            <a:lvl5pPr marL="1828800" algn="l" defTabSz="914400" rtl="0" eaLnBrk="1" latinLnBrk="0" hangingPunct="1">
+              <a:defRPr sz="1800" kern="1200">
+                <a:solidFill>
+                  <a:schemeClr val="dk1"/>
+                </a:solidFill>
+                <a:latin typeface="+mn-lt"/>
+                <a:ea typeface="+mn-ea"/>
+                <a:cs typeface="+mn-cs"/>
+              </a:defRPr>
+            </a:lvl5pPr>
+            <a:lvl6pPr marL="2286000" algn="l" defTabSz="914400" rtl="0" eaLnBrk="1" latinLnBrk="0" hangingPunct="1">
+              <a:defRPr sz="1800" kern="1200">
+                <a:solidFill>
+                  <a:schemeClr val="dk1"/>
+                </a:solidFill>
+                <a:latin typeface="+mn-lt"/>
+                <a:ea typeface="+mn-ea"/>
+                <a:cs typeface="+mn-cs"/>
+              </a:defRPr>
+            </a:lvl6pPr>
+            <a:lvl7pPr marL="2743200" algn="l" defTabSz="914400" rtl="0" eaLnBrk="1" latinLnBrk="0" hangingPunct="1">
+              <a:defRPr sz="1800" kern="1200">
+                <a:solidFill>
+                  <a:schemeClr val="dk1"/>
+                </a:solidFill>
+                <a:latin typeface="+mn-lt"/>
+                <a:ea typeface="+mn-ea"/>
+                <a:cs typeface="+mn-cs"/>
+              </a:defRPr>
+            </a:lvl7pPr>
+            <a:lvl8pPr marL="3200400" algn="l" defTabSz="914400" rtl="0" eaLnBrk="1" latinLnBrk="0" hangingPunct="1">
+              <a:defRPr sz="1800" kern="1200">
+                <a:solidFill>
+                  <a:schemeClr val="dk1"/>
+                </a:solidFill>
+                <a:latin typeface="+mn-lt"/>
+                <a:ea typeface="+mn-ea"/>
+                <a:cs typeface="+mn-cs"/>
+              </a:defRPr>
+            </a:lvl8pPr>
+            <a:lvl9pPr marL="3657600" algn="l" defTabSz="914400" rtl="0" eaLnBrk="1" latinLnBrk="0" hangingPunct="1">
+              <a:defRPr sz="1800" kern="1200">
+                <a:solidFill>
+                  <a:schemeClr val="dk1"/>
+                </a:solidFill>
+                <a:latin typeface="+mn-lt"/>
+                <a:ea typeface="+mn-ea"/>
+                <a:cs typeface="+mn-cs"/>
+              </a:defRPr>
+            </a:lvl9pPr>
+          </a:lstStyle>
+          <a:p>
+            <a:r>
+              <a:rPr lang="en-US" altLang="zh-CN" sz="1600" b="1" dirty="0"/>
+              <a:t>Web host [Angular] </a:t>
+            </a:r>
+            <a:endParaRPr lang="zh-CN" altLang="en-US" sz="1600" b="1" dirty="0"/>
+          </a:p>
+        </p:txBody>
+      </p:sp>
+      <p:cxnSp>
+        <p:nvCxnSpPr>
+          <p:cNvPr id="57" name="直接箭头连接符 49">
+            <a:extLst>
+              <a:ext uri="{FF2B5EF4-FFF2-40B4-BE49-F238E27FC236}">
+                <a16:creationId xmlns:a16="http://schemas.microsoft.com/office/drawing/2014/main" id="{9D2CB03B-932B-45BE-92C4-8599A665F5FD}"/>
+              </a:ext>
+            </a:extLst>
+          </p:cNvPr>
+          <p:cNvCxnSpPr>
+            <a:cxnSpLocks/>
+          </p:cNvCxnSpPr>
+          <p:nvPr/>
+        </p:nvCxnSpPr>
+        <p:spPr>
+          <a:xfrm>
+            <a:off x="9619488" y="3934233"/>
+            <a:ext cx="0" cy="412667"/>
+          </a:xfrm>
+          <a:prstGeom prst="straightConnector1">
+            <a:avLst/>
+          </a:prstGeom>
+          <a:ln w="28575">
+            <a:prstDash val="dash"/>
+            <a:tailEnd type="triangle"/>
+          </a:ln>
+        </p:spPr>
+        <p:style>
+          <a:lnRef idx="1">
+            <a:schemeClr val="accent1"/>
+          </a:lnRef>
+          <a:fillRef idx="0">
+            <a:schemeClr val="accent1"/>
+          </a:fillRef>
+          <a:effectRef idx="0">
+            <a:schemeClr val="accent1"/>
+          </a:effectRef>
+          <a:fontRef idx="minor">
+            <a:schemeClr val="tx1"/>
+          </a:fontRef>
+        </p:style>
+      </p:cxnSp>
+      <p:sp>
+        <p:nvSpPr>
+          <p:cNvPr id="58" name="矩形: 圆角 34">
+            <a:extLst>
+              <a:ext uri="{FF2B5EF4-FFF2-40B4-BE49-F238E27FC236}">
+                <a16:creationId xmlns:a16="http://schemas.microsoft.com/office/drawing/2014/main" id="{688CDAD0-A40A-4404-8352-D1CEBCDA61C4}"/>
+              </a:ext>
+            </a:extLst>
+          </p:cNvPr>
+          <p:cNvSpPr/>
+          <p:nvPr/>
+        </p:nvSpPr>
+        <p:spPr>
+          <a:xfrm>
+            <a:off x="8622822" y="4362083"/>
+            <a:ext cx="2651727" cy="483274"/>
+          </a:xfrm>
+          <a:prstGeom prst="roundRect">
+            <a:avLst/>
+          </a:prstGeom>
+        </p:spPr>
+        <p:style>
+          <a:lnRef idx="1">
+            <a:schemeClr val="accent1"/>
+          </a:lnRef>
+          <a:fillRef idx="2">
+            <a:schemeClr val="accent1"/>
+          </a:fillRef>
+          <a:effectRef idx="1">
+            <a:schemeClr val="accent1"/>
+          </a:effectRef>
+          <a:fontRef idx="minor">
+            <a:schemeClr val="dk1"/>
+          </a:fontRef>
+        </p:style>
+        <p:txBody>
+          <a:bodyPr rtlCol="0" anchor="ctr"/>
+          <a:lstStyle>
+            <a:defPPr>
+              <a:defRPr lang="zh-CN"/>
+            </a:defPPr>
+            <a:lvl1pPr marL="0" algn="l" defTabSz="914400" rtl="0" eaLnBrk="1" latinLnBrk="0" hangingPunct="1">
+              <a:defRPr sz="1800" kern="1200">
+                <a:solidFill>
+                  <a:schemeClr val="dk1"/>
+                </a:solidFill>
+                <a:latin typeface="+mn-lt"/>
+                <a:ea typeface="+mn-ea"/>
+                <a:cs typeface="+mn-cs"/>
+              </a:defRPr>
+            </a:lvl1pPr>
+            <a:lvl2pPr marL="457200" algn="l" defTabSz="914400" rtl="0" eaLnBrk="1" latinLnBrk="0" hangingPunct="1">
+              <a:defRPr sz="1800" kern="1200">
+                <a:solidFill>
+                  <a:schemeClr val="dk1"/>
+                </a:solidFill>
+                <a:latin typeface="+mn-lt"/>
+                <a:ea typeface="+mn-ea"/>
+                <a:cs typeface="+mn-cs"/>
+              </a:defRPr>
+            </a:lvl2pPr>
+            <a:lvl3pPr marL="914400" algn="l" defTabSz="914400" rtl="0" eaLnBrk="1" latinLnBrk="0" hangingPunct="1">
+              <a:defRPr sz="1800" kern="1200">
+                <a:solidFill>
+                  <a:schemeClr val="dk1"/>
+                </a:solidFill>
+                <a:latin typeface="+mn-lt"/>
+                <a:ea typeface="+mn-ea"/>
+                <a:cs typeface="+mn-cs"/>
+              </a:defRPr>
+            </a:lvl3pPr>
+            <a:lvl4pPr marL="1371600" algn="l" defTabSz="914400" rtl="0" eaLnBrk="1" latinLnBrk="0" hangingPunct="1">
+              <a:defRPr sz="1800" kern="1200">
+                <a:solidFill>
+                  <a:schemeClr val="dk1"/>
+                </a:solidFill>
+                <a:latin typeface="+mn-lt"/>
+                <a:ea typeface="+mn-ea"/>
+                <a:cs typeface="+mn-cs"/>
+              </a:defRPr>
+            </a:lvl4pPr>
+            <a:lvl5pPr marL="1828800" algn="l" defTabSz="914400" rtl="0" eaLnBrk="1" latinLnBrk="0" hangingPunct="1">
+              <a:defRPr sz="1800" kern="1200">
+                <a:solidFill>
+                  <a:schemeClr val="dk1"/>
+                </a:solidFill>
+                <a:latin typeface="+mn-lt"/>
+                <a:ea typeface="+mn-ea"/>
+                <a:cs typeface="+mn-cs"/>
+              </a:defRPr>
+            </a:lvl5pPr>
+            <a:lvl6pPr marL="2286000" algn="l" defTabSz="914400" rtl="0" eaLnBrk="1" latinLnBrk="0" hangingPunct="1">
+              <a:defRPr sz="1800" kern="1200">
+                <a:solidFill>
+                  <a:schemeClr val="dk1"/>
+                </a:solidFill>
+                <a:latin typeface="+mn-lt"/>
+                <a:ea typeface="+mn-ea"/>
+                <a:cs typeface="+mn-cs"/>
+              </a:defRPr>
+            </a:lvl6pPr>
+            <a:lvl7pPr marL="2743200" algn="l" defTabSz="914400" rtl="0" eaLnBrk="1" latinLnBrk="0" hangingPunct="1">
+              <a:defRPr sz="1800" kern="1200">
+                <a:solidFill>
+                  <a:schemeClr val="dk1"/>
+                </a:solidFill>
+                <a:latin typeface="+mn-lt"/>
+                <a:ea typeface="+mn-ea"/>
+                <a:cs typeface="+mn-cs"/>
+              </a:defRPr>
+            </a:lvl7pPr>
+            <a:lvl8pPr marL="3200400" algn="l" defTabSz="914400" rtl="0" eaLnBrk="1" latinLnBrk="0" hangingPunct="1">
+              <a:defRPr sz="1800" kern="1200">
+                <a:solidFill>
+                  <a:schemeClr val="dk1"/>
+                </a:solidFill>
+                <a:latin typeface="+mn-lt"/>
+                <a:ea typeface="+mn-ea"/>
+                <a:cs typeface="+mn-cs"/>
+              </a:defRPr>
+            </a:lvl8pPr>
+            <a:lvl9pPr marL="3657600" algn="l" defTabSz="914400" rtl="0" eaLnBrk="1" latinLnBrk="0" hangingPunct="1">
+              <a:defRPr sz="1800" kern="1200">
+                <a:solidFill>
+                  <a:schemeClr val="dk1"/>
+                </a:solidFill>
+                <a:latin typeface="+mn-lt"/>
+                <a:ea typeface="+mn-ea"/>
+                <a:cs typeface="+mn-cs"/>
+              </a:defRPr>
+            </a:lvl9pPr>
+          </a:lstStyle>
+          <a:p>
+            <a:r>
+              <a:rPr lang="en-US" altLang="zh-CN" sz="1600" b="1" dirty="0"/>
+              <a:t> </a:t>
+            </a:r>
+            <a:r>
+              <a:rPr lang="en-US" altLang="zh-CN" sz="1600" b="1" dirty="0" err="1"/>
+              <a:t>WebPage</a:t>
+            </a:r>
+            <a:r>
+              <a:rPr lang="en-US" altLang="zh-CN" sz="1600" b="1" dirty="0"/>
+              <a:t> dashboard </a:t>
+            </a:r>
+            <a:endParaRPr lang="zh-CN" altLang="en-US" sz="1600" b="1" dirty="0"/>
+          </a:p>
+        </p:txBody>
+      </p:sp>
+      <p:sp>
+        <p:nvSpPr>
+          <p:cNvPr id="59" name="Rectangle 58">
+            <a:extLst>
+              <a:ext uri="{FF2B5EF4-FFF2-40B4-BE49-F238E27FC236}">
+                <a16:creationId xmlns:a16="http://schemas.microsoft.com/office/drawing/2014/main" id="{08FDF94B-765C-4C0C-BED3-2982B239D618}"/>
+              </a:ext>
+            </a:extLst>
+          </p:cNvPr>
+          <p:cNvSpPr/>
+          <p:nvPr/>
+        </p:nvSpPr>
+        <p:spPr>
+          <a:xfrm>
+            <a:off x="421704" y="3221882"/>
+            <a:ext cx="7414703" cy="2301094"/>
+          </a:xfrm>
+          <a:prstGeom prst="rect">
+            <a:avLst/>
+          </a:prstGeom>
+          <a:noFill/>
+          <a:ln w="9525" cap="flat" cmpd="sng" algn="ctr">
+            <a:solidFill>
+              <a:schemeClr val="accent1"/>
+            </a:solidFill>
+            <a:prstDash val="solid"/>
+            <a:round/>
+            <a:headEnd type="none" w="med" len="med"/>
+            <a:tailEnd type="none" w="med" len="med"/>
+          </a:ln>
+        </p:spPr>
+        <p:style>
+          <a:lnRef idx="0">
+            <a:scrgbClr r="0" g="0" b="0"/>
+          </a:lnRef>
+          <a:fillRef idx="0">
+            <a:scrgbClr r="0" g="0" b="0"/>
+          </a:fillRef>
+          <a:effectRef idx="0">
+            <a:scrgbClr r="0" g="0" b="0"/>
+          </a:effectRef>
+          <a:fontRef idx="minor">
+            <a:schemeClr val="accent1"/>
+          </a:fontRef>
+        </p:style>
+        <p:txBody>
+          <a:bodyPr rtlCol="0" anchor="ctr"/>
+          <a:lstStyle/>
+          <a:p>
+            <a:pPr algn="ctr"/>
+            <a:endParaRPr lang="en-SG"/>
+          </a:p>
+        </p:txBody>
+      </p:sp>
+      <p:pic>
+        <p:nvPicPr>
+          <p:cNvPr id="1026" name="Picture 2" descr="AWS Solution Architect - Associate - xpert careers">
+            <a:extLst>
+              <a:ext uri="{FF2B5EF4-FFF2-40B4-BE49-F238E27FC236}">
+                <a16:creationId xmlns:a16="http://schemas.microsoft.com/office/drawing/2014/main" id="{DD6B2A17-4346-4E14-9D66-2402207940F9}"/>
+              </a:ext>
+            </a:extLst>
+          </p:cNvPr>
+          <p:cNvPicPr>
+            <a:picLocks noChangeAspect="1" noChangeArrowheads="1"/>
+          </p:cNvPicPr>
+          <p:nvPr/>
+        </p:nvPicPr>
+        <p:blipFill>
+          <a:blip r:embed="rId3">
+            <a:extLst>
+              <a:ext uri="{28A0092B-C50C-407E-A947-70E740481C1C}">
+                <a14:useLocalDpi xmlns:a14="http://schemas.microsoft.com/office/drawing/2010/main" val="0"/>
+              </a:ext>
+            </a:extLst>
+          </a:blip>
+          <a:srcRect/>
+          <a:stretch>
+            <a:fillRect/>
+          </a:stretch>
+        </p:blipFill>
+        <p:spPr bwMode="auto">
+          <a:xfrm>
+            <a:off x="9711348" y="1630132"/>
+            <a:ext cx="733359" cy="550019"/>
+          </a:xfrm>
+          <a:prstGeom prst="rect">
+            <a:avLst/>
+          </a:prstGeom>
+          <a:noFill/>
+          <a:extLst>
+            <a:ext uri="{909E8E84-426E-40DD-AFC4-6F175D3DCCD1}">
+              <a14:hiddenFill xmlns:a14="http://schemas.microsoft.com/office/drawing/2010/main">
+                <a:solidFill>
+                  <a:srgbClr val="FFFFFF"/>
+                </a:solidFill>
+              </a14:hiddenFill>
+            </a:ext>
+          </a:extLst>
+        </p:spPr>
+      </p:pic>
+      <p:sp>
+        <p:nvSpPr>
+          <p:cNvPr id="60" name="Rectangle 59">
+            <a:extLst>
+              <a:ext uri="{FF2B5EF4-FFF2-40B4-BE49-F238E27FC236}">
+                <a16:creationId xmlns:a16="http://schemas.microsoft.com/office/drawing/2014/main" id="{570E72F9-6EB8-46EA-92E3-94A4E9769625}"/>
+              </a:ext>
+            </a:extLst>
+          </p:cNvPr>
+          <p:cNvSpPr/>
+          <p:nvPr/>
+        </p:nvSpPr>
+        <p:spPr>
+          <a:xfrm>
+            <a:off x="8854124" y="1606296"/>
+            <a:ext cx="2291357" cy="2485191"/>
+          </a:xfrm>
+          <a:prstGeom prst="rect">
+            <a:avLst/>
+          </a:prstGeom>
+          <a:noFill/>
+          <a:ln w="9525" cap="flat" cmpd="sng" algn="ctr">
+            <a:solidFill>
+              <a:schemeClr val="accent1"/>
+            </a:solidFill>
+            <a:prstDash val="solid"/>
+            <a:round/>
+            <a:headEnd type="none" w="med" len="med"/>
+            <a:tailEnd type="none" w="med" len="med"/>
+          </a:ln>
+        </p:spPr>
+        <p:style>
+          <a:lnRef idx="0">
+            <a:scrgbClr r="0" g="0" b="0"/>
+          </a:lnRef>
+          <a:fillRef idx="0">
+            <a:scrgbClr r="0" g="0" b="0"/>
+          </a:fillRef>
+          <a:effectRef idx="0">
+            <a:scrgbClr r="0" g="0" b="0"/>
+          </a:effectRef>
+          <a:fontRef idx="minor">
+            <a:schemeClr val="accent1"/>
+          </a:fontRef>
+        </p:style>
+        <p:txBody>
+          <a:bodyPr rtlCol="0" anchor="ctr"/>
+          <a:lstStyle/>
+          <a:p>
+            <a:pPr algn="ctr"/>
+            <a:endParaRPr lang="en-SG"/>
+          </a:p>
+        </p:txBody>
+      </p:sp>
+      <p:sp>
+        <p:nvSpPr>
+          <p:cNvPr id="61" name="TextBox 60">
+            <a:extLst>
+              <a:ext uri="{FF2B5EF4-FFF2-40B4-BE49-F238E27FC236}">
+                <a16:creationId xmlns:a16="http://schemas.microsoft.com/office/drawing/2014/main" id="{5D686B1E-DC0E-4F53-9320-81183F6CCC28}"/>
+              </a:ext>
+            </a:extLst>
+          </p:cNvPr>
+          <p:cNvSpPr txBox="1"/>
+          <p:nvPr/>
+        </p:nvSpPr>
+        <p:spPr>
+          <a:xfrm>
+            <a:off x="506155" y="5185871"/>
+            <a:ext cx="947741" cy="246221"/>
+          </a:xfrm>
+          <a:prstGeom prst="rect">
+            <a:avLst/>
+          </a:prstGeom>
+          <a:solidFill>
+            <a:schemeClr val="bg1"/>
+          </a:solidFill>
+          <a:ln w="3175">
+            <a:solidFill>
+              <a:schemeClr val="tx1"/>
+            </a:solidFill>
+          </a:ln>
+        </p:spPr>
+        <p:txBody>
+          <a:bodyPr wrap="square" rtlCol="0">
+            <a:spAutoFit/>
+          </a:bodyPr>
+          <a:lstStyle/>
+          <a:p>
+            <a:r>
+              <a:rPr lang="en-US" sz="1000" b="1" dirty="0"/>
+              <a:t>Telco Clusters </a:t>
+            </a:r>
+            <a:endParaRPr lang="en-SG" sz="1000" b="1" dirty="0"/>
+          </a:p>
+        </p:txBody>
+      </p:sp>
+      <p:pic>
+        <p:nvPicPr>
+          <p:cNvPr id="62" name="Picture 2" descr="AWS Solution Architect - Associate - xpert careers">
+            <a:extLst>
+              <a:ext uri="{FF2B5EF4-FFF2-40B4-BE49-F238E27FC236}">
+                <a16:creationId xmlns:a16="http://schemas.microsoft.com/office/drawing/2014/main" id="{954452CC-55D9-4151-AD80-2C7189E477E1}"/>
+              </a:ext>
+            </a:extLst>
+          </p:cNvPr>
+          <p:cNvPicPr>
+            <a:picLocks noChangeAspect="1" noChangeArrowheads="1"/>
+          </p:cNvPicPr>
+          <p:nvPr/>
+        </p:nvPicPr>
+        <p:blipFill>
+          <a:blip r:embed="rId3">
+            <a:extLst>
+              <a:ext uri="{28A0092B-C50C-407E-A947-70E740481C1C}">
+                <a14:useLocalDpi xmlns:a14="http://schemas.microsoft.com/office/drawing/2010/main" val="0"/>
+              </a:ext>
+            </a:extLst>
+          </a:blip>
+          <a:srcRect/>
+          <a:stretch>
+            <a:fillRect/>
+          </a:stretch>
+        </p:blipFill>
+        <p:spPr bwMode="auto">
+          <a:xfrm>
+            <a:off x="1470332" y="1219314"/>
+            <a:ext cx="733359" cy="536686"/>
+          </a:xfrm>
+          <a:prstGeom prst="rect">
+            <a:avLst/>
+          </a:prstGeom>
+          <a:noFill/>
+          <a:extLst>
+            <a:ext uri="{909E8E84-426E-40DD-AFC4-6F175D3DCCD1}">
+              <a14:hiddenFill xmlns:a14="http://schemas.microsoft.com/office/drawing/2010/main">
+                <a:solidFill>
+                  <a:srgbClr val="FFFFFF"/>
+                </a:solidFill>
+              </a14:hiddenFill>
+            </a:ext>
+          </a:extLst>
+        </p:spPr>
+      </p:pic>
+      <p:pic>
+        <p:nvPicPr>
+          <p:cNvPr id="1028" name="Picture 4" descr="Chrome, google, browser icon - Free download on Iconfinder">
+            <a:extLst>
+              <a:ext uri="{FF2B5EF4-FFF2-40B4-BE49-F238E27FC236}">
+                <a16:creationId xmlns:a16="http://schemas.microsoft.com/office/drawing/2014/main" id="{0541FE02-1089-4378-9147-E2120061CB70}"/>
+              </a:ext>
+            </a:extLst>
+          </p:cNvPr>
+          <p:cNvPicPr>
+            <a:picLocks noChangeAspect="1" noChangeArrowheads="1"/>
+          </p:cNvPicPr>
+          <p:nvPr/>
+        </p:nvPicPr>
+        <p:blipFill>
+          <a:blip r:embed="rId4">
+            <a:extLst>
+              <a:ext uri="{28A0092B-C50C-407E-A947-70E740481C1C}">
+                <a14:useLocalDpi xmlns:a14="http://schemas.microsoft.com/office/drawing/2010/main" val="0"/>
+              </a:ext>
+            </a:extLst>
+          </a:blip>
+          <a:srcRect/>
+          <a:stretch>
+            <a:fillRect/>
+          </a:stretch>
+        </p:blipFill>
+        <p:spPr bwMode="auto">
+          <a:xfrm>
+            <a:off x="10863898" y="4205281"/>
+            <a:ext cx="410651" cy="410651"/>
+          </a:xfrm>
+          <a:prstGeom prst="rect">
+            <a:avLst/>
+          </a:prstGeom>
+          <a:noFill/>
+          <a:extLst>
+            <a:ext uri="{909E8E84-426E-40DD-AFC4-6F175D3DCCD1}">
+              <a14:hiddenFill xmlns:a14="http://schemas.microsoft.com/office/drawing/2010/main">
+                <a:solidFill>
+                  <a:srgbClr val="FFFFFF"/>
+                </a:solidFill>
+              </a14:hiddenFill>
+            </a:ext>
+          </a:extLst>
+        </p:spPr>
+      </p:pic>
+    </p:spTree>
+    <p:extLst>
+      <p:ext uri="{BB962C8B-B14F-4D97-AF65-F5344CB8AC3E}">
+        <p14:creationId xmlns:p14="http://schemas.microsoft.com/office/powerpoint/2010/main" val="1421383957"/>
+      </p:ext>
+    </p:extLst>
+  </p:cSld>
+  <p:clrMapOvr>
+    <a:masterClrMapping/>
+  </p:clrMapOvr>
+  <p:transition/>
+</p:sld>
+</file>
+
+<file path=ppt/slides/slide15.xml><?xml version="1.0" encoding="utf-8"?>
+<p:sld xmlns:a="http://schemas.openxmlformats.org/drawingml/2006/main" xmlns:r="http://schemas.openxmlformats.org/officeDocument/2006/relationships" xmlns:p="http://schemas.openxmlformats.org/presentationml/2006/main">
+  <p:cSld>
+    <p:spTree>
+      <p:nvGrpSpPr>
+        <p:cNvPr id="1" name=""/>
+        <p:cNvGrpSpPr/>
+        <p:nvPr/>
+      </p:nvGrpSpPr>
+      <p:grpSpPr>
+        <a:xfrm>
+          <a:off x="0" y="0"/>
+          <a:ext cx="0" cy="0"/>
+          <a:chOff x="0" y="0"/>
+          <a:chExt cx="0" cy="0"/>
+        </a:xfrm>
+      </p:grpSpPr>
+      <p:sp>
+        <p:nvSpPr>
+          <p:cNvPr id="2" name="Title 1">
+            <a:extLst>
+              <a:ext uri="{FF2B5EF4-FFF2-40B4-BE49-F238E27FC236}">
+                <a16:creationId xmlns:a16="http://schemas.microsoft.com/office/drawing/2014/main" id="{221A4FF2-258D-5B43-9F67-E984C9974D8C}"/>
+              </a:ext>
+            </a:extLst>
+          </p:cNvPr>
+          <p:cNvSpPr>
+            <a:spLocks noGrp="1"/>
+          </p:cNvSpPr>
+          <p:nvPr>
+            <p:ph type="title"/>
+          </p:nvPr>
+        </p:nvSpPr>
+        <p:spPr>
+          <a:xfrm>
+            <a:off x="379941" y="294104"/>
+            <a:ext cx="10995949" cy="803918"/>
+          </a:xfrm>
+        </p:spPr>
+        <p:txBody>
+          <a:bodyPr/>
+          <a:lstStyle/>
+          <a:p>
+            <a:r>
+              <a:rPr lang="en-GB" dirty="0"/>
+              <a:t>Development work [23/12/2021]</a:t>
+            </a:r>
+            <a:endParaRPr lang="en-US" dirty="0"/>
+          </a:p>
+        </p:txBody>
+      </p:sp>
+      <p:sp>
+        <p:nvSpPr>
+          <p:cNvPr id="55" name="内容占位符 2">
+            <a:extLst>
+              <a:ext uri="{FF2B5EF4-FFF2-40B4-BE49-F238E27FC236}">
+                <a16:creationId xmlns:a16="http://schemas.microsoft.com/office/drawing/2014/main" id="{6CEE3007-8706-4237-9F22-99B5CF5199A3}"/>
+              </a:ext>
+            </a:extLst>
+          </p:cNvPr>
+          <p:cNvSpPr txBox="1">
+            <a:spLocks/>
+          </p:cNvSpPr>
+          <p:nvPr/>
+        </p:nvSpPr>
+        <p:spPr>
+          <a:xfrm>
+            <a:off x="379941" y="1098022"/>
+            <a:ext cx="11311950" cy="5000937"/>
+          </a:xfrm>
+          <a:prstGeom prst="rect">
+            <a:avLst/>
+          </a:prstGeom>
+        </p:spPr>
+        <p:txBody>
+          <a:bodyPr/>
+          <a:lstStyle>
+            <a:lvl1pPr marL="228600" indent="-228600" algn="l" defTabSz="914400" rtl="0" eaLnBrk="1" latinLnBrk="0" hangingPunct="1">
+              <a:lnSpc>
+                <a:spcPct val="90000"/>
+              </a:lnSpc>
+              <a:spcBef>
+                <a:spcPts val="1000"/>
+              </a:spcBef>
+              <a:buFont typeface="Arial" panose="020B0604020202020204" pitchFamily="34" charset="0"/>
+              <a:buChar char="•"/>
+              <a:defRPr sz="2800" kern="1200">
+                <a:solidFill>
+                  <a:schemeClr val="tx1"/>
+                </a:solidFill>
+                <a:latin typeface="+mn-lt"/>
+                <a:ea typeface="+mn-ea"/>
+                <a:cs typeface="+mn-cs"/>
+              </a:defRPr>
+            </a:lvl1pPr>
+            <a:lvl2pPr marL="685800" indent="-228600" algn="l" defTabSz="914400" rtl="0" eaLnBrk="1" latinLnBrk="0" hangingPunct="1">
+              <a:lnSpc>
+                <a:spcPct val="90000"/>
+              </a:lnSpc>
+              <a:spcBef>
+                <a:spcPts val="500"/>
+              </a:spcBef>
+              <a:buFont typeface="Arial" panose="020B0604020202020204" pitchFamily="34" charset="0"/>
+              <a:buChar char="•"/>
+              <a:defRPr sz="2400" kern="1200">
+                <a:solidFill>
+                  <a:schemeClr val="tx1"/>
+                </a:solidFill>
+                <a:latin typeface="+mn-lt"/>
+                <a:ea typeface="+mn-ea"/>
+                <a:cs typeface="+mn-cs"/>
+              </a:defRPr>
+            </a:lvl2pPr>
+            <a:lvl3pPr marL="1143000" indent="-228600" algn="l" defTabSz="914400" rtl="0" eaLnBrk="1" latinLnBrk="0" hangingPunct="1">
+              <a:lnSpc>
+                <a:spcPct val="90000"/>
+              </a:lnSpc>
+              <a:spcBef>
+                <a:spcPts val="500"/>
+              </a:spcBef>
+              <a:buFont typeface="Arial" panose="020B0604020202020204" pitchFamily="34" charset="0"/>
+              <a:buChar char="•"/>
+              <a:defRPr sz="2000" kern="1200">
+                <a:solidFill>
+                  <a:schemeClr val="tx1"/>
+                </a:solidFill>
+                <a:latin typeface="+mn-lt"/>
+                <a:ea typeface="+mn-ea"/>
+                <a:cs typeface="+mn-cs"/>
+              </a:defRPr>
+            </a:lvl3pPr>
+            <a:lvl4pPr marL="1600200" indent="-228600" algn="l" defTabSz="914400" rtl="0" eaLnBrk="1" latinLnBrk="0" hangingPunct="1">
+              <a:lnSpc>
+                <a:spcPct val="90000"/>
+              </a:lnSpc>
+              <a:spcBef>
+                <a:spcPts val="500"/>
+              </a:spcBef>
+              <a:buFont typeface="Arial" panose="020B0604020202020204" pitchFamily="34" charset="0"/>
+              <a:buChar char="•"/>
+              <a:defRPr sz="1800" kern="1200">
+                <a:solidFill>
+                  <a:schemeClr val="tx1"/>
+                </a:solidFill>
+                <a:latin typeface="+mn-lt"/>
+                <a:ea typeface="+mn-ea"/>
+                <a:cs typeface="+mn-cs"/>
+              </a:defRPr>
+            </a:lvl4pPr>
+            <a:lvl5pPr marL="2057400" indent="-228600" algn="l" defTabSz="914400" rtl="0" eaLnBrk="1" latinLnBrk="0" hangingPunct="1">
+              <a:lnSpc>
+                <a:spcPct val="90000"/>
+              </a:lnSpc>
+              <a:spcBef>
+                <a:spcPts val="500"/>
+              </a:spcBef>
+              <a:buFont typeface="Arial" panose="020B0604020202020204" pitchFamily="34" charset="0"/>
+              <a:buChar char="•"/>
+              <a:defRPr sz="1800" kern="1200">
+                <a:solidFill>
+                  <a:schemeClr val="tx1"/>
+                </a:solidFill>
+                <a:latin typeface="+mn-lt"/>
+                <a:ea typeface="+mn-ea"/>
+                <a:cs typeface="+mn-cs"/>
+              </a:defRPr>
+            </a:lvl5pPr>
+            <a:lvl6pPr marL="2514600" indent="-228600" algn="l" defTabSz="914400" rtl="0" eaLnBrk="1" latinLnBrk="0" hangingPunct="1">
+              <a:lnSpc>
+                <a:spcPct val="90000"/>
+              </a:lnSpc>
+              <a:spcBef>
+                <a:spcPts val="500"/>
+              </a:spcBef>
+              <a:buFont typeface="Arial" panose="020B0604020202020204" pitchFamily="34" charset="0"/>
+              <a:buChar char="•"/>
+              <a:defRPr sz="1800" kern="1200">
+                <a:solidFill>
+                  <a:schemeClr val="tx1"/>
+                </a:solidFill>
+                <a:latin typeface="+mn-lt"/>
+                <a:ea typeface="+mn-ea"/>
+                <a:cs typeface="+mn-cs"/>
+              </a:defRPr>
+            </a:lvl6pPr>
+            <a:lvl7pPr marL="2971800" indent="-228600" algn="l" defTabSz="914400" rtl="0" eaLnBrk="1" latinLnBrk="0" hangingPunct="1">
+              <a:lnSpc>
+                <a:spcPct val="90000"/>
+              </a:lnSpc>
+              <a:spcBef>
+                <a:spcPts val="500"/>
+              </a:spcBef>
+              <a:buFont typeface="Arial" panose="020B0604020202020204" pitchFamily="34" charset="0"/>
+              <a:buChar char="•"/>
+              <a:defRPr sz="1800" kern="1200">
+                <a:solidFill>
+                  <a:schemeClr val="tx1"/>
+                </a:solidFill>
+                <a:latin typeface="+mn-lt"/>
+                <a:ea typeface="+mn-ea"/>
+                <a:cs typeface="+mn-cs"/>
+              </a:defRPr>
+            </a:lvl7pPr>
+            <a:lvl8pPr marL="3429000" indent="-228600" algn="l" defTabSz="914400" rtl="0" eaLnBrk="1" latinLnBrk="0" hangingPunct="1">
+              <a:lnSpc>
+                <a:spcPct val="90000"/>
+              </a:lnSpc>
+              <a:spcBef>
+                <a:spcPts val="500"/>
+              </a:spcBef>
+              <a:buFont typeface="Arial" panose="020B0604020202020204" pitchFamily="34" charset="0"/>
+              <a:buChar char="•"/>
+              <a:defRPr sz="1800" kern="1200">
+                <a:solidFill>
+                  <a:schemeClr val="tx1"/>
+                </a:solidFill>
+                <a:latin typeface="+mn-lt"/>
+                <a:ea typeface="+mn-ea"/>
+                <a:cs typeface="+mn-cs"/>
+              </a:defRPr>
+            </a:lvl8pPr>
+            <a:lvl9pPr marL="3886200" indent="-228600" algn="l" defTabSz="914400" rtl="0" eaLnBrk="1" latinLnBrk="0" hangingPunct="1">
+              <a:lnSpc>
+                <a:spcPct val="90000"/>
+              </a:lnSpc>
+              <a:spcBef>
+                <a:spcPts val="500"/>
+              </a:spcBef>
+              <a:buFont typeface="Arial" panose="020B0604020202020204" pitchFamily="34" charset="0"/>
+              <a:buChar char="•"/>
+              <a:defRPr sz="1800" kern="1200">
+                <a:solidFill>
+                  <a:schemeClr val="tx1"/>
+                </a:solidFill>
+                <a:latin typeface="+mn-lt"/>
+                <a:ea typeface="+mn-ea"/>
+                <a:cs typeface="+mn-cs"/>
+              </a:defRPr>
+            </a:lvl9pPr>
+          </a:lstStyle>
+          <a:p>
+            <a:pPr marL="0" indent="0">
+              <a:buNone/>
+            </a:pPr>
+            <a:endParaRPr lang="en-US" sz="2000" dirty="0">
+              <a:solidFill>
+                <a:srgbClr val="24292F"/>
+              </a:solidFill>
+              <a:latin typeface="-apple-system"/>
+            </a:endParaRPr>
+          </a:p>
+          <a:p>
+            <a:pPr marL="0" indent="0">
+              <a:buNone/>
+            </a:pPr>
+            <a:endParaRPr lang="en-US" sz="2000" b="1" dirty="0">
+              <a:solidFill>
+                <a:srgbClr val="24292F"/>
+              </a:solidFill>
+              <a:latin typeface="-apple-system"/>
+            </a:endParaRPr>
+          </a:p>
+        </p:txBody>
+      </p:sp>
+      <p:sp>
+        <p:nvSpPr>
+          <p:cNvPr id="34" name="内容占位符 2">
+            <a:extLst>
+              <a:ext uri="{FF2B5EF4-FFF2-40B4-BE49-F238E27FC236}">
+                <a16:creationId xmlns:a16="http://schemas.microsoft.com/office/drawing/2014/main" id="{975FEEE4-2250-4BE0-821E-30940D4EF265}"/>
+              </a:ext>
+            </a:extLst>
+          </p:cNvPr>
+          <p:cNvSpPr txBox="1">
+            <a:spLocks/>
+          </p:cNvSpPr>
+          <p:nvPr/>
+        </p:nvSpPr>
+        <p:spPr>
+          <a:xfrm>
+            <a:off x="532341" y="1250422"/>
+            <a:ext cx="11311950" cy="5000937"/>
+          </a:xfrm>
+          <a:prstGeom prst="rect">
+            <a:avLst/>
+          </a:prstGeom>
+        </p:spPr>
+        <p:txBody>
+          <a:bodyPr/>
+          <a:lstStyle>
+            <a:lvl1pPr marL="228600" indent="-228600" algn="l" defTabSz="914400" rtl="0" eaLnBrk="1" latinLnBrk="0" hangingPunct="1">
+              <a:lnSpc>
+                <a:spcPct val="90000"/>
+              </a:lnSpc>
+              <a:spcBef>
+                <a:spcPts val="1000"/>
+              </a:spcBef>
+              <a:buFont typeface="Arial" panose="020B0604020202020204" pitchFamily="34" charset="0"/>
+              <a:buChar char="•"/>
+              <a:defRPr sz="2800" kern="1200">
+                <a:solidFill>
+                  <a:schemeClr val="tx1"/>
+                </a:solidFill>
+                <a:latin typeface="+mn-lt"/>
+                <a:ea typeface="+mn-ea"/>
+                <a:cs typeface="+mn-cs"/>
+              </a:defRPr>
+            </a:lvl1pPr>
+            <a:lvl2pPr marL="685800" indent="-228600" algn="l" defTabSz="914400" rtl="0" eaLnBrk="1" latinLnBrk="0" hangingPunct="1">
+              <a:lnSpc>
+                <a:spcPct val="90000"/>
+              </a:lnSpc>
+              <a:spcBef>
+                <a:spcPts val="500"/>
+              </a:spcBef>
+              <a:buFont typeface="Arial" panose="020B0604020202020204" pitchFamily="34" charset="0"/>
+              <a:buChar char="•"/>
+              <a:defRPr sz="2400" kern="1200">
+                <a:solidFill>
+                  <a:schemeClr val="tx1"/>
+                </a:solidFill>
+                <a:latin typeface="+mn-lt"/>
+                <a:ea typeface="+mn-ea"/>
+                <a:cs typeface="+mn-cs"/>
+              </a:defRPr>
+            </a:lvl2pPr>
+            <a:lvl3pPr marL="1143000" indent="-228600" algn="l" defTabSz="914400" rtl="0" eaLnBrk="1" latinLnBrk="0" hangingPunct="1">
+              <a:lnSpc>
+                <a:spcPct val="90000"/>
+              </a:lnSpc>
+              <a:spcBef>
+                <a:spcPts val="500"/>
+              </a:spcBef>
+              <a:buFont typeface="Arial" panose="020B0604020202020204" pitchFamily="34" charset="0"/>
+              <a:buChar char="•"/>
+              <a:defRPr sz="2000" kern="1200">
+                <a:solidFill>
+                  <a:schemeClr val="tx1"/>
+                </a:solidFill>
+                <a:latin typeface="+mn-lt"/>
+                <a:ea typeface="+mn-ea"/>
+                <a:cs typeface="+mn-cs"/>
+              </a:defRPr>
+            </a:lvl3pPr>
+            <a:lvl4pPr marL="1600200" indent="-228600" algn="l" defTabSz="914400" rtl="0" eaLnBrk="1" latinLnBrk="0" hangingPunct="1">
+              <a:lnSpc>
+                <a:spcPct val="90000"/>
+              </a:lnSpc>
+              <a:spcBef>
+                <a:spcPts val="500"/>
+              </a:spcBef>
+              <a:buFont typeface="Arial" panose="020B0604020202020204" pitchFamily="34" charset="0"/>
+              <a:buChar char="•"/>
+              <a:defRPr sz="1800" kern="1200">
+                <a:solidFill>
+                  <a:schemeClr val="tx1"/>
+                </a:solidFill>
+                <a:latin typeface="+mn-lt"/>
+                <a:ea typeface="+mn-ea"/>
+                <a:cs typeface="+mn-cs"/>
+              </a:defRPr>
+            </a:lvl4pPr>
+            <a:lvl5pPr marL="2057400" indent="-228600" algn="l" defTabSz="914400" rtl="0" eaLnBrk="1" latinLnBrk="0" hangingPunct="1">
+              <a:lnSpc>
+                <a:spcPct val="90000"/>
+              </a:lnSpc>
+              <a:spcBef>
+                <a:spcPts val="500"/>
+              </a:spcBef>
+              <a:buFont typeface="Arial" panose="020B0604020202020204" pitchFamily="34" charset="0"/>
+              <a:buChar char="•"/>
+              <a:defRPr sz="1800" kern="1200">
+                <a:solidFill>
+                  <a:schemeClr val="tx1"/>
+                </a:solidFill>
+                <a:latin typeface="+mn-lt"/>
+                <a:ea typeface="+mn-ea"/>
+                <a:cs typeface="+mn-cs"/>
+              </a:defRPr>
+            </a:lvl5pPr>
+            <a:lvl6pPr marL="2514600" indent="-228600" algn="l" defTabSz="914400" rtl="0" eaLnBrk="1" latinLnBrk="0" hangingPunct="1">
+              <a:lnSpc>
+                <a:spcPct val="90000"/>
+              </a:lnSpc>
+              <a:spcBef>
+                <a:spcPts val="500"/>
+              </a:spcBef>
+              <a:buFont typeface="Arial" panose="020B0604020202020204" pitchFamily="34" charset="0"/>
+              <a:buChar char="•"/>
+              <a:defRPr sz="1800" kern="1200">
+                <a:solidFill>
+                  <a:schemeClr val="tx1"/>
+                </a:solidFill>
+                <a:latin typeface="+mn-lt"/>
+                <a:ea typeface="+mn-ea"/>
+                <a:cs typeface="+mn-cs"/>
+              </a:defRPr>
+            </a:lvl6pPr>
+            <a:lvl7pPr marL="2971800" indent="-228600" algn="l" defTabSz="914400" rtl="0" eaLnBrk="1" latinLnBrk="0" hangingPunct="1">
+              <a:lnSpc>
+                <a:spcPct val="90000"/>
+              </a:lnSpc>
+              <a:spcBef>
+                <a:spcPts val="500"/>
+              </a:spcBef>
+              <a:buFont typeface="Arial" panose="020B0604020202020204" pitchFamily="34" charset="0"/>
+              <a:buChar char="•"/>
+              <a:defRPr sz="1800" kern="1200">
+                <a:solidFill>
+                  <a:schemeClr val="tx1"/>
+                </a:solidFill>
+                <a:latin typeface="+mn-lt"/>
+                <a:ea typeface="+mn-ea"/>
+                <a:cs typeface="+mn-cs"/>
+              </a:defRPr>
+            </a:lvl7pPr>
+            <a:lvl8pPr marL="3429000" indent="-228600" algn="l" defTabSz="914400" rtl="0" eaLnBrk="1" latinLnBrk="0" hangingPunct="1">
+              <a:lnSpc>
+                <a:spcPct val="90000"/>
+              </a:lnSpc>
+              <a:spcBef>
+                <a:spcPts val="500"/>
+              </a:spcBef>
+              <a:buFont typeface="Arial" panose="020B0604020202020204" pitchFamily="34" charset="0"/>
+              <a:buChar char="•"/>
+              <a:defRPr sz="1800" kern="1200">
+                <a:solidFill>
+                  <a:schemeClr val="tx1"/>
+                </a:solidFill>
+                <a:latin typeface="+mn-lt"/>
+                <a:ea typeface="+mn-ea"/>
+                <a:cs typeface="+mn-cs"/>
+              </a:defRPr>
+            </a:lvl8pPr>
+            <a:lvl9pPr marL="3886200" indent="-228600" algn="l" defTabSz="914400" rtl="0" eaLnBrk="1" latinLnBrk="0" hangingPunct="1">
+              <a:lnSpc>
+                <a:spcPct val="90000"/>
+              </a:lnSpc>
+              <a:spcBef>
+                <a:spcPts val="500"/>
+              </a:spcBef>
+              <a:buFont typeface="Arial" panose="020B0604020202020204" pitchFamily="34" charset="0"/>
+              <a:buChar char="•"/>
+              <a:defRPr sz="1800" kern="1200">
+                <a:solidFill>
+                  <a:schemeClr val="tx1"/>
+                </a:solidFill>
+                <a:latin typeface="+mn-lt"/>
+                <a:ea typeface="+mn-ea"/>
+                <a:cs typeface="+mn-cs"/>
+              </a:defRPr>
+            </a:lvl9pPr>
+          </a:lstStyle>
+          <a:p>
+            <a:pPr marL="0" indent="0">
+              <a:buFont typeface="Arial" panose="020B0604020202020204" pitchFamily="34" charset="0"/>
+              <a:buNone/>
+            </a:pPr>
+            <a:r>
+              <a:rPr lang="en-GB" sz="2000" b="1" dirty="0"/>
+              <a:t>Web Attestation</a:t>
+            </a:r>
+            <a:r>
+              <a:rPr lang="en-US" sz="2000" b="1" dirty="0">
+                <a:solidFill>
+                  <a:srgbClr val="24292F"/>
+                </a:solidFill>
+              </a:rPr>
+              <a:t>:</a:t>
+            </a:r>
+          </a:p>
+          <a:p>
+            <a:pPr marL="0" indent="0">
+              <a:buFont typeface="Arial" panose="020B0604020202020204" pitchFamily="34" charset="0"/>
+              <a:buNone/>
+            </a:pPr>
+            <a:endParaRPr lang="en-US" sz="2000" b="1" dirty="0">
+              <a:solidFill>
+                <a:srgbClr val="24292F"/>
+              </a:solidFill>
+            </a:endParaRPr>
+          </a:p>
+          <a:p>
+            <a:pPr marL="457200" indent="-457200">
+              <a:buFont typeface="Arial" panose="020B0604020202020204" pitchFamily="34" charset="0"/>
+              <a:buAutoNum type="arabicPeriod"/>
+            </a:pPr>
+            <a:r>
+              <a:rPr lang="en-US" sz="2000" dirty="0">
+                <a:solidFill>
+                  <a:srgbClr val="24292F"/>
+                </a:solidFill>
+              </a:rPr>
+              <a:t>Result merge module: Added and tested.</a:t>
+            </a:r>
+          </a:p>
+          <a:p>
+            <a:pPr marL="457200" indent="-457200">
+              <a:buFont typeface="Arial" panose="020B0604020202020204" pitchFamily="34" charset="0"/>
+              <a:buAutoNum type="arabicPeriod"/>
+            </a:pPr>
+            <a:r>
+              <a:rPr lang="en-US" sz="2000" dirty="0">
+                <a:solidFill>
+                  <a:srgbClr val="24292F"/>
+                </a:solidFill>
+                <a:latin typeface="-apple-system"/>
+              </a:rPr>
+              <a:t>Background pool: Added (tested 2 process running)</a:t>
+            </a:r>
+          </a:p>
+          <a:p>
+            <a:pPr marL="457200" indent="-457200">
+              <a:buFont typeface="Arial" panose="020B0604020202020204" pitchFamily="34" charset="0"/>
+              <a:buAutoNum type="arabicPeriod"/>
+            </a:pPr>
+            <a:r>
+              <a:rPr lang="en-US" sz="2000" dirty="0">
+                <a:solidFill>
+                  <a:srgbClr val="24292F"/>
+                </a:solidFill>
+                <a:latin typeface="-apple-system"/>
+              </a:rPr>
+              <a:t>Problem: Web Screenshot capture module not work if the execute computer doesn’t have any graph API. [Still working on fixing this problem ]</a:t>
+            </a:r>
+            <a:endParaRPr lang="en-US" sz="2000" dirty="0">
+              <a:solidFill>
+                <a:srgbClr val="24292F"/>
+              </a:solidFill>
+            </a:endParaRPr>
+          </a:p>
+          <a:p>
+            <a:pPr marL="0" indent="0">
+              <a:buNone/>
+            </a:pPr>
+            <a:endParaRPr lang="en-US" sz="2000" dirty="0">
+              <a:solidFill>
+                <a:srgbClr val="24292F"/>
+              </a:solidFill>
+            </a:endParaRPr>
+          </a:p>
+          <a:p>
+            <a:pPr marL="0" indent="0">
+              <a:buNone/>
+            </a:pPr>
+            <a:r>
+              <a:rPr lang="en-SG" sz="1800" b="1" i="0" dirty="0" err="1">
+                <a:solidFill>
+                  <a:srgbClr val="242424"/>
+                </a:solidFill>
+                <a:effectLst/>
+                <a:latin typeface="Segoe UI" panose="020B0502040204020203" pitchFamily="34" charset="0"/>
+              </a:rPr>
+              <a:t>Cryptoscam</a:t>
+            </a:r>
+            <a:r>
+              <a:rPr lang="en-SG" sz="1800" b="1" i="0" dirty="0">
+                <a:solidFill>
+                  <a:srgbClr val="242424"/>
+                </a:solidFill>
+                <a:effectLst/>
+                <a:latin typeface="Segoe UI" panose="020B0502040204020203" pitchFamily="34" charset="0"/>
+              </a:rPr>
+              <a:t> URLs Parse Module: </a:t>
+            </a:r>
+          </a:p>
+          <a:p>
+            <a:pPr marL="457200" indent="-457200">
+              <a:buAutoNum type="arabicPeriod"/>
+            </a:pPr>
+            <a:r>
+              <a:rPr lang="en-US" sz="2000" dirty="0">
+                <a:solidFill>
+                  <a:srgbClr val="24292F"/>
+                </a:solidFill>
+                <a:latin typeface="-apple-system"/>
+              </a:rPr>
+              <a:t>Added the </a:t>
+            </a:r>
+            <a:r>
+              <a:rPr lang="en-US" sz="2000" dirty="0" err="1">
+                <a:solidFill>
+                  <a:srgbClr val="24292F"/>
+                </a:solidFill>
+                <a:latin typeface="-apple-system"/>
+              </a:rPr>
+              <a:t>yaml</a:t>
+            </a:r>
+            <a:r>
+              <a:rPr lang="en-US" sz="2000" dirty="0">
+                <a:solidFill>
+                  <a:srgbClr val="24292F"/>
+                </a:solidFill>
+                <a:latin typeface="-apple-system"/>
+              </a:rPr>
+              <a:t> file parse script: </a:t>
+            </a:r>
+            <a:r>
+              <a:rPr lang="en-US" sz="2000" dirty="0">
+                <a:solidFill>
+                  <a:srgbClr val="24292F"/>
+                </a:solidFill>
+                <a:latin typeface="-apple-system"/>
+                <a:hlinkClick r:id="rId2"/>
+              </a:rPr>
+              <a:t>https://github.com/LiuYuancheng/WebAttestation/blob/main/src/dataParser/yaml2csv.py</a:t>
+            </a:r>
+            <a:endParaRPr lang="en-US" sz="2000" dirty="0">
+              <a:solidFill>
+                <a:srgbClr val="24292F"/>
+              </a:solidFill>
+              <a:latin typeface="-apple-system"/>
+            </a:endParaRPr>
+          </a:p>
+          <a:p>
+            <a:pPr marL="0" indent="0">
+              <a:buNone/>
+            </a:pPr>
+            <a:endParaRPr lang="en-US" sz="2000" dirty="0">
+              <a:solidFill>
+                <a:srgbClr val="24292F"/>
+              </a:solidFill>
+              <a:latin typeface="-apple-system"/>
+            </a:endParaRPr>
+          </a:p>
+          <a:p>
+            <a:pPr marL="0" indent="0">
+              <a:buNone/>
+            </a:pPr>
+            <a:endParaRPr lang="en-US" sz="2000" b="1" dirty="0">
+              <a:solidFill>
+                <a:srgbClr val="24292F"/>
+              </a:solidFill>
+              <a:latin typeface="-apple-system"/>
+            </a:endParaRPr>
+          </a:p>
+        </p:txBody>
+      </p:sp>
+    </p:spTree>
+    <p:extLst>
+      <p:ext uri="{BB962C8B-B14F-4D97-AF65-F5344CB8AC3E}">
+        <p14:creationId xmlns:p14="http://schemas.microsoft.com/office/powerpoint/2010/main" val="3600275784"/>
       </p:ext>
     </p:extLst>
   </p:cSld>

</xml_diff>

<commit_message>
Update the progress report.
</commit_message>
<xml_diff>
--- a/doc/progress.pptx
+++ b/doc/progress.pptx
@@ -4,6 +4,9 @@
   <p:sldMasterIdLst>
     <p:sldMasterId id="2147483648" r:id="rId1"/>
   </p:sldMasterIdLst>
+  <p:notesMasterIdLst>
+    <p:notesMasterId r:id="rId19"/>
+  </p:notesMasterIdLst>
   <p:sldIdLst>
     <p:sldId id="2076137610" r:id="rId2"/>
     <p:sldId id="2076137613" r:id="rId3"/>
@@ -21,6 +24,7 @@
     <p:sldId id="2076137622" r:id="rId15"/>
     <p:sldId id="2076137623" r:id="rId16"/>
     <p:sldId id="2076137624" r:id="rId17"/>
+    <p:sldId id="2076137625" r:id="rId18"/>
   </p:sldIdLst>
   <p:sldSz cx="12192000" cy="6858000"/>
   <p:notesSz cx="6858000" cy="9144000"/>
@@ -127,6 +131,440 @@
 </p:presentation>
 </file>
 
+<file path=ppt/notesMasters/notesMaster1.xml><?xml version="1.0" encoding="utf-8"?>
+<p:notesMaster xmlns:a="http://schemas.openxmlformats.org/drawingml/2006/main" xmlns:r="http://schemas.openxmlformats.org/officeDocument/2006/relationships" xmlns:p="http://schemas.openxmlformats.org/presentationml/2006/main">
+  <p:cSld>
+    <p:bg>
+      <p:bgRef idx="1001">
+        <a:schemeClr val="bg1"/>
+      </p:bgRef>
+    </p:bg>
+    <p:spTree>
+      <p:nvGrpSpPr>
+        <p:cNvPr id="1" name=""/>
+        <p:cNvGrpSpPr/>
+        <p:nvPr/>
+      </p:nvGrpSpPr>
+      <p:grpSpPr>
+        <a:xfrm>
+          <a:off x="0" y="0"/>
+          <a:ext cx="0" cy="0"/>
+          <a:chOff x="0" y="0"/>
+          <a:chExt cx="0" cy="0"/>
+        </a:xfrm>
+      </p:grpSpPr>
+      <p:sp>
+        <p:nvSpPr>
+          <p:cNvPr id="2" name="Header Placeholder 1"/>
+          <p:cNvSpPr>
+            <a:spLocks noGrp="1"/>
+          </p:cNvSpPr>
+          <p:nvPr>
+            <p:ph type="hdr" sz="quarter"/>
+          </p:nvPr>
+        </p:nvSpPr>
+        <p:spPr>
+          <a:xfrm>
+            <a:off x="0" y="0"/>
+            <a:ext cx="2971800" cy="458788"/>
+          </a:xfrm>
+          <a:prstGeom prst="rect">
+            <a:avLst/>
+          </a:prstGeom>
+        </p:spPr>
+        <p:txBody>
+          <a:bodyPr vert="horz" lIns="91440" tIns="45720" rIns="91440" bIns="45720" rtlCol="0"/>
+          <a:lstStyle>
+            <a:lvl1pPr algn="l">
+              <a:defRPr sz="1200"/>
+            </a:lvl1pPr>
+          </a:lstStyle>
+          <a:p>
+            <a:endParaRPr lang="en-SG"/>
+          </a:p>
+        </p:txBody>
+      </p:sp>
+      <p:sp>
+        <p:nvSpPr>
+          <p:cNvPr id="3" name="Date Placeholder 2"/>
+          <p:cNvSpPr>
+            <a:spLocks noGrp="1"/>
+          </p:cNvSpPr>
+          <p:nvPr>
+            <p:ph type="dt" idx="1"/>
+          </p:nvPr>
+        </p:nvSpPr>
+        <p:spPr>
+          <a:xfrm>
+            <a:off x="3884613" y="0"/>
+            <a:ext cx="2971800" cy="458788"/>
+          </a:xfrm>
+          <a:prstGeom prst="rect">
+            <a:avLst/>
+          </a:prstGeom>
+        </p:spPr>
+        <p:txBody>
+          <a:bodyPr vert="horz" lIns="91440" tIns="45720" rIns="91440" bIns="45720" rtlCol="0"/>
+          <a:lstStyle>
+            <a:lvl1pPr algn="r">
+              <a:defRPr sz="1200"/>
+            </a:lvl1pPr>
+          </a:lstStyle>
+          <a:p>
+            <a:fld id="{470B285A-87FA-4EAE-A6AD-5193544B864D}" type="datetimeFigureOut">
+              <a:rPr lang="en-SG" smtClean="0"/>
+              <a:t>13/1/2022</a:t>
+            </a:fld>
+            <a:endParaRPr lang="en-SG"/>
+          </a:p>
+        </p:txBody>
+      </p:sp>
+      <p:sp>
+        <p:nvSpPr>
+          <p:cNvPr id="4" name="Slide Image Placeholder 3"/>
+          <p:cNvSpPr>
+            <a:spLocks noGrp="1" noRot="1" noChangeAspect="1"/>
+          </p:cNvSpPr>
+          <p:nvPr>
+            <p:ph type="sldImg" idx="2"/>
+          </p:nvPr>
+        </p:nvSpPr>
+        <p:spPr>
+          <a:xfrm>
+            <a:off x="685800" y="1143000"/>
+            <a:ext cx="5486400" cy="3086100"/>
+          </a:xfrm>
+          <a:prstGeom prst="rect">
+            <a:avLst/>
+          </a:prstGeom>
+          <a:noFill/>
+          <a:ln w="12700">
+            <a:solidFill>
+              <a:prstClr val="black"/>
+            </a:solidFill>
+          </a:ln>
+        </p:spPr>
+        <p:txBody>
+          <a:bodyPr vert="horz" lIns="91440" tIns="45720" rIns="91440" bIns="45720" rtlCol="0" anchor="ctr"/>
+          <a:lstStyle/>
+          <a:p>
+            <a:endParaRPr lang="en-SG"/>
+          </a:p>
+        </p:txBody>
+      </p:sp>
+      <p:sp>
+        <p:nvSpPr>
+          <p:cNvPr id="5" name="Notes Placeholder 4"/>
+          <p:cNvSpPr>
+            <a:spLocks noGrp="1"/>
+          </p:cNvSpPr>
+          <p:nvPr>
+            <p:ph type="body" sz="quarter" idx="3"/>
+          </p:nvPr>
+        </p:nvSpPr>
+        <p:spPr>
+          <a:xfrm>
+            <a:off x="685800" y="4400550"/>
+            <a:ext cx="5486400" cy="3600450"/>
+          </a:xfrm>
+          <a:prstGeom prst="rect">
+            <a:avLst/>
+          </a:prstGeom>
+        </p:spPr>
+        <p:txBody>
+          <a:bodyPr vert="horz" lIns="91440" tIns="45720" rIns="91440" bIns="45720" rtlCol="0"/>
+          <a:lstStyle/>
+          <a:p>
+            <a:pPr lvl="0"/>
+            <a:r>
+              <a:rPr lang="en-US"/>
+              <a:t>Click to edit Master text styles</a:t>
+            </a:r>
+          </a:p>
+          <a:p>
+            <a:pPr lvl="1"/>
+            <a:r>
+              <a:rPr lang="en-US"/>
+              <a:t>Second level</a:t>
+            </a:r>
+          </a:p>
+          <a:p>
+            <a:pPr lvl="2"/>
+            <a:r>
+              <a:rPr lang="en-US"/>
+              <a:t>Third level</a:t>
+            </a:r>
+          </a:p>
+          <a:p>
+            <a:pPr lvl="3"/>
+            <a:r>
+              <a:rPr lang="en-US"/>
+              <a:t>Fourth level</a:t>
+            </a:r>
+          </a:p>
+          <a:p>
+            <a:pPr lvl="4"/>
+            <a:r>
+              <a:rPr lang="en-US"/>
+              <a:t>Fifth level</a:t>
+            </a:r>
+            <a:endParaRPr lang="en-SG"/>
+          </a:p>
+        </p:txBody>
+      </p:sp>
+      <p:sp>
+        <p:nvSpPr>
+          <p:cNvPr id="6" name="Footer Placeholder 5"/>
+          <p:cNvSpPr>
+            <a:spLocks noGrp="1"/>
+          </p:cNvSpPr>
+          <p:nvPr>
+            <p:ph type="ftr" sz="quarter" idx="4"/>
+          </p:nvPr>
+        </p:nvSpPr>
+        <p:spPr>
+          <a:xfrm>
+            <a:off x="0" y="8685213"/>
+            <a:ext cx="2971800" cy="458787"/>
+          </a:xfrm>
+          <a:prstGeom prst="rect">
+            <a:avLst/>
+          </a:prstGeom>
+        </p:spPr>
+        <p:txBody>
+          <a:bodyPr vert="horz" lIns="91440" tIns="45720" rIns="91440" bIns="45720" rtlCol="0" anchor="b"/>
+          <a:lstStyle>
+            <a:lvl1pPr algn="l">
+              <a:defRPr sz="1200"/>
+            </a:lvl1pPr>
+          </a:lstStyle>
+          <a:p>
+            <a:endParaRPr lang="en-SG"/>
+          </a:p>
+        </p:txBody>
+      </p:sp>
+      <p:sp>
+        <p:nvSpPr>
+          <p:cNvPr id="7" name="Slide Number Placeholder 6"/>
+          <p:cNvSpPr>
+            <a:spLocks noGrp="1"/>
+          </p:cNvSpPr>
+          <p:nvPr>
+            <p:ph type="sldNum" sz="quarter" idx="5"/>
+          </p:nvPr>
+        </p:nvSpPr>
+        <p:spPr>
+          <a:xfrm>
+            <a:off x="3884613" y="8685213"/>
+            <a:ext cx="2971800" cy="458787"/>
+          </a:xfrm>
+          <a:prstGeom prst="rect">
+            <a:avLst/>
+          </a:prstGeom>
+        </p:spPr>
+        <p:txBody>
+          <a:bodyPr vert="horz" lIns="91440" tIns="45720" rIns="91440" bIns="45720" rtlCol="0" anchor="b"/>
+          <a:lstStyle>
+            <a:lvl1pPr algn="r">
+              <a:defRPr sz="1200"/>
+            </a:lvl1pPr>
+          </a:lstStyle>
+          <a:p>
+            <a:fld id="{0BCFD31E-06BD-41D2-9BC4-CDF0AC669AA2}" type="slidenum">
+              <a:rPr lang="en-SG" smtClean="0"/>
+              <a:t>‹#›</a:t>
+            </a:fld>
+            <a:endParaRPr lang="en-SG"/>
+          </a:p>
+        </p:txBody>
+      </p:sp>
+    </p:spTree>
+    <p:extLst>
+      <p:ext uri="{BB962C8B-B14F-4D97-AF65-F5344CB8AC3E}">
+        <p14:creationId xmlns:p14="http://schemas.microsoft.com/office/powerpoint/2010/main" val="2270972919"/>
+      </p:ext>
+    </p:extLst>
+  </p:cSld>
+  <p:clrMap bg1="lt1" tx1="dk1" bg2="lt2" tx2="dk2" accent1="accent1" accent2="accent2" accent3="accent3" accent4="accent4" accent5="accent5" accent6="accent6" hlink="hlink" folHlink="folHlink"/>
+  <p:notesStyle>
+    <a:lvl1pPr marL="0" algn="l" defTabSz="914400" rtl="0" eaLnBrk="1" latinLnBrk="0" hangingPunct="1">
+      <a:defRPr sz="1200" kern="1200">
+        <a:solidFill>
+          <a:schemeClr val="tx1"/>
+        </a:solidFill>
+        <a:latin typeface="+mn-lt"/>
+        <a:ea typeface="+mn-ea"/>
+        <a:cs typeface="+mn-cs"/>
+      </a:defRPr>
+    </a:lvl1pPr>
+    <a:lvl2pPr marL="457200" algn="l" defTabSz="914400" rtl="0" eaLnBrk="1" latinLnBrk="0" hangingPunct="1">
+      <a:defRPr sz="1200" kern="1200">
+        <a:solidFill>
+          <a:schemeClr val="tx1"/>
+        </a:solidFill>
+        <a:latin typeface="+mn-lt"/>
+        <a:ea typeface="+mn-ea"/>
+        <a:cs typeface="+mn-cs"/>
+      </a:defRPr>
+    </a:lvl2pPr>
+    <a:lvl3pPr marL="914400" algn="l" defTabSz="914400" rtl="0" eaLnBrk="1" latinLnBrk="0" hangingPunct="1">
+      <a:defRPr sz="1200" kern="1200">
+        <a:solidFill>
+          <a:schemeClr val="tx1"/>
+        </a:solidFill>
+        <a:latin typeface="+mn-lt"/>
+        <a:ea typeface="+mn-ea"/>
+        <a:cs typeface="+mn-cs"/>
+      </a:defRPr>
+    </a:lvl3pPr>
+    <a:lvl4pPr marL="1371600" algn="l" defTabSz="914400" rtl="0" eaLnBrk="1" latinLnBrk="0" hangingPunct="1">
+      <a:defRPr sz="1200" kern="1200">
+        <a:solidFill>
+          <a:schemeClr val="tx1"/>
+        </a:solidFill>
+        <a:latin typeface="+mn-lt"/>
+        <a:ea typeface="+mn-ea"/>
+        <a:cs typeface="+mn-cs"/>
+      </a:defRPr>
+    </a:lvl4pPr>
+    <a:lvl5pPr marL="1828800" algn="l" defTabSz="914400" rtl="0" eaLnBrk="1" latinLnBrk="0" hangingPunct="1">
+      <a:defRPr sz="1200" kern="1200">
+        <a:solidFill>
+          <a:schemeClr val="tx1"/>
+        </a:solidFill>
+        <a:latin typeface="+mn-lt"/>
+        <a:ea typeface="+mn-ea"/>
+        <a:cs typeface="+mn-cs"/>
+      </a:defRPr>
+    </a:lvl5pPr>
+    <a:lvl6pPr marL="2286000" algn="l" defTabSz="914400" rtl="0" eaLnBrk="1" latinLnBrk="0" hangingPunct="1">
+      <a:defRPr sz="1200" kern="1200">
+        <a:solidFill>
+          <a:schemeClr val="tx1"/>
+        </a:solidFill>
+        <a:latin typeface="+mn-lt"/>
+        <a:ea typeface="+mn-ea"/>
+        <a:cs typeface="+mn-cs"/>
+      </a:defRPr>
+    </a:lvl6pPr>
+    <a:lvl7pPr marL="2743200" algn="l" defTabSz="914400" rtl="0" eaLnBrk="1" latinLnBrk="0" hangingPunct="1">
+      <a:defRPr sz="1200" kern="1200">
+        <a:solidFill>
+          <a:schemeClr val="tx1"/>
+        </a:solidFill>
+        <a:latin typeface="+mn-lt"/>
+        <a:ea typeface="+mn-ea"/>
+        <a:cs typeface="+mn-cs"/>
+      </a:defRPr>
+    </a:lvl7pPr>
+    <a:lvl8pPr marL="3200400" algn="l" defTabSz="914400" rtl="0" eaLnBrk="1" latinLnBrk="0" hangingPunct="1">
+      <a:defRPr sz="1200" kern="1200">
+        <a:solidFill>
+          <a:schemeClr val="tx1"/>
+        </a:solidFill>
+        <a:latin typeface="+mn-lt"/>
+        <a:ea typeface="+mn-ea"/>
+        <a:cs typeface="+mn-cs"/>
+      </a:defRPr>
+    </a:lvl8pPr>
+    <a:lvl9pPr marL="3657600" algn="l" defTabSz="914400" rtl="0" eaLnBrk="1" latinLnBrk="0" hangingPunct="1">
+      <a:defRPr sz="1200" kern="1200">
+        <a:solidFill>
+          <a:schemeClr val="tx1"/>
+        </a:solidFill>
+        <a:latin typeface="+mn-lt"/>
+        <a:ea typeface="+mn-ea"/>
+        <a:cs typeface="+mn-cs"/>
+      </a:defRPr>
+    </a:lvl9pPr>
+  </p:notesStyle>
+</p:notesMaster>
+</file>
+
+<file path=ppt/notesSlides/notesSlide1.xml><?xml version="1.0" encoding="utf-8"?>
+<p:notes xmlns:a="http://schemas.openxmlformats.org/drawingml/2006/main" xmlns:r="http://schemas.openxmlformats.org/officeDocument/2006/relationships" xmlns:p="http://schemas.openxmlformats.org/presentationml/2006/main">
+  <p:cSld>
+    <p:spTree>
+      <p:nvGrpSpPr>
+        <p:cNvPr id="1" name=""/>
+        <p:cNvGrpSpPr/>
+        <p:nvPr/>
+      </p:nvGrpSpPr>
+      <p:grpSpPr>
+        <a:xfrm>
+          <a:off x="0" y="0"/>
+          <a:ext cx="0" cy="0"/>
+          <a:chOff x="0" y="0"/>
+          <a:chExt cx="0" cy="0"/>
+        </a:xfrm>
+      </p:grpSpPr>
+      <p:sp>
+        <p:nvSpPr>
+          <p:cNvPr id="2" name="Slide Image Placeholder 1"/>
+          <p:cNvSpPr>
+            <a:spLocks noGrp="1" noRot="1" noChangeAspect="1"/>
+          </p:cNvSpPr>
+          <p:nvPr>
+            <p:ph type="sldImg"/>
+          </p:nvPr>
+        </p:nvSpPr>
+        <p:spPr/>
+      </p:sp>
+      <p:sp>
+        <p:nvSpPr>
+          <p:cNvPr id="3" name="Notes Placeholder 2"/>
+          <p:cNvSpPr>
+            <a:spLocks noGrp="1"/>
+          </p:cNvSpPr>
+          <p:nvPr>
+            <p:ph type="body" idx="1"/>
+          </p:nvPr>
+        </p:nvSpPr>
+        <p:spPr/>
+        <p:txBody>
+          <a:bodyPr/>
+          <a:lstStyle/>
+          <a:p>
+            <a:endParaRPr lang="en-SG" dirty="0"/>
+          </a:p>
+        </p:txBody>
+      </p:sp>
+      <p:sp>
+        <p:nvSpPr>
+          <p:cNvPr id="4" name="Slide Number Placeholder 3"/>
+          <p:cNvSpPr>
+            <a:spLocks noGrp="1"/>
+          </p:cNvSpPr>
+          <p:nvPr>
+            <p:ph type="sldNum" sz="quarter" idx="5"/>
+          </p:nvPr>
+        </p:nvSpPr>
+        <p:spPr/>
+        <p:txBody>
+          <a:bodyPr/>
+          <a:lstStyle/>
+          <a:p>
+            <a:fld id="{0BCFD31E-06BD-41D2-9BC4-CDF0AC669AA2}" type="slidenum">
+              <a:rPr lang="en-SG" smtClean="0"/>
+              <a:t>17</a:t>
+            </a:fld>
+            <a:endParaRPr lang="en-SG"/>
+          </a:p>
+        </p:txBody>
+      </p:sp>
+    </p:spTree>
+    <p:extLst>
+      <p:ext uri="{BB962C8B-B14F-4D97-AF65-F5344CB8AC3E}">
+        <p14:creationId xmlns:p14="http://schemas.microsoft.com/office/powerpoint/2010/main" val="4064822472"/>
+      </p:ext>
+    </p:extLst>
+  </p:cSld>
+  <p:clrMapOvr>
+    <a:masterClrMapping/>
+  </p:clrMapOvr>
+</p:notes>
+</file>
+
 <file path=ppt/slideLayouts/slideLayout1.xml><?xml version="1.0" encoding="utf-8"?>
 <p:sldLayout xmlns:a="http://schemas.openxmlformats.org/drawingml/2006/main" xmlns:r="http://schemas.openxmlformats.org/officeDocument/2006/relationships" xmlns:p="http://schemas.openxmlformats.org/presentationml/2006/main" type="title" preserve="1">
   <p:cSld name="Title Slide">
@@ -276,7 +714,7 @@
           <a:p>
             <a:fld id="{CF1267A5-9448-410E-9905-2BFAF5898020}" type="datetimeFigureOut">
               <a:rPr lang="en-SG" smtClean="0"/>
-              <a:t>6/1/2022</a:t>
+              <a:t>13/1/2022</a:t>
             </a:fld>
             <a:endParaRPr lang="en-SG"/>
           </a:p>
@@ -476,7 +914,7 @@
           <a:p>
             <a:fld id="{CF1267A5-9448-410E-9905-2BFAF5898020}" type="datetimeFigureOut">
               <a:rPr lang="en-SG" smtClean="0"/>
-              <a:t>6/1/2022</a:t>
+              <a:t>13/1/2022</a:t>
             </a:fld>
             <a:endParaRPr lang="en-SG"/>
           </a:p>
@@ -686,7 +1124,7 @@
           <a:p>
             <a:fld id="{CF1267A5-9448-410E-9905-2BFAF5898020}" type="datetimeFigureOut">
               <a:rPr lang="en-SG" smtClean="0"/>
-              <a:t>6/1/2022</a:t>
+              <a:t>13/1/2022</a:t>
             </a:fld>
             <a:endParaRPr lang="en-SG"/>
           </a:p>
@@ -2091,7 +2529,7 @@
           <a:p>
             <a:fld id="{CF1267A5-9448-410E-9905-2BFAF5898020}" type="datetimeFigureOut">
               <a:rPr lang="en-SG" smtClean="0"/>
-              <a:t>6/1/2022</a:t>
+              <a:t>13/1/2022</a:t>
             </a:fld>
             <a:endParaRPr lang="en-SG"/>
           </a:p>
@@ -2367,7 +2805,7 @@
           <a:p>
             <a:fld id="{CF1267A5-9448-410E-9905-2BFAF5898020}" type="datetimeFigureOut">
               <a:rPr lang="en-SG" smtClean="0"/>
-              <a:t>6/1/2022</a:t>
+              <a:t>13/1/2022</a:t>
             </a:fld>
             <a:endParaRPr lang="en-SG"/>
           </a:p>
@@ -2635,7 +3073,7 @@
           <a:p>
             <a:fld id="{CF1267A5-9448-410E-9905-2BFAF5898020}" type="datetimeFigureOut">
               <a:rPr lang="en-SG" smtClean="0"/>
-              <a:t>6/1/2022</a:t>
+              <a:t>13/1/2022</a:t>
             </a:fld>
             <a:endParaRPr lang="en-SG"/>
           </a:p>
@@ -3050,7 +3488,7 @@
           <a:p>
             <a:fld id="{CF1267A5-9448-410E-9905-2BFAF5898020}" type="datetimeFigureOut">
               <a:rPr lang="en-SG" smtClean="0"/>
-              <a:t>6/1/2022</a:t>
+              <a:t>13/1/2022</a:t>
             </a:fld>
             <a:endParaRPr lang="en-SG"/>
           </a:p>
@@ -3192,7 +3630,7 @@
           <a:p>
             <a:fld id="{CF1267A5-9448-410E-9905-2BFAF5898020}" type="datetimeFigureOut">
               <a:rPr lang="en-SG" smtClean="0"/>
-              <a:t>6/1/2022</a:t>
+              <a:t>13/1/2022</a:t>
             </a:fld>
             <a:endParaRPr lang="en-SG"/>
           </a:p>
@@ -3305,7 +3743,7 @@
           <a:p>
             <a:fld id="{CF1267A5-9448-410E-9905-2BFAF5898020}" type="datetimeFigureOut">
               <a:rPr lang="en-SG" smtClean="0"/>
-              <a:t>6/1/2022</a:t>
+              <a:t>13/1/2022</a:t>
             </a:fld>
             <a:endParaRPr lang="en-SG"/>
           </a:p>
@@ -3618,7 +4056,7 @@
           <a:p>
             <a:fld id="{CF1267A5-9448-410E-9905-2BFAF5898020}" type="datetimeFigureOut">
               <a:rPr lang="en-SG" smtClean="0"/>
-              <a:t>6/1/2022</a:t>
+              <a:t>13/1/2022</a:t>
             </a:fld>
             <a:endParaRPr lang="en-SG"/>
           </a:p>
@@ -3907,7 +4345,7 @@
           <a:p>
             <a:fld id="{CF1267A5-9448-410E-9905-2BFAF5898020}" type="datetimeFigureOut">
               <a:rPr lang="en-SG" smtClean="0"/>
-              <a:t>6/1/2022</a:t>
+              <a:t>13/1/2022</a:t>
             </a:fld>
             <a:endParaRPr lang="en-SG"/>
           </a:p>
@@ -4150,7 +4588,7 @@
           <a:p>
             <a:fld id="{CF1267A5-9448-410E-9905-2BFAF5898020}" type="datetimeFigureOut">
               <a:rPr lang="en-SG" smtClean="0"/>
-              <a:t>6/1/2022</a:t>
+              <a:t>13/1/2022</a:t>
             </a:fld>
             <a:endParaRPr lang="en-SG"/>
           </a:p>
@@ -15533,12 +15971,12 @@
               <a:t> check and % of phishing </a:t>
             </a:r>
             <a:r>
-              <a:rPr lang="en-US" sz="2000">
+              <a:rPr lang="en-US" sz="2000" dirty="0" err="1">
                 <a:solidFill>
                   <a:srgbClr val="24292F"/>
                 </a:solidFill>
               </a:rPr>
-              <a:t>url. </a:t>
+              <a:t>url</a:t>
             </a:r>
             <a:r>
               <a:rPr lang="en-US" sz="2000" dirty="0">
@@ -15546,7 +15984,7 @@
                   <a:srgbClr val="24292F"/>
                 </a:solidFill>
               </a:rPr>
-              <a:t>(under editing)</a:t>
+              <a:t>. (under editing)</a:t>
             </a:r>
           </a:p>
           <a:p>
@@ -15613,6 +16051,1327 @@
     <p:extLst>
       <p:ext uri="{BB962C8B-B14F-4D97-AF65-F5344CB8AC3E}">
         <p14:creationId xmlns:p14="http://schemas.microsoft.com/office/powerpoint/2010/main" val="2669399116"/>
+      </p:ext>
+    </p:extLst>
+  </p:cSld>
+  <p:clrMapOvr>
+    <a:masterClrMapping/>
+  </p:clrMapOvr>
+  <p:transition/>
+</p:sld>
+</file>
+
+<file path=ppt/slides/slide17.xml><?xml version="1.0" encoding="utf-8"?>
+<p:sld xmlns:a="http://schemas.openxmlformats.org/drawingml/2006/main" xmlns:r="http://schemas.openxmlformats.org/officeDocument/2006/relationships" xmlns:p="http://schemas.openxmlformats.org/presentationml/2006/main">
+  <p:cSld>
+    <p:spTree>
+      <p:nvGrpSpPr>
+        <p:cNvPr id="1" name=""/>
+        <p:cNvGrpSpPr/>
+        <p:nvPr/>
+      </p:nvGrpSpPr>
+      <p:grpSpPr>
+        <a:xfrm>
+          <a:off x="0" y="0"/>
+          <a:ext cx="0" cy="0"/>
+          <a:chOff x="0" y="0"/>
+          <a:chExt cx="0" cy="0"/>
+        </a:xfrm>
+      </p:grpSpPr>
+      <p:sp>
+        <p:nvSpPr>
+          <p:cNvPr id="2" name="Title 1">
+            <a:extLst>
+              <a:ext uri="{FF2B5EF4-FFF2-40B4-BE49-F238E27FC236}">
+                <a16:creationId xmlns:a16="http://schemas.microsoft.com/office/drawing/2014/main" id="{221A4FF2-258D-5B43-9F67-E984C9974D8C}"/>
+              </a:ext>
+            </a:extLst>
+          </p:cNvPr>
+          <p:cNvSpPr>
+            <a:spLocks noGrp="1"/>
+          </p:cNvSpPr>
+          <p:nvPr>
+            <p:ph type="title"/>
+          </p:nvPr>
+        </p:nvSpPr>
+        <p:spPr>
+          <a:xfrm>
+            <a:off x="379941" y="294104"/>
+            <a:ext cx="10995949" cy="803918"/>
+          </a:xfrm>
+        </p:spPr>
+        <p:txBody>
+          <a:bodyPr/>
+          <a:lstStyle/>
+          <a:p>
+            <a:r>
+              <a:rPr lang="en-GB" dirty="0"/>
+              <a:t>Development work [13/01/2022]</a:t>
+            </a:r>
+            <a:endParaRPr lang="en-US" dirty="0"/>
+          </a:p>
+        </p:txBody>
+      </p:sp>
+      <p:sp>
+        <p:nvSpPr>
+          <p:cNvPr id="55" name="内容占位符 2">
+            <a:extLst>
+              <a:ext uri="{FF2B5EF4-FFF2-40B4-BE49-F238E27FC236}">
+                <a16:creationId xmlns:a16="http://schemas.microsoft.com/office/drawing/2014/main" id="{6CEE3007-8706-4237-9F22-99B5CF5199A3}"/>
+              </a:ext>
+            </a:extLst>
+          </p:cNvPr>
+          <p:cNvSpPr txBox="1">
+            <a:spLocks/>
+          </p:cNvSpPr>
+          <p:nvPr/>
+        </p:nvSpPr>
+        <p:spPr>
+          <a:xfrm>
+            <a:off x="349224" y="1098022"/>
+            <a:ext cx="11311950" cy="5000937"/>
+          </a:xfrm>
+          <a:prstGeom prst="rect">
+            <a:avLst/>
+          </a:prstGeom>
+        </p:spPr>
+        <p:txBody>
+          <a:bodyPr/>
+          <a:lstStyle>
+            <a:lvl1pPr marL="228600" indent="-228600" algn="l" defTabSz="914400" rtl="0" eaLnBrk="1" latinLnBrk="0" hangingPunct="1">
+              <a:lnSpc>
+                <a:spcPct val="90000"/>
+              </a:lnSpc>
+              <a:spcBef>
+                <a:spcPts val="1000"/>
+              </a:spcBef>
+              <a:buFont typeface="Arial" panose="020B0604020202020204" pitchFamily="34" charset="0"/>
+              <a:buChar char="•"/>
+              <a:defRPr sz="2800" kern="1200">
+                <a:solidFill>
+                  <a:schemeClr val="tx1"/>
+                </a:solidFill>
+                <a:latin typeface="+mn-lt"/>
+                <a:ea typeface="+mn-ea"/>
+                <a:cs typeface="+mn-cs"/>
+              </a:defRPr>
+            </a:lvl1pPr>
+            <a:lvl2pPr marL="685800" indent="-228600" algn="l" defTabSz="914400" rtl="0" eaLnBrk="1" latinLnBrk="0" hangingPunct="1">
+              <a:lnSpc>
+                <a:spcPct val="90000"/>
+              </a:lnSpc>
+              <a:spcBef>
+                <a:spcPts val="500"/>
+              </a:spcBef>
+              <a:buFont typeface="Arial" panose="020B0604020202020204" pitchFamily="34" charset="0"/>
+              <a:buChar char="•"/>
+              <a:defRPr sz="2400" kern="1200">
+                <a:solidFill>
+                  <a:schemeClr val="tx1"/>
+                </a:solidFill>
+                <a:latin typeface="+mn-lt"/>
+                <a:ea typeface="+mn-ea"/>
+                <a:cs typeface="+mn-cs"/>
+              </a:defRPr>
+            </a:lvl2pPr>
+            <a:lvl3pPr marL="1143000" indent="-228600" algn="l" defTabSz="914400" rtl="0" eaLnBrk="1" latinLnBrk="0" hangingPunct="1">
+              <a:lnSpc>
+                <a:spcPct val="90000"/>
+              </a:lnSpc>
+              <a:spcBef>
+                <a:spcPts val="500"/>
+              </a:spcBef>
+              <a:buFont typeface="Arial" panose="020B0604020202020204" pitchFamily="34" charset="0"/>
+              <a:buChar char="•"/>
+              <a:defRPr sz="2000" kern="1200">
+                <a:solidFill>
+                  <a:schemeClr val="tx1"/>
+                </a:solidFill>
+                <a:latin typeface="+mn-lt"/>
+                <a:ea typeface="+mn-ea"/>
+                <a:cs typeface="+mn-cs"/>
+              </a:defRPr>
+            </a:lvl3pPr>
+            <a:lvl4pPr marL="1600200" indent="-228600" algn="l" defTabSz="914400" rtl="0" eaLnBrk="1" latinLnBrk="0" hangingPunct="1">
+              <a:lnSpc>
+                <a:spcPct val="90000"/>
+              </a:lnSpc>
+              <a:spcBef>
+                <a:spcPts val="500"/>
+              </a:spcBef>
+              <a:buFont typeface="Arial" panose="020B0604020202020204" pitchFamily="34" charset="0"/>
+              <a:buChar char="•"/>
+              <a:defRPr sz="1800" kern="1200">
+                <a:solidFill>
+                  <a:schemeClr val="tx1"/>
+                </a:solidFill>
+                <a:latin typeface="+mn-lt"/>
+                <a:ea typeface="+mn-ea"/>
+                <a:cs typeface="+mn-cs"/>
+              </a:defRPr>
+            </a:lvl4pPr>
+            <a:lvl5pPr marL="2057400" indent="-228600" algn="l" defTabSz="914400" rtl="0" eaLnBrk="1" latinLnBrk="0" hangingPunct="1">
+              <a:lnSpc>
+                <a:spcPct val="90000"/>
+              </a:lnSpc>
+              <a:spcBef>
+                <a:spcPts val="500"/>
+              </a:spcBef>
+              <a:buFont typeface="Arial" panose="020B0604020202020204" pitchFamily="34" charset="0"/>
+              <a:buChar char="•"/>
+              <a:defRPr sz="1800" kern="1200">
+                <a:solidFill>
+                  <a:schemeClr val="tx1"/>
+                </a:solidFill>
+                <a:latin typeface="+mn-lt"/>
+                <a:ea typeface="+mn-ea"/>
+                <a:cs typeface="+mn-cs"/>
+              </a:defRPr>
+            </a:lvl5pPr>
+            <a:lvl6pPr marL="2514600" indent="-228600" algn="l" defTabSz="914400" rtl="0" eaLnBrk="1" latinLnBrk="0" hangingPunct="1">
+              <a:lnSpc>
+                <a:spcPct val="90000"/>
+              </a:lnSpc>
+              <a:spcBef>
+                <a:spcPts val="500"/>
+              </a:spcBef>
+              <a:buFont typeface="Arial" panose="020B0604020202020204" pitchFamily="34" charset="0"/>
+              <a:buChar char="•"/>
+              <a:defRPr sz="1800" kern="1200">
+                <a:solidFill>
+                  <a:schemeClr val="tx1"/>
+                </a:solidFill>
+                <a:latin typeface="+mn-lt"/>
+                <a:ea typeface="+mn-ea"/>
+                <a:cs typeface="+mn-cs"/>
+              </a:defRPr>
+            </a:lvl6pPr>
+            <a:lvl7pPr marL="2971800" indent="-228600" algn="l" defTabSz="914400" rtl="0" eaLnBrk="1" latinLnBrk="0" hangingPunct="1">
+              <a:lnSpc>
+                <a:spcPct val="90000"/>
+              </a:lnSpc>
+              <a:spcBef>
+                <a:spcPts val="500"/>
+              </a:spcBef>
+              <a:buFont typeface="Arial" panose="020B0604020202020204" pitchFamily="34" charset="0"/>
+              <a:buChar char="•"/>
+              <a:defRPr sz="1800" kern="1200">
+                <a:solidFill>
+                  <a:schemeClr val="tx1"/>
+                </a:solidFill>
+                <a:latin typeface="+mn-lt"/>
+                <a:ea typeface="+mn-ea"/>
+                <a:cs typeface="+mn-cs"/>
+              </a:defRPr>
+            </a:lvl7pPr>
+            <a:lvl8pPr marL="3429000" indent="-228600" algn="l" defTabSz="914400" rtl="0" eaLnBrk="1" latinLnBrk="0" hangingPunct="1">
+              <a:lnSpc>
+                <a:spcPct val="90000"/>
+              </a:lnSpc>
+              <a:spcBef>
+                <a:spcPts val="500"/>
+              </a:spcBef>
+              <a:buFont typeface="Arial" panose="020B0604020202020204" pitchFamily="34" charset="0"/>
+              <a:buChar char="•"/>
+              <a:defRPr sz="1800" kern="1200">
+                <a:solidFill>
+                  <a:schemeClr val="tx1"/>
+                </a:solidFill>
+                <a:latin typeface="+mn-lt"/>
+                <a:ea typeface="+mn-ea"/>
+                <a:cs typeface="+mn-cs"/>
+              </a:defRPr>
+            </a:lvl8pPr>
+            <a:lvl9pPr marL="3886200" indent="-228600" algn="l" defTabSz="914400" rtl="0" eaLnBrk="1" latinLnBrk="0" hangingPunct="1">
+              <a:lnSpc>
+                <a:spcPct val="90000"/>
+              </a:lnSpc>
+              <a:spcBef>
+                <a:spcPts val="500"/>
+              </a:spcBef>
+              <a:buFont typeface="Arial" panose="020B0604020202020204" pitchFamily="34" charset="0"/>
+              <a:buChar char="•"/>
+              <a:defRPr sz="1800" kern="1200">
+                <a:solidFill>
+                  <a:schemeClr val="tx1"/>
+                </a:solidFill>
+                <a:latin typeface="+mn-lt"/>
+                <a:ea typeface="+mn-ea"/>
+                <a:cs typeface="+mn-cs"/>
+              </a:defRPr>
+            </a:lvl9pPr>
+          </a:lstStyle>
+          <a:p>
+            <a:pPr marL="0" indent="0">
+              <a:buNone/>
+            </a:pPr>
+            <a:endParaRPr lang="en-US" sz="2000" dirty="0">
+              <a:solidFill>
+                <a:srgbClr val="24292F"/>
+              </a:solidFill>
+              <a:latin typeface="-apple-system"/>
+            </a:endParaRPr>
+          </a:p>
+          <a:p>
+            <a:pPr marL="0" indent="0">
+              <a:buNone/>
+            </a:pPr>
+            <a:endParaRPr lang="en-US" sz="2000" b="1" dirty="0">
+              <a:solidFill>
+                <a:srgbClr val="24292F"/>
+              </a:solidFill>
+              <a:latin typeface="-apple-system"/>
+            </a:endParaRPr>
+          </a:p>
+        </p:txBody>
+      </p:sp>
+      <p:sp>
+        <p:nvSpPr>
+          <p:cNvPr id="34" name="内容占位符 2">
+            <a:extLst>
+              <a:ext uri="{FF2B5EF4-FFF2-40B4-BE49-F238E27FC236}">
+                <a16:creationId xmlns:a16="http://schemas.microsoft.com/office/drawing/2014/main" id="{975FEEE4-2250-4BE0-821E-30940D4EF265}"/>
+              </a:ext>
+            </a:extLst>
+          </p:cNvPr>
+          <p:cNvSpPr txBox="1">
+            <a:spLocks/>
+          </p:cNvSpPr>
+          <p:nvPr/>
+        </p:nvSpPr>
+        <p:spPr>
+          <a:xfrm>
+            <a:off x="558258" y="1250422"/>
+            <a:ext cx="11089683" cy="5000937"/>
+          </a:xfrm>
+          <a:prstGeom prst="rect">
+            <a:avLst/>
+          </a:prstGeom>
+        </p:spPr>
+        <p:txBody>
+          <a:bodyPr/>
+          <a:lstStyle>
+            <a:lvl1pPr marL="228600" indent="-228600" algn="l" defTabSz="914400" rtl="0" eaLnBrk="1" latinLnBrk="0" hangingPunct="1">
+              <a:lnSpc>
+                <a:spcPct val="90000"/>
+              </a:lnSpc>
+              <a:spcBef>
+                <a:spcPts val="1000"/>
+              </a:spcBef>
+              <a:buFont typeface="Arial" panose="020B0604020202020204" pitchFamily="34" charset="0"/>
+              <a:buChar char="•"/>
+              <a:defRPr sz="2800" kern="1200">
+                <a:solidFill>
+                  <a:schemeClr val="tx1"/>
+                </a:solidFill>
+                <a:latin typeface="+mn-lt"/>
+                <a:ea typeface="+mn-ea"/>
+                <a:cs typeface="+mn-cs"/>
+              </a:defRPr>
+            </a:lvl1pPr>
+            <a:lvl2pPr marL="685800" indent="-228600" algn="l" defTabSz="914400" rtl="0" eaLnBrk="1" latinLnBrk="0" hangingPunct="1">
+              <a:lnSpc>
+                <a:spcPct val="90000"/>
+              </a:lnSpc>
+              <a:spcBef>
+                <a:spcPts val="500"/>
+              </a:spcBef>
+              <a:buFont typeface="Arial" panose="020B0604020202020204" pitchFamily="34" charset="0"/>
+              <a:buChar char="•"/>
+              <a:defRPr sz="2400" kern="1200">
+                <a:solidFill>
+                  <a:schemeClr val="tx1"/>
+                </a:solidFill>
+                <a:latin typeface="+mn-lt"/>
+                <a:ea typeface="+mn-ea"/>
+                <a:cs typeface="+mn-cs"/>
+              </a:defRPr>
+            </a:lvl2pPr>
+            <a:lvl3pPr marL="1143000" indent="-228600" algn="l" defTabSz="914400" rtl="0" eaLnBrk="1" latinLnBrk="0" hangingPunct="1">
+              <a:lnSpc>
+                <a:spcPct val="90000"/>
+              </a:lnSpc>
+              <a:spcBef>
+                <a:spcPts val="500"/>
+              </a:spcBef>
+              <a:buFont typeface="Arial" panose="020B0604020202020204" pitchFamily="34" charset="0"/>
+              <a:buChar char="•"/>
+              <a:defRPr sz="2000" kern="1200">
+                <a:solidFill>
+                  <a:schemeClr val="tx1"/>
+                </a:solidFill>
+                <a:latin typeface="+mn-lt"/>
+                <a:ea typeface="+mn-ea"/>
+                <a:cs typeface="+mn-cs"/>
+              </a:defRPr>
+            </a:lvl3pPr>
+            <a:lvl4pPr marL="1600200" indent="-228600" algn="l" defTabSz="914400" rtl="0" eaLnBrk="1" latinLnBrk="0" hangingPunct="1">
+              <a:lnSpc>
+                <a:spcPct val="90000"/>
+              </a:lnSpc>
+              <a:spcBef>
+                <a:spcPts val="500"/>
+              </a:spcBef>
+              <a:buFont typeface="Arial" panose="020B0604020202020204" pitchFamily="34" charset="0"/>
+              <a:buChar char="•"/>
+              <a:defRPr sz="1800" kern="1200">
+                <a:solidFill>
+                  <a:schemeClr val="tx1"/>
+                </a:solidFill>
+                <a:latin typeface="+mn-lt"/>
+                <a:ea typeface="+mn-ea"/>
+                <a:cs typeface="+mn-cs"/>
+              </a:defRPr>
+            </a:lvl4pPr>
+            <a:lvl5pPr marL="2057400" indent="-228600" algn="l" defTabSz="914400" rtl="0" eaLnBrk="1" latinLnBrk="0" hangingPunct="1">
+              <a:lnSpc>
+                <a:spcPct val="90000"/>
+              </a:lnSpc>
+              <a:spcBef>
+                <a:spcPts val="500"/>
+              </a:spcBef>
+              <a:buFont typeface="Arial" panose="020B0604020202020204" pitchFamily="34" charset="0"/>
+              <a:buChar char="•"/>
+              <a:defRPr sz="1800" kern="1200">
+                <a:solidFill>
+                  <a:schemeClr val="tx1"/>
+                </a:solidFill>
+                <a:latin typeface="+mn-lt"/>
+                <a:ea typeface="+mn-ea"/>
+                <a:cs typeface="+mn-cs"/>
+              </a:defRPr>
+            </a:lvl5pPr>
+            <a:lvl6pPr marL="2514600" indent="-228600" algn="l" defTabSz="914400" rtl="0" eaLnBrk="1" latinLnBrk="0" hangingPunct="1">
+              <a:lnSpc>
+                <a:spcPct val="90000"/>
+              </a:lnSpc>
+              <a:spcBef>
+                <a:spcPts val="500"/>
+              </a:spcBef>
+              <a:buFont typeface="Arial" panose="020B0604020202020204" pitchFamily="34" charset="0"/>
+              <a:buChar char="•"/>
+              <a:defRPr sz="1800" kern="1200">
+                <a:solidFill>
+                  <a:schemeClr val="tx1"/>
+                </a:solidFill>
+                <a:latin typeface="+mn-lt"/>
+                <a:ea typeface="+mn-ea"/>
+                <a:cs typeface="+mn-cs"/>
+              </a:defRPr>
+            </a:lvl6pPr>
+            <a:lvl7pPr marL="2971800" indent="-228600" algn="l" defTabSz="914400" rtl="0" eaLnBrk="1" latinLnBrk="0" hangingPunct="1">
+              <a:lnSpc>
+                <a:spcPct val="90000"/>
+              </a:lnSpc>
+              <a:spcBef>
+                <a:spcPts val="500"/>
+              </a:spcBef>
+              <a:buFont typeface="Arial" panose="020B0604020202020204" pitchFamily="34" charset="0"/>
+              <a:buChar char="•"/>
+              <a:defRPr sz="1800" kern="1200">
+                <a:solidFill>
+                  <a:schemeClr val="tx1"/>
+                </a:solidFill>
+                <a:latin typeface="+mn-lt"/>
+                <a:ea typeface="+mn-ea"/>
+                <a:cs typeface="+mn-cs"/>
+              </a:defRPr>
+            </a:lvl7pPr>
+            <a:lvl8pPr marL="3429000" indent="-228600" algn="l" defTabSz="914400" rtl="0" eaLnBrk="1" latinLnBrk="0" hangingPunct="1">
+              <a:lnSpc>
+                <a:spcPct val="90000"/>
+              </a:lnSpc>
+              <a:spcBef>
+                <a:spcPts val="500"/>
+              </a:spcBef>
+              <a:buFont typeface="Arial" panose="020B0604020202020204" pitchFamily="34" charset="0"/>
+              <a:buChar char="•"/>
+              <a:defRPr sz="1800" kern="1200">
+                <a:solidFill>
+                  <a:schemeClr val="tx1"/>
+                </a:solidFill>
+                <a:latin typeface="+mn-lt"/>
+                <a:ea typeface="+mn-ea"/>
+                <a:cs typeface="+mn-cs"/>
+              </a:defRPr>
+            </a:lvl8pPr>
+            <a:lvl9pPr marL="3886200" indent="-228600" algn="l" defTabSz="914400" rtl="0" eaLnBrk="1" latinLnBrk="0" hangingPunct="1">
+              <a:lnSpc>
+                <a:spcPct val="90000"/>
+              </a:lnSpc>
+              <a:spcBef>
+                <a:spcPts val="500"/>
+              </a:spcBef>
+              <a:buFont typeface="Arial" panose="020B0604020202020204" pitchFamily="34" charset="0"/>
+              <a:buChar char="•"/>
+              <a:defRPr sz="1800" kern="1200">
+                <a:solidFill>
+                  <a:schemeClr val="tx1"/>
+                </a:solidFill>
+                <a:latin typeface="+mn-lt"/>
+                <a:ea typeface="+mn-ea"/>
+                <a:cs typeface="+mn-cs"/>
+              </a:defRPr>
+            </a:lvl9pPr>
+          </a:lstStyle>
+          <a:p>
+            <a:pPr marL="0" indent="0">
+              <a:buNone/>
+            </a:pPr>
+            <a:r>
+              <a:rPr lang="en-US" sz="1800" b="1" i="0" dirty="0">
+                <a:solidFill>
+                  <a:srgbClr val="242424"/>
+                </a:solidFill>
+                <a:effectLst/>
+              </a:rPr>
+              <a:t>1. Cluster Accounts Review / Double Check for ex-Interns and NUS staff:</a:t>
+            </a:r>
+          </a:p>
+          <a:p>
+            <a:pPr marL="0" indent="0">
+              <a:buNone/>
+            </a:pPr>
+            <a:r>
+              <a:rPr lang="en-US" sz="1800" b="1" dirty="0">
+                <a:solidFill>
+                  <a:srgbClr val="242424"/>
+                </a:solidFill>
+              </a:rPr>
+              <a:t>	</a:t>
+            </a:r>
+            <a:r>
+              <a:rPr lang="en-US" sz="1800" i="0" dirty="0">
+                <a:solidFill>
+                  <a:srgbClr val="242424"/>
+                </a:solidFill>
+                <a:effectLst/>
+              </a:rPr>
+              <a:t>Confirmed all the un-used accounts and left people’s accounts are all removed. </a:t>
+            </a:r>
+          </a:p>
+          <a:p>
+            <a:pPr marL="0" indent="0">
+              <a:buNone/>
+            </a:pPr>
+            <a:r>
+              <a:rPr lang="en-SG" sz="1800" b="1" i="0" dirty="0">
+                <a:solidFill>
+                  <a:srgbClr val="242424"/>
+                </a:solidFill>
+                <a:effectLst/>
+              </a:rPr>
+              <a:t>2. </a:t>
+            </a:r>
+            <a:r>
+              <a:rPr lang="en-SG" sz="1800" b="1" i="0" dirty="0" err="1">
+                <a:solidFill>
+                  <a:srgbClr val="242424"/>
+                </a:solidFill>
+                <a:effectLst/>
+              </a:rPr>
+              <a:t>Phishpedia</a:t>
+            </a:r>
+            <a:r>
+              <a:rPr lang="en-SG" sz="1800" b="1" i="0" dirty="0">
+                <a:solidFill>
+                  <a:srgbClr val="242424"/>
+                </a:solidFill>
+                <a:effectLst/>
+              </a:rPr>
+              <a:t> driver problem solution (local tested): </a:t>
+            </a:r>
+          </a:p>
+          <a:p>
+            <a:pPr marL="0" indent="0">
+              <a:buNone/>
+            </a:pPr>
+            <a:r>
+              <a:rPr lang="en-SG" sz="1800" dirty="0">
+                <a:solidFill>
+                  <a:srgbClr val="242424"/>
+                </a:solidFill>
+              </a:rPr>
+              <a:t> 	2.1 </a:t>
+            </a:r>
+            <a:r>
+              <a:rPr lang="en-SG" sz="1800" dirty="0">
+                <a:solidFill>
+                  <a:srgbClr val="232629"/>
+                </a:solidFill>
+              </a:rPr>
+              <a:t>I</a:t>
+            </a:r>
+            <a:r>
+              <a:rPr lang="en-SG" sz="1800" b="0" i="0" dirty="0">
+                <a:solidFill>
+                  <a:srgbClr val="232629"/>
+                </a:solidFill>
+                <a:effectLst/>
+              </a:rPr>
+              <a:t>nstall a dummy graphic driver: </a:t>
+            </a:r>
+            <a:r>
+              <a:rPr lang="en-SG" sz="1800" b="0" i="0" dirty="0" err="1">
+                <a:solidFill>
+                  <a:srgbClr val="232629"/>
+                </a:solidFill>
+                <a:effectLst/>
+                <a:highlight>
+                  <a:srgbClr val="C0C0C0"/>
+                </a:highlight>
+              </a:rPr>
+              <a:t>sudo</a:t>
+            </a:r>
+            <a:r>
+              <a:rPr lang="en-SG" sz="1800" b="0" i="0" dirty="0">
+                <a:solidFill>
+                  <a:srgbClr val="232629"/>
+                </a:solidFill>
+                <a:effectLst/>
+                <a:highlight>
+                  <a:srgbClr val="C0C0C0"/>
+                </a:highlight>
+              </a:rPr>
+              <a:t> apt-get install </a:t>
+            </a:r>
+            <a:r>
+              <a:rPr lang="en-SG" sz="1800" b="0" i="0" dirty="0" err="1">
+                <a:solidFill>
+                  <a:srgbClr val="232629"/>
+                </a:solidFill>
+                <a:effectLst/>
+                <a:highlight>
+                  <a:srgbClr val="C0C0C0"/>
+                </a:highlight>
+              </a:rPr>
+              <a:t>xserver</a:t>
+            </a:r>
+            <a:r>
+              <a:rPr lang="en-SG" sz="1800" b="0" i="0" dirty="0">
+                <a:solidFill>
+                  <a:srgbClr val="232629"/>
+                </a:solidFill>
+                <a:effectLst/>
+                <a:highlight>
+                  <a:srgbClr val="C0C0C0"/>
+                </a:highlight>
+              </a:rPr>
+              <a:t>-</a:t>
+            </a:r>
+            <a:r>
+              <a:rPr lang="en-SG" sz="1800" b="0" i="0" dirty="0" err="1">
+                <a:solidFill>
+                  <a:srgbClr val="232629"/>
+                </a:solidFill>
+                <a:effectLst/>
+                <a:highlight>
+                  <a:srgbClr val="C0C0C0"/>
+                </a:highlight>
+              </a:rPr>
+              <a:t>xorg</a:t>
+            </a:r>
+            <a:r>
+              <a:rPr lang="en-SG" sz="1800" b="0" i="0" dirty="0">
+                <a:solidFill>
+                  <a:srgbClr val="232629"/>
+                </a:solidFill>
+                <a:effectLst/>
+                <a:highlight>
+                  <a:srgbClr val="C0C0C0"/>
+                </a:highlight>
+              </a:rPr>
+              <a:t>-video-dummy</a:t>
+            </a:r>
+            <a:r>
+              <a:rPr lang="en-SG" sz="1800" b="0" i="0" dirty="0">
+                <a:solidFill>
+                  <a:srgbClr val="232629"/>
+                </a:solidFill>
+                <a:effectLst/>
+              </a:rPr>
+              <a:t> </a:t>
+            </a:r>
+            <a:r>
+              <a:rPr lang="en-SG" sz="1800" dirty="0">
+                <a:solidFill>
+                  <a:srgbClr val="242424"/>
+                </a:solidFill>
+              </a:rPr>
+              <a:t> </a:t>
+            </a:r>
+          </a:p>
+          <a:p>
+            <a:pPr marL="0" indent="0">
+              <a:buNone/>
+            </a:pPr>
+            <a:r>
+              <a:rPr lang="en-SG" sz="1800" b="0" i="0" dirty="0">
+                <a:solidFill>
+                  <a:srgbClr val="242424"/>
+                </a:solidFill>
+                <a:effectLst/>
+              </a:rPr>
+              <a:t>	2.2 Create the dummy display output config file to the driver (as shown in right </a:t>
+            </a:r>
+            <a:r>
+              <a:rPr lang="en-SG" sz="1800" dirty="0">
+                <a:solidFill>
+                  <a:srgbClr val="242424"/>
+                </a:solidFill>
+              </a:rPr>
+              <a:t>file</a:t>
+            </a:r>
+            <a:r>
+              <a:rPr lang="en-SG" sz="1800" b="0" i="0" dirty="0">
+                <a:solidFill>
+                  <a:srgbClr val="242424"/>
+                </a:solidFill>
+                <a:effectLst/>
+              </a:rPr>
+              <a:t>):</a:t>
+            </a:r>
+          </a:p>
+          <a:p>
+            <a:pPr marL="0" indent="0">
+              <a:buNone/>
+            </a:pPr>
+            <a:r>
+              <a:rPr lang="en-SG" sz="1800" dirty="0">
+                <a:solidFill>
+                  <a:srgbClr val="242424"/>
+                </a:solidFill>
+              </a:rPr>
+              <a:t>	      </a:t>
+            </a:r>
+            <a:r>
+              <a:rPr lang="en-SG" sz="1800" b="0" i="0" dirty="0">
+                <a:solidFill>
+                  <a:srgbClr val="242424"/>
+                </a:solidFill>
+                <a:effectLst/>
+              </a:rPr>
+              <a:t> </a:t>
+            </a:r>
+            <a:r>
+              <a:rPr lang="en-SG" sz="1800" b="0" i="0" dirty="0">
+                <a:solidFill>
+                  <a:srgbClr val="232629"/>
+                </a:solidFill>
+                <a:effectLst/>
+                <a:highlight>
+                  <a:srgbClr val="C0C0C0"/>
+                </a:highlight>
+              </a:rPr>
+              <a:t>/</a:t>
+            </a:r>
+            <a:r>
+              <a:rPr lang="en-SG" sz="1800" b="0" i="0" dirty="0" err="1">
+                <a:solidFill>
+                  <a:srgbClr val="232629"/>
+                </a:solidFill>
+                <a:effectLst/>
+                <a:highlight>
+                  <a:srgbClr val="C0C0C0"/>
+                </a:highlight>
+              </a:rPr>
+              <a:t>usr</a:t>
+            </a:r>
+            <a:r>
+              <a:rPr lang="en-SG" sz="1800" b="0" i="0" dirty="0">
+                <a:solidFill>
+                  <a:srgbClr val="232629"/>
+                </a:solidFill>
+                <a:effectLst/>
+                <a:highlight>
+                  <a:srgbClr val="C0C0C0"/>
+                </a:highlight>
+              </a:rPr>
+              <a:t>/share/X11/</a:t>
+            </a:r>
+            <a:r>
+              <a:rPr lang="en-SG" sz="1800" b="0" i="0" dirty="0" err="1">
+                <a:solidFill>
+                  <a:srgbClr val="232629"/>
+                </a:solidFill>
+                <a:effectLst/>
+                <a:highlight>
+                  <a:srgbClr val="C0C0C0"/>
+                </a:highlight>
+              </a:rPr>
+              <a:t>xorg.conf.d</a:t>
+            </a:r>
+            <a:r>
+              <a:rPr lang="en-SG" sz="1800" b="0" i="0" dirty="0">
+                <a:solidFill>
+                  <a:srgbClr val="232629"/>
+                </a:solidFill>
+                <a:effectLst/>
+                <a:highlight>
+                  <a:srgbClr val="C0C0C0"/>
+                </a:highlight>
+              </a:rPr>
+              <a:t>/</a:t>
+            </a:r>
+            <a:r>
+              <a:rPr lang="en-SG" sz="1800" b="0" i="0" dirty="0" err="1">
+                <a:solidFill>
+                  <a:srgbClr val="232629"/>
+                </a:solidFill>
+                <a:effectLst/>
+                <a:highlight>
+                  <a:srgbClr val="C0C0C0"/>
+                </a:highlight>
+              </a:rPr>
+              <a:t>xorg.conf</a:t>
+            </a:r>
+            <a:r>
+              <a:rPr lang="en-SG" sz="1800" b="0" i="0" dirty="0">
+                <a:solidFill>
+                  <a:srgbClr val="232629"/>
+                </a:solidFill>
+                <a:effectLst/>
+              </a:rPr>
+              <a:t>   or   </a:t>
+            </a:r>
+            <a:r>
+              <a:rPr lang="en-SG" sz="1800" b="0" i="0" dirty="0">
+                <a:solidFill>
+                  <a:srgbClr val="232629"/>
+                </a:solidFill>
+                <a:effectLst/>
+                <a:highlight>
+                  <a:srgbClr val="C0C0C0"/>
+                </a:highlight>
+              </a:rPr>
+              <a:t> /etc/X11/</a:t>
+            </a:r>
+            <a:r>
+              <a:rPr lang="en-SG" sz="1800" b="0" i="0" dirty="0" err="1">
+                <a:solidFill>
+                  <a:srgbClr val="232629"/>
+                </a:solidFill>
+                <a:effectLst/>
+                <a:highlight>
+                  <a:srgbClr val="C0C0C0"/>
+                </a:highlight>
+              </a:rPr>
+              <a:t>xorg.conf</a:t>
+            </a:r>
+            <a:r>
+              <a:rPr lang="en-SG" sz="1800" b="0" i="0" dirty="0">
+                <a:solidFill>
+                  <a:srgbClr val="232629"/>
+                </a:solidFill>
+                <a:effectLst/>
+                <a:highlight>
+                  <a:srgbClr val="C0C0C0"/>
+                </a:highlight>
+              </a:rPr>
+              <a:t> 	</a:t>
+            </a:r>
+            <a:endParaRPr lang="en-SG" sz="1800" b="0" i="0" dirty="0">
+              <a:solidFill>
+                <a:srgbClr val="242424"/>
+              </a:solidFill>
+              <a:effectLst/>
+            </a:endParaRPr>
+          </a:p>
+          <a:p>
+            <a:pPr marL="0" indent="0">
+              <a:buNone/>
+            </a:pPr>
+            <a:r>
+              <a:rPr lang="en-SG" sz="1800" b="1" i="0" dirty="0">
+                <a:solidFill>
+                  <a:srgbClr val="242424"/>
+                </a:solidFill>
+                <a:effectLst/>
+              </a:rPr>
+              <a:t>3. </a:t>
+            </a:r>
+            <a:r>
+              <a:rPr lang="en-US" sz="1800" b="1" dirty="0">
+                <a:solidFill>
+                  <a:srgbClr val="24292F"/>
+                </a:solidFill>
+              </a:rPr>
+              <a:t>Web visualization for the result </a:t>
+            </a:r>
+            <a:r>
+              <a:rPr lang="en-US" sz="1800" dirty="0">
+                <a:solidFill>
+                  <a:srgbClr val="24292F"/>
+                </a:solidFill>
+              </a:rPr>
+              <a:t>: </a:t>
+            </a:r>
+          </a:p>
+          <a:p>
+            <a:pPr marL="0" indent="0">
+              <a:buNone/>
+            </a:pPr>
+            <a:r>
+              <a:rPr lang="en-US" sz="1800" b="0" i="0" dirty="0">
+                <a:solidFill>
+                  <a:srgbClr val="24292F"/>
+                </a:solidFill>
+                <a:effectLst/>
+              </a:rPr>
+              <a:t>	3.1 Added the data loader module to load result from Json file or SQLite3 DB. </a:t>
+            </a:r>
+          </a:p>
+          <a:p>
+            <a:pPr marL="0" indent="0">
+              <a:buNone/>
+            </a:pPr>
+            <a:r>
+              <a:rPr lang="en-US" sz="1800" dirty="0">
+                <a:solidFill>
+                  <a:srgbClr val="24292F"/>
+                </a:solidFill>
+              </a:rPr>
+              <a:t>	3.2 Panel screen shot: </a:t>
+            </a:r>
+            <a:endParaRPr lang="en-SG" sz="650" b="0" i="0" dirty="0">
+              <a:solidFill>
+                <a:srgbClr val="242424"/>
+              </a:solidFill>
+              <a:effectLst/>
+            </a:endParaRPr>
+          </a:p>
+          <a:p>
+            <a:pPr marL="457200" indent="-457200">
+              <a:buFont typeface="Arial" panose="020B0604020202020204" pitchFamily="34" charset="0"/>
+              <a:buAutoNum type="arabicPeriod"/>
+            </a:pPr>
+            <a:endParaRPr lang="en-US" sz="1400" b="0" i="0" dirty="0">
+              <a:solidFill>
+                <a:srgbClr val="242424"/>
+              </a:solidFill>
+              <a:effectLst/>
+              <a:latin typeface="Segoe UI" panose="020B0502040204020203" pitchFamily="34" charset="0"/>
+            </a:endParaRPr>
+          </a:p>
+          <a:p>
+            <a:pPr marL="457200" indent="-457200">
+              <a:buFont typeface="Arial" panose="020B0604020202020204" pitchFamily="34" charset="0"/>
+              <a:buAutoNum type="arabicPeriod"/>
+            </a:pPr>
+            <a:endParaRPr lang="en-US" sz="2000" dirty="0">
+              <a:solidFill>
+                <a:srgbClr val="24292F"/>
+              </a:solidFill>
+            </a:endParaRPr>
+          </a:p>
+          <a:p>
+            <a:pPr marL="0" indent="0">
+              <a:buNone/>
+            </a:pPr>
+            <a:endParaRPr lang="en-US" sz="2000" dirty="0">
+              <a:solidFill>
+                <a:srgbClr val="24292F"/>
+              </a:solidFill>
+              <a:latin typeface="-apple-system"/>
+            </a:endParaRPr>
+          </a:p>
+          <a:p>
+            <a:pPr marL="0" indent="0">
+              <a:buNone/>
+            </a:pPr>
+            <a:endParaRPr lang="en-US" sz="2000" b="1" dirty="0">
+              <a:solidFill>
+                <a:srgbClr val="24292F"/>
+              </a:solidFill>
+              <a:latin typeface="-apple-system"/>
+            </a:endParaRPr>
+          </a:p>
+        </p:txBody>
+      </p:sp>
+      <p:sp>
+        <p:nvSpPr>
+          <p:cNvPr id="8" name="TextBox 7">
+            <a:extLst>
+              <a:ext uri="{FF2B5EF4-FFF2-40B4-BE49-F238E27FC236}">
+                <a16:creationId xmlns:a16="http://schemas.microsoft.com/office/drawing/2014/main" id="{4219BF53-F225-4E9B-9F74-8D06A4B68C2A}"/>
+              </a:ext>
+            </a:extLst>
+          </p:cNvPr>
+          <p:cNvSpPr txBox="1"/>
+          <p:nvPr/>
+        </p:nvSpPr>
+        <p:spPr>
+          <a:xfrm>
+            <a:off x="9567443" y="1686034"/>
+            <a:ext cx="2317378" cy="3785652"/>
+          </a:xfrm>
+          <a:prstGeom prst="rect">
+            <a:avLst/>
+          </a:prstGeom>
+          <a:solidFill>
+            <a:schemeClr val="bg1">
+              <a:lumMod val="75000"/>
+            </a:schemeClr>
+          </a:solidFill>
+        </p:spPr>
+        <p:txBody>
+          <a:bodyPr wrap="square" rtlCol="0">
+            <a:spAutoFit/>
+          </a:bodyPr>
+          <a:lstStyle/>
+          <a:p>
+            <a:r>
+              <a:rPr lang="en-SG" sz="1000" dirty="0">
+                <a:solidFill>
+                  <a:srgbClr val="FF0000"/>
+                </a:solidFill>
+                <a:latin typeface="Abadi" panose="020B0604020104020204" pitchFamily="34" charset="0"/>
+              </a:rPr>
+              <a:t>Dummy driver config file: </a:t>
+            </a:r>
+          </a:p>
+          <a:p>
+            <a:r>
+              <a:rPr lang="en-SG" sz="1000" dirty="0">
+                <a:latin typeface="Abadi" panose="020B0604020104020204" pitchFamily="34" charset="0"/>
+              </a:rPr>
+              <a:t>Section "Device"</a:t>
+            </a:r>
+          </a:p>
+          <a:p>
+            <a:r>
+              <a:rPr lang="en-SG" sz="1000" dirty="0">
+                <a:latin typeface="Abadi" panose="020B0604020104020204" pitchFamily="34" charset="0"/>
+              </a:rPr>
+              <a:t>    Identifier  "Configured Video Device"</a:t>
+            </a:r>
+          </a:p>
+          <a:p>
+            <a:r>
+              <a:rPr lang="en-SG" sz="1000" dirty="0">
+                <a:latin typeface="Abadi" panose="020B0604020104020204" pitchFamily="34" charset="0"/>
+              </a:rPr>
+              <a:t>    Driver      "dummy"</a:t>
+            </a:r>
+          </a:p>
+          <a:p>
+            <a:r>
+              <a:rPr lang="en-SG" sz="1000" dirty="0" err="1">
+                <a:latin typeface="Abadi" panose="020B0604020104020204" pitchFamily="34" charset="0"/>
+              </a:rPr>
+              <a:t>EndSection</a:t>
+            </a:r>
+            <a:endParaRPr lang="en-SG" sz="1000" dirty="0">
+              <a:latin typeface="Abadi" panose="020B0604020104020204" pitchFamily="34" charset="0"/>
+            </a:endParaRPr>
+          </a:p>
+          <a:p>
+            <a:endParaRPr lang="en-SG" sz="1000" dirty="0">
+              <a:latin typeface="Abadi" panose="020B0604020104020204" pitchFamily="34" charset="0"/>
+            </a:endParaRPr>
+          </a:p>
+          <a:p>
+            <a:r>
+              <a:rPr lang="en-SG" sz="1000" dirty="0">
+                <a:latin typeface="Abadi" panose="020B0604020104020204" pitchFamily="34" charset="0"/>
+              </a:rPr>
+              <a:t>Section "Monitor"</a:t>
+            </a:r>
+          </a:p>
+          <a:p>
+            <a:r>
+              <a:rPr lang="en-SG" sz="1000" dirty="0">
+                <a:latin typeface="Abadi" panose="020B0604020104020204" pitchFamily="34" charset="0"/>
+              </a:rPr>
+              <a:t>    Identifier  "Configured Monitor"</a:t>
+            </a:r>
+          </a:p>
+          <a:p>
+            <a:r>
+              <a:rPr lang="en-SG" sz="1000" dirty="0">
+                <a:latin typeface="Abadi" panose="020B0604020104020204" pitchFamily="34" charset="0"/>
+              </a:rPr>
+              <a:t>    </a:t>
+            </a:r>
+            <a:r>
+              <a:rPr lang="en-SG" sz="1000" dirty="0" err="1">
+                <a:latin typeface="Abadi" panose="020B0604020104020204" pitchFamily="34" charset="0"/>
+              </a:rPr>
+              <a:t>HorizSync</a:t>
+            </a:r>
+            <a:r>
+              <a:rPr lang="en-SG" sz="1000" dirty="0">
+                <a:latin typeface="Abadi" panose="020B0604020104020204" pitchFamily="34" charset="0"/>
+              </a:rPr>
+              <a:t> 31.5-48.5</a:t>
+            </a:r>
+          </a:p>
+          <a:p>
+            <a:r>
+              <a:rPr lang="en-SG" sz="1000" dirty="0">
+                <a:latin typeface="Abadi" panose="020B0604020104020204" pitchFamily="34" charset="0"/>
+              </a:rPr>
+              <a:t>    </a:t>
+            </a:r>
+            <a:r>
+              <a:rPr lang="en-SG" sz="1000" dirty="0" err="1">
+                <a:latin typeface="Abadi" panose="020B0604020104020204" pitchFamily="34" charset="0"/>
+              </a:rPr>
+              <a:t>VertRefresh</a:t>
+            </a:r>
+            <a:r>
+              <a:rPr lang="en-SG" sz="1000" dirty="0">
+                <a:latin typeface="Abadi" panose="020B0604020104020204" pitchFamily="34" charset="0"/>
+              </a:rPr>
+              <a:t> 50-70</a:t>
+            </a:r>
+          </a:p>
+          <a:p>
+            <a:r>
+              <a:rPr lang="en-SG" sz="1000" dirty="0" err="1">
+                <a:latin typeface="Abadi" panose="020B0604020104020204" pitchFamily="34" charset="0"/>
+              </a:rPr>
+              <a:t>EndSection</a:t>
+            </a:r>
+            <a:endParaRPr lang="en-SG" sz="1000" dirty="0">
+              <a:latin typeface="Abadi" panose="020B0604020104020204" pitchFamily="34" charset="0"/>
+            </a:endParaRPr>
+          </a:p>
+          <a:p>
+            <a:endParaRPr lang="en-SG" sz="1000" dirty="0">
+              <a:latin typeface="Abadi" panose="020B0604020104020204" pitchFamily="34" charset="0"/>
+            </a:endParaRPr>
+          </a:p>
+          <a:p>
+            <a:r>
+              <a:rPr lang="en-SG" sz="1000" dirty="0">
+                <a:latin typeface="Abadi" panose="020B0604020104020204" pitchFamily="34" charset="0"/>
+              </a:rPr>
+              <a:t>Section "Screen"</a:t>
+            </a:r>
+          </a:p>
+          <a:p>
+            <a:r>
+              <a:rPr lang="en-SG" sz="1000" dirty="0">
+                <a:latin typeface="Abadi" panose="020B0604020104020204" pitchFamily="34" charset="0"/>
+              </a:rPr>
+              <a:t>    Identifier  "Default Screen"</a:t>
+            </a:r>
+          </a:p>
+          <a:p>
+            <a:r>
+              <a:rPr lang="en-SG" sz="1000" dirty="0">
+                <a:latin typeface="Abadi" panose="020B0604020104020204" pitchFamily="34" charset="0"/>
+              </a:rPr>
+              <a:t>    Monitor     "Configured Monitor"</a:t>
+            </a:r>
+          </a:p>
+          <a:p>
+            <a:r>
+              <a:rPr lang="en-SG" sz="1000" dirty="0">
+                <a:latin typeface="Abadi" panose="020B0604020104020204" pitchFamily="34" charset="0"/>
+              </a:rPr>
+              <a:t>    Device      "Configured Video Device"</a:t>
+            </a:r>
+          </a:p>
+          <a:p>
+            <a:r>
+              <a:rPr lang="en-SG" sz="1000" dirty="0">
+                <a:latin typeface="Abadi" panose="020B0604020104020204" pitchFamily="34" charset="0"/>
+              </a:rPr>
+              <a:t>    </a:t>
+            </a:r>
+            <a:r>
+              <a:rPr lang="en-SG" sz="1000" dirty="0" err="1">
+                <a:latin typeface="Abadi" panose="020B0604020104020204" pitchFamily="34" charset="0"/>
+              </a:rPr>
+              <a:t>DefaultDepth</a:t>
+            </a:r>
+            <a:r>
+              <a:rPr lang="en-SG" sz="1000" dirty="0">
+                <a:latin typeface="Abadi" panose="020B0604020104020204" pitchFamily="34" charset="0"/>
+              </a:rPr>
+              <a:t> 24</a:t>
+            </a:r>
+          </a:p>
+          <a:p>
+            <a:r>
+              <a:rPr lang="en-SG" sz="1000" dirty="0">
+                <a:latin typeface="Abadi" panose="020B0604020104020204" pitchFamily="34" charset="0"/>
+              </a:rPr>
+              <a:t>    </a:t>
+            </a:r>
+            <a:r>
+              <a:rPr lang="en-SG" sz="1000" dirty="0" err="1">
+                <a:latin typeface="Abadi" panose="020B0604020104020204" pitchFamily="34" charset="0"/>
+              </a:rPr>
+              <a:t>SubSection</a:t>
+            </a:r>
+            <a:r>
+              <a:rPr lang="en-SG" sz="1000" dirty="0">
+                <a:latin typeface="Abadi" panose="020B0604020104020204" pitchFamily="34" charset="0"/>
+              </a:rPr>
+              <a:t> "Display"</a:t>
+            </a:r>
+          </a:p>
+          <a:p>
+            <a:r>
+              <a:rPr lang="en-SG" sz="1000" dirty="0">
+                <a:latin typeface="Abadi" panose="020B0604020104020204" pitchFamily="34" charset="0"/>
+              </a:rPr>
+              <a:t>    Depth 24</a:t>
+            </a:r>
+          </a:p>
+          <a:p>
+            <a:r>
+              <a:rPr lang="en-SG" sz="1000" dirty="0">
+                <a:latin typeface="Abadi" panose="020B0604020104020204" pitchFamily="34" charset="0"/>
+              </a:rPr>
+              <a:t>    Modes "1024x800"</a:t>
+            </a:r>
+          </a:p>
+          <a:p>
+            <a:r>
+              <a:rPr lang="en-SG" sz="1000" dirty="0">
+                <a:latin typeface="Abadi" panose="020B0604020104020204" pitchFamily="34" charset="0"/>
+              </a:rPr>
+              <a:t>    </a:t>
+            </a:r>
+            <a:r>
+              <a:rPr lang="en-SG" sz="1000" dirty="0" err="1">
+                <a:latin typeface="Abadi" panose="020B0604020104020204" pitchFamily="34" charset="0"/>
+              </a:rPr>
+              <a:t>EndSubSection</a:t>
+            </a:r>
+            <a:endParaRPr lang="en-SG" sz="1000" dirty="0">
+              <a:latin typeface="Abadi" panose="020B0604020104020204" pitchFamily="34" charset="0"/>
+            </a:endParaRPr>
+          </a:p>
+          <a:p>
+            <a:r>
+              <a:rPr lang="en-SG" sz="1000" dirty="0" err="1">
+                <a:latin typeface="Abadi" panose="020B0604020104020204" pitchFamily="34" charset="0"/>
+              </a:rPr>
+              <a:t>EndSection</a:t>
+            </a:r>
+            <a:endParaRPr lang="en-SG" sz="1000" dirty="0">
+              <a:latin typeface="Abadi" panose="020B0604020104020204" pitchFamily="34" charset="0"/>
+            </a:endParaRPr>
+          </a:p>
+        </p:txBody>
+      </p:sp>
+      <p:pic>
+        <p:nvPicPr>
+          <p:cNvPr id="10" name="Picture 9" descr="A screenshot of a computer&#10;&#10;Description automatically generated">
+            <a:extLst>
+              <a:ext uri="{FF2B5EF4-FFF2-40B4-BE49-F238E27FC236}">
+                <a16:creationId xmlns:a16="http://schemas.microsoft.com/office/drawing/2014/main" id="{7A322BA1-15F2-45C9-9BBD-AA14E8CDC697}"/>
+              </a:ext>
+            </a:extLst>
+          </p:cNvPr>
+          <p:cNvPicPr>
+            <a:picLocks noChangeAspect="1"/>
+          </p:cNvPicPr>
+          <p:nvPr/>
+        </p:nvPicPr>
+        <p:blipFill>
+          <a:blip r:embed="rId3">
+            <a:extLst>
+              <a:ext uri="{28A0092B-C50C-407E-A947-70E740481C1C}">
+                <a14:useLocalDpi xmlns:a14="http://schemas.microsoft.com/office/drawing/2010/main" val="0"/>
+              </a:ext>
+            </a:extLst>
+          </a:blip>
+          <a:stretch>
+            <a:fillRect/>
+          </a:stretch>
+        </p:blipFill>
+        <p:spPr>
+          <a:xfrm>
+            <a:off x="1962264" y="4712240"/>
+            <a:ext cx="2125634" cy="1528406"/>
+          </a:xfrm>
+          <a:prstGeom prst="rect">
+            <a:avLst/>
+          </a:prstGeom>
+        </p:spPr>
+      </p:pic>
+      <p:pic>
+        <p:nvPicPr>
+          <p:cNvPr id="12" name="Picture 11" descr="Graphical user interface, text&#10;&#10;Description automatically generated">
+            <a:extLst>
+              <a:ext uri="{FF2B5EF4-FFF2-40B4-BE49-F238E27FC236}">
+                <a16:creationId xmlns:a16="http://schemas.microsoft.com/office/drawing/2014/main" id="{065CCE1E-3326-424A-838C-A35AD7782C7C}"/>
+              </a:ext>
+            </a:extLst>
+          </p:cNvPr>
+          <p:cNvPicPr>
+            <a:picLocks noChangeAspect="1"/>
+          </p:cNvPicPr>
+          <p:nvPr/>
+        </p:nvPicPr>
+        <p:blipFill>
+          <a:blip r:embed="rId4">
+            <a:extLst>
+              <a:ext uri="{28A0092B-C50C-407E-A947-70E740481C1C}">
+                <a14:useLocalDpi xmlns:a14="http://schemas.microsoft.com/office/drawing/2010/main" val="0"/>
+              </a:ext>
+            </a:extLst>
+          </a:blip>
+          <a:stretch>
+            <a:fillRect/>
+          </a:stretch>
+        </p:blipFill>
+        <p:spPr>
+          <a:xfrm>
+            <a:off x="4359949" y="4737818"/>
+            <a:ext cx="2125634" cy="1528407"/>
+          </a:xfrm>
+          <a:prstGeom prst="rect">
+            <a:avLst/>
+          </a:prstGeom>
+        </p:spPr>
+      </p:pic>
+      <p:pic>
+        <p:nvPicPr>
+          <p:cNvPr id="14" name="Picture 13" descr="Graphical user interface, text&#10;&#10;Description automatically generated">
+            <a:extLst>
+              <a:ext uri="{FF2B5EF4-FFF2-40B4-BE49-F238E27FC236}">
+                <a16:creationId xmlns:a16="http://schemas.microsoft.com/office/drawing/2014/main" id="{BA011391-4A2F-4F0F-9AA4-995F3DD39F1F}"/>
+              </a:ext>
+            </a:extLst>
+          </p:cNvPr>
+          <p:cNvPicPr>
+            <a:picLocks noChangeAspect="1"/>
+          </p:cNvPicPr>
+          <p:nvPr/>
+        </p:nvPicPr>
+        <p:blipFill>
+          <a:blip r:embed="rId5">
+            <a:extLst>
+              <a:ext uri="{28A0092B-C50C-407E-A947-70E740481C1C}">
+                <a14:useLocalDpi xmlns:a14="http://schemas.microsoft.com/office/drawing/2010/main" val="0"/>
+              </a:ext>
+            </a:extLst>
+          </a:blip>
+          <a:stretch>
+            <a:fillRect/>
+          </a:stretch>
+        </p:blipFill>
+        <p:spPr>
+          <a:xfrm>
+            <a:off x="6709230" y="4722952"/>
+            <a:ext cx="2125635" cy="1528408"/>
+          </a:xfrm>
+          <a:prstGeom prst="rect">
+            <a:avLst/>
+          </a:prstGeom>
+        </p:spPr>
+      </p:pic>
+    </p:spTree>
+    <p:extLst>
+      <p:ext uri="{BB962C8B-B14F-4D97-AF65-F5344CB8AC3E}">
+        <p14:creationId xmlns:p14="http://schemas.microsoft.com/office/powerpoint/2010/main" val="3289265027"/>
       </p:ext>
     </p:extLst>
   </p:cSld>
@@ -27443,4 +29202,299 @@
     </a:ext>
   </a:extLst>
 </a:theme>
+</file>
+
+<file path=ppt/theme/theme2.xml><?xml version="1.0" encoding="utf-8"?>
+<a:theme xmlns:a="http://schemas.openxmlformats.org/drawingml/2006/main" name="Office Theme">
+  <a:themeElements>
+    <a:clrScheme name="Office">
+      <a:dk1>
+        <a:sysClr val="windowText" lastClr="000000"/>
+      </a:dk1>
+      <a:lt1>
+        <a:sysClr val="window" lastClr="FFFFFF"/>
+      </a:lt1>
+      <a:dk2>
+        <a:srgbClr val="44546A"/>
+      </a:dk2>
+      <a:lt2>
+        <a:srgbClr val="E7E6E6"/>
+      </a:lt2>
+      <a:accent1>
+        <a:srgbClr val="4472C4"/>
+      </a:accent1>
+      <a:accent2>
+        <a:srgbClr val="ED7D31"/>
+      </a:accent2>
+      <a:accent3>
+        <a:srgbClr val="A5A5A5"/>
+      </a:accent3>
+      <a:accent4>
+        <a:srgbClr val="FFC000"/>
+      </a:accent4>
+      <a:accent5>
+        <a:srgbClr val="5B9BD5"/>
+      </a:accent5>
+      <a:accent6>
+        <a:srgbClr val="70AD47"/>
+      </a:accent6>
+      <a:hlink>
+        <a:srgbClr val="0563C1"/>
+      </a:hlink>
+      <a:folHlink>
+        <a:srgbClr val="954F72"/>
+      </a:folHlink>
+    </a:clrScheme>
+    <a:fontScheme name="Office">
+      <a:majorFont>
+        <a:latin typeface="Calibri Light" panose="020F0302020204030204"/>
+        <a:ea typeface=""/>
+        <a:cs typeface=""/>
+        <a:font script="Jpan" typeface="游ゴシック Light"/>
+        <a:font script="Hang" typeface="맑은 고딕"/>
+        <a:font script="Hans" typeface="等线 Light"/>
+        <a:font script="Hant" typeface="新細明體"/>
+        <a:font script="Arab" typeface="Times New Roman"/>
+        <a:font script="Hebr" typeface="Times New Roman"/>
+        <a:font script="Thai" typeface="Angsana New"/>
+        <a:font script="Ethi" typeface="Nyala"/>
+        <a:font script="Beng" typeface="Vrinda"/>
+        <a:font script="Gujr" typeface="Shruti"/>
+        <a:font script="Khmr" typeface="MoolBoran"/>
+        <a:font script="Knda" typeface="Tunga"/>
+        <a:font script="Guru" typeface="Raavi"/>
+        <a:font script="Cans" typeface="Euphemia"/>
+        <a:font script="Cher" typeface="Plantagenet Cherokee"/>
+        <a:font script="Yiii" typeface="Microsoft Yi Baiti"/>
+        <a:font script="Tibt" typeface="Microsoft Himalaya"/>
+        <a:font script="Thaa" typeface="MV Boli"/>
+        <a:font script="Deva" typeface="Mangal"/>
+        <a:font script="Telu" typeface="Gautami"/>
+        <a:font script="Taml" typeface="Latha"/>
+        <a:font script="Syrc" typeface="Estrangelo Edessa"/>
+        <a:font script="Orya" typeface="Kalinga"/>
+        <a:font script="Mlym" typeface="Kartika"/>
+        <a:font script="Laoo" typeface="DokChampa"/>
+        <a:font script="Sinh" typeface="Iskoola Pota"/>
+        <a:font script="Mong" typeface="Mongolian Baiti"/>
+        <a:font script="Viet" typeface="Times New Roman"/>
+        <a:font script="Uigh" typeface="Microsoft Uighur"/>
+        <a:font script="Geor" typeface="Sylfaen"/>
+        <a:font script="Armn" typeface="Arial"/>
+        <a:font script="Bugi" typeface="Leelawadee UI"/>
+        <a:font script="Bopo" typeface="Microsoft JhengHei"/>
+        <a:font script="Java" typeface="Javanese Text"/>
+        <a:font script="Lisu" typeface="Segoe UI"/>
+        <a:font script="Mymr" typeface="Myanmar Text"/>
+        <a:font script="Nkoo" typeface="Ebrima"/>
+        <a:font script="Olck" typeface="Nirmala UI"/>
+        <a:font script="Osma" typeface="Ebrima"/>
+        <a:font script="Phag" typeface="Phagspa"/>
+        <a:font script="Syrn" typeface="Estrangelo Edessa"/>
+        <a:font script="Syrj" typeface="Estrangelo Edessa"/>
+        <a:font script="Syre" typeface="Estrangelo Edessa"/>
+        <a:font script="Sora" typeface="Nirmala UI"/>
+        <a:font script="Tale" typeface="Microsoft Tai Le"/>
+        <a:font script="Talu" typeface="Microsoft New Tai Lue"/>
+        <a:font script="Tfng" typeface="Ebrima"/>
+      </a:majorFont>
+      <a:minorFont>
+        <a:latin typeface="Calibri" panose="020F0502020204030204"/>
+        <a:ea typeface=""/>
+        <a:cs typeface=""/>
+        <a:font script="Jpan" typeface="游ゴシック"/>
+        <a:font script="Hang" typeface="맑은 고딕"/>
+        <a:font script="Hans" typeface="等线"/>
+        <a:font script="Hant" typeface="新細明體"/>
+        <a:font script="Arab" typeface="Arial"/>
+        <a:font script="Hebr" typeface="Arial"/>
+        <a:font script="Thai" typeface="Cordia New"/>
+        <a:font script="Ethi" typeface="Nyala"/>
+        <a:font script="Beng" typeface="Vrinda"/>
+        <a:font script="Gujr" typeface="Shruti"/>
+        <a:font script="Khmr" typeface="DaunPenh"/>
+        <a:font script="Knda" typeface="Tunga"/>
+        <a:font script="Guru" typeface="Raavi"/>
+        <a:font script="Cans" typeface="Euphemia"/>
+        <a:font script="Cher" typeface="Plantagenet Cherokee"/>
+        <a:font script="Yiii" typeface="Microsoft Yi Baiti"/>
+        <a:font script="Tibt" typeface="Microsoft Himalaya"/>
+        <a:font script="Thaa" typeface="MV Boli"/>
+        <a:font script="Deva" typeface="Mangal"/>
+        <a:font script="Telu" typeface="Gautami"/>
+        <a:font script="Taml" typeface="Latha"/>
+        <a:font script="Syrc" typeface="Estrangelo Edessa"/>
+        <a:font script="Orya" typeface="Kalinga"/>
+        <a:font script="Mlym" typeface="Kartika"/>
+        <a:font script="Laoo" typeface="DokChampa"/>
+        <a:font script="Sinh" typeface="Iskoola Pota"/>
+        <a:font script="Mong" typeface="Mongolian Baiti"/>
+        <a:font script="Viet" typeface="Arial"/>
+        <a:font script="Uigh" typeface="Microsoft Uighur"/>
+        <a:font script="Geor" typeface="Sylfaen"/>
+        <a:font script="Armn" typeface="Arial"/>
+        <a:font script="Bugi" typeface="Leelawadee UI"/>
+        <a:font script="Bopo" typeface="Microsoft JhengHei"/>
+        <a:font script="Java" typeface="Javanese Text"/>
+        <a:font script="Lisu" typeface="Segoe UI"/>
+        <a:font script="Mymr" typeface="Myanmar Text"/>
+        <a:font script="Nkoo" typeface="Ebrima"/>
+        <a:font script="Olck" typeface="Nirmala UI"/>
+        <a:font script="Osma" typeface="Ebrima"/>
+        <a:font script="Phag" typeface="Phagspa"/>
+        <a:font script="Syrn" typeface="Estrangelo Edessa"/>
+        <a:font script="Syrj" typeface="Estrangelo Edessa"/>
+        <a:font script="Syre" typeface="Estrangelo Edessa"/>
+        <a:font script="Sora" typeface="Nirmala UI"/>
+        <a:font script="Tale" typeface="Microsoft Tai Le"/>
+        <a:font script="Talu" typeface="Microsoft New Tai Lue"/>
+        <a:font script="Tfng" typeface="Ebrima"/>
+      </a:minorFont>
+    </a:fontScheme>
+    <a:fmtScheme name="Office">
+      <a:fillStyleLst>
+        <a:solidFill>
+          <a:schemeClr val="phClr"/>
+        </a:solidFill>
+        <a:gradFill rotWithShape="1">
+          <a:gsLst>
+            <a:gs pos="0">
+              <a:schemeClr val="phClr">
+                <a:lumMod val="110000"/>
+                <a:satMod val="105000"/>
+                <a:tint val="67000"/>
+              </a:schemeClr>
+            </a:gs>
+            <a:gs pos="50000">
+              <a:schemeClr val="phClr">
+                <a:lumMod val="105000"/>
+                <a:satMod val="103000"/>
+                <a:tint val="73000"/>
+              </a:schemeClr>
+            </a:gs>
+            <a:gs pos="100000">
+              <a:schemeClr val="phClr">
+                <a:lumMod val="105000"/>
+                <a:satMod val="109000"/>
+                <a:tint val="81000"/>
+              </a:schemeClr>
+            </a:gs>
+          </a:gsLst>
+          <a:lin ang="5400000" scaled="0"/>
+        </a:gradFill>
+        <a:gradFill rotWithShape="1">
+          <a:gsLst>
+            <a:gs pos="0">
+              <a:schemeClr val="phClr">
+                <a:satMod val="103000"/>
+                <a:lumMod val="102000"/>
+                <a:tint val="94000"/>
+              </a:schemeClr>
+            </a:gs>
+            <a:gs pos="50000">
+              <a:schemeClr val="phClr">
+                <a:satMod val="110000"/>
+                <a:lumMod val="100000"/>
+                <a:shade val="100000"/>
+              </a:schemeClr>
+            </a:gs>
+            <a:gs pos="100000">
+              <a:schemeClr val="phClr">
+                <a:lumMod val="99000"/>
+                <a:satMod val="120000"/>
+                <a:shade val="78000"/>
+              </a:schemeClr>
+            </a:gs>
+          </a:gsLst>
+          <a:lin ang="5400000" scaled="0"/>
+        </a:gradFill>
+      </a:fillStyleLst>
+      <a:lnStyleLst>
+        <a:ln w="6350" cap="flat" cmpd="sng" algn="ctr">
+          <a:solidFill>
+            <a:schemeClr val="phClr"/>
+          </a:solidFill>
+          <a:prstDash val="solid"/>
+          <a:miter lim="800000"/>
+        </a:ln>
+        <a:ln w="12700" cap="flat" cmpd="sng" algn="ctr">
+          <a:solidFill>
+            <a:schemeClr val="phClr"/>
+          </a:solidFill>
+          <a:prstDash val="solid"/>
+          <a:miter lim="800000"/>
+        </a:ln>
+        <a:ln w="19050" cap="flat" cmpd="sng" algn="ctr">
+          <a:solidFill>
+            <a:schemeClr val="phClr"/>
+          </a:solidFill>
+          <a:prstDash val="solid"/>
+          <a:miter lim="800000"/>
+        </a:ln>
+      </a:lnStyleLst>
+      <a:effectStyleLst>
+        <a:effectStyle>
+          <a:effectLst/>
+        </a:effectStyle>
+        <a:effectStyle>
+          <a:effectLst/>
+        </a:effectStyle>
+        <a:effectStyle>
+          <a:effectLst>
+            <a:outerShdw blurRad="57150" dist="19050" dir="5400000" algn="ctr" rotWithShape="0">
+              <a:srgbClr val="000000">
+                <a:alpha val="63000"/>
+              </a:srgbClr>
+            </a:outerShdw>
+          </a:effectLst>
+        </a:effectStyle>
+      </a:effectStyleLst>
+      <a:bgFillStyleLst>
+        <a:solidFill>
+          <a:schemeClr val="phClr"/>
+        </a:solidFill>
+        <a:solidFill>
+          <a:schemeClr val="phClr">
+            <a:tint val="95000"/>
+            <a:satMod val="170000"/>
+          </a:schemeClr>
+        </a:solidFill>
+        <a:gradFill rotWithShape="1">
+          <a:gsLst>
+            <a:gs pos="0">
+              <a:schemeClr val="phClr">
+                <a:tint val="93000"/>
+                <a:satMod val="150000"/>
+                <a:shade val="98000"/>
+                <a:lumMod val="102000"/>
+              </a:schemeClr>
+            </a:gs>
+            <a:gs pos="50000">
+              <a:schemeClr val="phClr">
+                <a:tint val="98000"/>
+                <a:satMod val="130000"/>
+                <a:shade val="90000"/>
+                <a:lumMod val="103000"/>
+              </a:schemeClr>
+            </a:gs>
+            <a:gs pos="100000">
+              <a:schemeClr val="phClr">
+                <a:shade val="63000"/>
+                <a:satMod val="120000"/>
+              </a:schemeClr>
+            </a:gs>
+          </a:gsLst>
+          <a:lin ang="5400000" scaled="0"/>
+        </a:gradFill>
+      </a:bgFillStyleLst>
+    </a:fmtScheme>
+  </a:themeElements>
+  <a:objectDefaults/>
+  <a:extraClrSchemeLst/>
+  <a:extLst>
+    <a:ext uri="{05A4C25C-085E-4340-85A3-A5531E510DB2}">
+      <thm15:themeFamily xmlns:thm15="http://schemas.microsoft.com/office/thememl/2012/main" name="Office Theme" id="{62F939B6-93AF-4DB8-9C6B-D6C7DFDC589F}" vid="{4A3C46E8-61CC-4603-A589-7422A47A8E4A}"/>
+    </a:ext>
+  </a:extLst>
+</a:theme>
 </file>
</xml_diff>